<commit_message>
Added images to the thing for easier plotting
</commit_message>
<xml_diff>
--- a/RHEA MEng figures.pptx
+++ b/RHEA MEng figures.pptx
@@ -105,7 +105,193 @@
       </a:defRPr>
     </a:lvl9pPr>
   </p:defaultTextStyle>
+  <p:extLst>
+    <p:ext uri="{EFAFB233-063F-42B5-8137-9DF3F51BA10A}">
+      <p15:sldGuideLst xmlns:p15="http://schemas.microsoft.com/office/powerpoint/2012/main"/>
+    </p:ext>
+  </p:extLst>
 </p:presentation>
+</file>
+
+<file path=ppt/revisionInfo.xml><?xml version="1.0" encoding="utf-8"?>
+<p1510:revInfo xmlns:a="http://schemas.openxmlformats.org/drawingml/2006/main" xmlns:r="http://schemas.openxmlformats.org/officeDocument/2006/relationships" xmlns:p1510="http://schemas.microsoft.com/office/powerpoint/2015/10/main">
+  <p1510:revLst>
+    <p1510:client id="{C3423E57-CB60-4E1D-A614-F6132850FFBA}" v="8" dt="2023-10-17T19:06:33.141"/>
+  </p1510:revLst>
+</p1510:revInfo>
+</file>
+
+<file path=ppt/changesInfos/changesInfo1.xml><?xml version="1.0" encoding="utf-8"?>
+<pc:chgInfo xmlns:a="http://schemas.openxmlformats.org/drawingml/2006/main" xmlns:r="http://schemas.openxmlformats.org/officeDocument/2006/relationships" xmlns:ac="http://schemas.microsoft.com/office/drawing/2013/main/command" xmlns:pc="http://schemas.microsoft.com/office/powerpoint/2013/main/command">
+  <pc:docChgLst>
+    <pc:chgData name="Bjerkhaug, Sigurd" userId="6a5b5c75-6033-4fdb-a144-562842efa264" providerId="ADAL" clId="{C3423E57-CB60-4E1D-A614-F6132850FFBA}"/>
+    <pc:docChg chg="undo custSel modSld">
+      <pc:chgData name="Bjerkhaug, Sigurd" userId="6a5b5c75-6033-4fdb-a144-562842efa264" providerId="ADAL" clId="{C3423E57-CB60-4E1D-A614-F6132850FFBA}" dt="2023-10-17T19:06:54.622" v="93" actId="1076"/>
+      <pc:docMkLst>
+        <pc:docMk/>
+      </pc:docMkLst>
+      <pc:sldChg chg="addSp delSp modSp mod">
+        <pc:chgData name="Bjerkhaug, Sigurd" userId="6a5b5c75-6033-4fdb-a144-562842efa264" providerId="ADAL" clId="{C3423E57-CB60-4E1D-A614-F6132850FFBA}" dt="2023-10-17T19:06:54.622" v="93" actId="1076"/>
+        <pc:sldMkLst>
+          <pc:docMk/>
+          <pc:sldMk cId="2369882187" sldId="257"/>
+        </pc:sldMkLst>
+        <pc:spChg chg="add mod">
+          <ac:chgData name="Bjerkhaug, Sigurd" userId="6a5b5c75-6033-4fdb-a144-562842efa264" providerId="ADAL" clId="{C3423E57-CB60-4E1D-A614-F6132850FFBA}" dt="2023-10-17T19:03:22.798" v="27" actId="14100"/>
+          <ac:spMkLst>
+            <pc:docMk/>
+            <pc:sldMk cId="2369882187" sldId="257"/>
+            <ac:spMk id="2" creationId="{B58A78D6-6614-371C-61CB-759F4A781714}"/>
+          </ac:spMkLst>
+        </pc:spChg>
+        <pc:spChg chg="add mod">
+          <ac:chgData name="Bjerkhaug, Sigurd" userId="6a5b5c75-6033-4fdb-a144-562842efa264" providerId="ADAL" clId="{C3423E57-CB60-4E1D-A614-F6132850FFBA}" dt="2023-10-17T19:03:35.305" v="30" actId="14100"/>
+          <ac:spMkLst>
+            <pc:docMk/>
+            <pc:sldMk cId="2369882187" sldId="257"/>
+            <ac:spMk id="3" creationId="{00593D88-5766-7BF9-EF61-C0A6816D42BA}"/>
+          </ac:spMkLst>
+        </pc:spChg>
+        <pc:spChg chg="mod">
+          <ac:chgData name="Bjerkhaug, Sigurd" userId="6a5b5c75-6033-4fdb-a144-562842efa264" providerId="ADAL" clId="{C3423E57-CB60-4E1D-A614-F6132850FFBA}" dt="2023-10-17T15:47:47.981" v="15" actId="14100"/>
+          <ac:spMkLst>
+            <pc:docMk/>
+            <pc:sldMk cId="2369882187" sldId="257"/>
+            <ac:spMk id="4" creationId="{1D395C69-2B62-18C2-F8FD-12726D671D54}"/>
+          </ac:spMkLst>
+        </pc:spChg>
+        <pc:spChg chg="mod">
+          <ac:chgData name="Bjerkhaug, Sigurd" userId="6a5b5c75-6033-4fdb-a144-562842efa264" providerId="ADAL" clId="{C3423E57-CB60-4E1D-A614-F6132850FFBA}" dt="2023-10-17T15:47:31.615" v="8" actId="1076"/>
+          <ac:spMkLst>
+            <pc:docMk/>
+            <pc:sldMk cId="2369882187" sldId="257"/>
+            <ac:spMk id="12" creationId="{EB47D125-C952-44AD-59B4-3F5B8E21129D}"/>
+          </ac:spMkLst>
+        </pc:spChg>
+        <pc:spChg chg="mod">
+          <ac:chgData name="Bjerkhaug, Sigurd" userId="6a5b5c75-6033-4fdb-a144-562842efa264" providerId="ADAL" clId="{C3423E57-CB60-4E1D-A614-F6132850FFBA}" dt="2023-10-17T15:47:33.813" v="9" actId="1076"/>
+          <ac:spMkLst>
+            <pc:docMk/>
+            <pc:sldMk cId="2369882187" sldId="257"/>
+            <ac:spMk id="13" creationId="{D57C2F9A-EA72-4C83-2B03-FCCE55962245}"/>
+          </ac:spMkLst>
+        </pc:spChg>
+        <pc:spChg chg="del">
+          <ac:chgData name="Bjerkhaug, Sigurd" userId="6a5b5c75-6033-4fdb-a144-562842efa264" providerId="ADAL" clId="{C3423E57-CB60-4E1D-A614-F6132850FFBA}" dt="2023-10-17T19:03:54.737" v="35" actId="478"/>
+          <ac:spMkLst>
+            <pc:docMk/>
+            <pc:sldMk cId="2369882187" sldId="257"/>
+            <ac:spMk id="14" creationId="{9B3280E1-7FF8-AD1D-E8A4-AD279BFAFB0E}"/>
+          </ac:spMkLst>
+        </pc:spChg>
+        <pc:spChg chg="del">
+          <ac:chgData name="Bjerkhaug, Sigurd" userId="6a5b5c75-6033-4fdb-a144-562842efa264" providerId="ADAL" clId="{C3423E57-CB60-4E1D-A614-F6132850FFBA}" dt="2023-10-17T19:03:04.638" v="23" actId="478"/>
+          <ac:spMkLst>
+            <pc:docMk/>
+            <pc:sldMk cId="2369882187" sldId="257"/>
+            <ac:spMk id="18" creationId="{0E2DF697-E33E-F711-D3CA-A475943950EA}"/>
+          </ac:spMkLst>
+        </pc:spChg>
+        <pc:spChg chg="del">
+          <ac:chgData name="Bjerkhaug, Sigurd" userId="6a5b5c75-6033-4fdb-a144-562842efa264" providerId="ADAL" clId="{C3423E57-CB60-4E1D-A614-F6132850FFBA}" dt="2023-10-17T19:03:51.494" v="34" actId="478"/>
+          <ac:spMkLst>
+            <pc:docMk/>
+            <pc:sldMk cId="2369882187" sldId="257"/>
+            <ac:spMk id="19" creationId="{08B50E80-1808-1F8F-D343-CAEF5745410B}"/>
+          </ac:spMkLst>
+        </pc:spChg>
+        <pc:spChg chg="del">
+          <ac:chgData name="Bjerkhaug, Sigurd" userId="6a5b5c75-6033-4fdb-a144-562842efa264" providerId="ADAL" clId="{C3423E57-CB60-4E1D-A614-F6132850FFBA}" dt="2023-10-17T19:04:27.073" v="42" actId="478"/>
+          <ac:spMkLst>
+            <pc:docMk/>
+            <pc:sldMk cId="2369882187" sldId="257"/>
+            <ac:spMk id="35" creationId="{BC245D75-A14F-69E9-7F25-47DC98B219FA}"/>
+          </ac:spMkLst>
+        </pc:spChg>
+        <pc:spChg chg="mod">
+          <ac:chgData name="Bjerkhaug, Sigurd" userId="6a5b5c75-6033-4fdb-a144-562842efa264" providerId="ADAL" clId="{C3423E57-CB60-4E1D-A614-F6132850FFBA}" dt="2023-10-17T15:47:38.835" v="11" actId="14100"/>
+          <ac:spMkLst>
+            <pc:docMk/>
+            <pc:sldMk cId="2369882187" sldId="257"/>
+            <ac:spMk id="36" creationId="{F39418BD-16C6-34A8-4CE9-5EB399BA8FEB}"/>
+          </ac:spMkLst>
+        </pc:spChg>
+        <pc:spChg chg="del">
+          <ac:chgData name="Bjerkhaug, Sigurd" userId="6a5b5c75-6033-4fdb-a144-562842efa264" providerId="ADAL" clId="{C3423E57-CB60-4E1D-A614-F6132850FFBA}" dt="2023-10-17T19:04:30.276" v="43" actId="478"/>
+          <ac:spMkLst>
+            <pc:docMk/>
+            <pc:sldMk cId="2369882187" sldId="257"/>
+            <ac:spMk id="43" creationId="{3260557B-82C6-EE22-746A-9EF9FED4B63D}"/>
+          </ac:spMkLst>
+        </pc:spChg>
+        <pc:spChg chg="add mod">
+          <ac:chgData name="Bjerkhaug, Sigurd" userId="6a5b5c75-6033-4fdb-a144-562842efa264" providerId="ADAL" clId="{C3423E57-CB60-4E1D-A614-F6132850FFBA}" dt="2023-10-17T19:04:06.972" v="39" actId="14100"/>
+          <ac:spMkLst>
+            <pc:docMk/>
+            <pc:sldMk cId="2369882187" sldId="257"/>
+            <ac:spMk id="44" creationId="{AEE1E334-4927-D85A-EA3C-A0FE0DF65359}"/>
+          </ac:spMkLst>
+        </pc:spChg>
+        <pc:spChg chg="add mod">
+          <ac:chgData name="Bjerkhaug, Sigurd" userId="6a5b5c75-6033-4fdb-a144-562842efa264" providerId="ADAL" clId="{C3423E57-CB60-4E1D-A614-F6132850FFBA}" dt="2023-10-17T19:05:05.873" v="53" actId="14100"/>
+          <ac:spMkLst>
+            <pc:docMk/>
+            <pc:sldMk cId="2369882187" sldId="257"/>
+            <ac:spMk id="46" creationId="{4066D44D-1610-C6EE-146E-5781766F0013}"/>
+          </ac:spMkLst>
+        </pc:spChg>
+        <pc:spChg chg="add mod">
+          <ac:chgData name="Bjerkhaug, Sigurd" userId="6a5b5c75-6033-4fdb-a144-562842efa264" providerId="ADAL" clId="{C3423E57-CB60-4E1D-A614-F6132850FFBA}" dt="2023-10-17T19:04:43.374" v="47" actId="14100"/>
+          <ac:spMkLst>
+            <pc:docMk/>
+            <pc:sldMk cId="2369882187" sldId="257"/>
+            <ac:spMk id="47" creationId="{35D541F5-85E5-E2D0-0E91-DF0AC98AC51A}"/>
+          </ac:spMkLst>
+        </pc:spChg>
+        <pc:spChg chg="add mod">
+          <ac:chgData name="Bjerkhaug, Sigurd" userId="6a5b5c75-6033-4fdb-a144-562842efa264" providerId="ADAL" clId="{C3423E57-CB60-4E1D-A614-F6132850FFBA}" dt="2023-10-17T19:06:30.580" v="77" actId="790"/>
+          <ac:spMkLst>
+            <pc:docMk/>
+            <pc:sldMk cId="2369882187" sldId="257"/>
+            <ac:spMk id="48" creationId="{37D5C036-C703-2256-271C-990636ED0D34}"/>
+          </ac:spMkLst>
+        </pc:spChg>
+        <pc:spChg chg="add mod">
+          <ac:chgData name="Bjerkhaug, Sigurd" userId="6a5b5c75-6033-4fdb-a144-562842efa264" providerId="ADAL" clId="{C3423E57-CB60-4E1D-A614-F6132850FFBA}" dt="2023-10-17T19:06:54.622" v="93" actId="1076"/>
+          <ac:spMkLst>
+            <pc:docMk/>
+            <pc:sldMk cId="2369882187" sldId="257"/>
+            <ac:spMk id="49" creationId="{F4387C63-6ABA-C665-6CAC-7BF94862E8FA}"/>
+          </ac:spMkLst>
+        </pc:spChg>
+        <pc:picChg chg="add del mod">
+          <ac:chgData name="Bjerkhaug, Sigurd" userId="6a5b5c75-6033-4fdb-a144-562842efa264" providerId="ADAL" clId="{C3423E57-CB60-4E1D-A614-F6132850FFBA}" dt="2023-10-17T15:47:03.872" v="4" actId="931"/>
+          <ac:picMkLst>
+            <pc:docMk/>
+            <pc:sldMk cId="2369882187" sldId="257"/>
+            <ac:picMk id="3" creationId="{E8625B52-131A-62E3-78A0-36B06A648548}"/>
+          </ac:picMkLst>
+        </pc:picChg>
+        <pc:picChg chg="add mod ord">
+          <ac:chgData name="Bjerkhaug, Sigurd" userId="6a5b5c75-6033-4fdb-a144-562842efa264" providerId="ADAL" clId="{C3423E57-CB60-4E1D-A614-F6132850FFBA}" dt="2023-10-17T19:03:42.259" v="32" actId="108"/>
+          <ac:picMkLst>
+            <pc:docMk/>
+            <pc:sldMk cId="2369882187" sldId="257"/>
+            <ac:picMk id="45" creationId="{527D75F6-F704-0CD6-764F-7C997ACE0FD1}"/>
+          </ac:picMkLst>
+        </pc:picChg>
+        <pc:picChg chg="del">
+          <ac:chgData name="Bjerkhaug, Sigurd" userId="6a5b5c75-6033-4fdb-a144-562842efa264" providerId="ADAL" clId="{C3423E57-CB60-4E1D-A614-F6132850FFBA}" dt="2023-10-17T15:46:17.322" v="0" actId="478"/>
+          <ac:picMkLst>
+            <pc:docMk/>
+            <pc:sldMk cId="2369882187" sldId="257"/>
+            <ac:picMk id="48" creationId="{7FDAFDB5-39BA-B641-B515-FFBDF167499F}"/>
+          </ac:picMkLst>
+        </pc:picChg>
+      </pc:sldChg>
+    </pc:docChg>
+  </pc:docChgLst>
+</pc:chgInfo>
 </file>
 
 <file path=ppt/slideLayouts/slideLayout1.xml><?xml version="1.0" encoding="utf-8"?>
@@ -257,7 +443,7 @@
           <a:p>
             <a:fld id="{BEF5D0A1-4D32-4A77-9F40-862DFD85295E}" type="datetimeFigureOut">
               <a:rPr lang="en-GB" smtClean="0"/>
-              <a:t>16/10/2023</a:t>
+              <a:t>17/10/2023</a:t>
             </a:fld>
             <a:endParaRPr lang="en-GB"/>
           </a:p>
@@ -457,7 +643,7 @@
           <a:p>
             <a:fld id="{BEF5D0A1-4D32-4A77-9F40-862DFD85295E}" type="datetimeFigureOut">
               <a:rPr lang="en-GB" smtClean="0"/>
-              <a:t>16/10/2023</a:t>
+              <a:t>17/10/2023</a:t>
             </a:fld>
             <a:endParaRPr lang="en-GB"/>
           </a:p>
@@ -667,7 +853,7 @@
           <a:p>
             <a:fld id="{BEF5D0A1-4D32-4A77-9F40-862DFD85295E}" type="datetimeFigureOut">
               <a:rPr lang="en-GB" smtClean="0"/>
-              <a:t>16/10/2023</a:t>
+              <a:t>17/10/2023</a:t>
             </a:fld>
             <a:endParaRPr lang="en-GB"/>
           </a:p>
@@ -867,7 +1053,7 @@
           <a:p>
             <a:fld id="{BEF5D0A1-4D32-4A77-9F40-862DFD85295E}" type="datetimeFigureOut">
               <a:rPr lang="en-GB" smtClean="0"/>
-              <a:t>16/10/2023</a:t>
+              <a:t>17/10/2023</a:t>
             </a:fld>
             <a:endParaRPr lang="en-GB"/>
           </a:p>
@@ -1143,7 +1329,7 @@
           <a:p>
             <a:fld id="{BEF5D0A1-4D32-4A77-9F40-862DFD85295E}" type="datetimeFigureOut">
               <a:rPr lang="en-GB" smtClean="0"/>
-              <a:t>16/10/2023</a:t>
+              <a:t>17/10/2023</a:t>
             </a:fld>
             <a:endParaRPr lang="en-GB"/>
           </a:p>
@@ -1411,7 +1597,7 @@
           <a:p>
             <a:fld id="{BEF5D0A1-4D32-4A77-9F40-862DFD85295E}" type="datetimeFigureOut">
               <a:rPr lang="en-GB" smtClean="0"/>
-              <a:t>16/10/2023</a:t>
+              <a:t>17/10/2023</a:t>
             </a:fld>
             <a:endParaRPr lang="en-GB"/>
           </a:p>
@@ -1826,7 +2012,7 @@
           <a:p>
             <a:fld id="{BEF5D0A1-4D32-4A77-9F40-862DFD85295E}" type="datetimeFigureOut">
               <a:rPr lang="en-GB" smtClean="0"/>
-              <a:t>16/10/2023</a:t>
+              <a:t>17/10/2023</a:t>
             </a:fld>
             <a:endParaRPr lang="en-GB"/>
           </a:p>
@@ -1968,7 +2154,7 @@
           <a:p>
             <a:fld id="{BEF5D0A1-4D32-4A77-9F40-862DFD85295E}" type="datetimeFigureOut">
               <a:rPr lang="en-GB" smtClean="0"/>
-              <a:t>16/10/2023</a:t>
+              <a:t>17/10/2023</a:t>
             </a:fld>
             <a:endParaRPr lang="en-GB"/>
           </a:p>
@@ -2081,7 +2267,7 @@
           <a:p>
             <a:fld id="{BEF5D0A1-4D32-4A77-9F40-862DFD85295E}" type="datetimeFigureOut">
               <a:rPr lang="en-GB" smtClean="0"/>
-              <a:t>16/10/2023</a:t>
+              <a:t>17/10/2023</a:t>
             </a:fld>
             <a:endParaRPr lang="en-GB"/>
           </a:p>
@@ -2394,7 +2580,7 @@
           <a:p>
             <a:fld id="{BEF5D0A1-4D32-4A77-9F40-862DFD85295E}" type="datetimeFigureOut">
               <a:rPr lang="en-GB" smtClean="0"/>
-              <a:t>16/10/2023</a:t>
+              <a:t>17/10/2023</a:t>
             </a:fld>
             <a:endParaRPr lang="en-GB"/>
           </a:p>
@@ -2683,7 +2869,7 @@
           <a:p>
             <a:fld id="{BEF5D0A1-4D32-4A77-9F40-862DFD85295E}" type="datetimeFigureOut">
               <a:rPr lang="en-GB" smtClean="0"/>
-              <a:t>16/10/2023</a:t>
+              <a:t>17/10/2023</a:t>
             </a:fld>
             <a:endParaRPr lang="en-GB"/>
           </a:p>
@@ -2926,7 +3112,7 @@
           <a:p>
             <a:fld id="{BEF5D0A1-4D32-4A77-9F40-862DFD85295E}" type="datetimeFigureOut">
               <a:rPr lang="en-GB" smtClean="0"/>
-              <a:t>16/10/2023</a:t>
+              <a:t>17/10/2023</a:t>
             </a:fld>
             <a:endParaRPr lang="en-GB"/>
           </a:p>
@@ -3425,20 +3611,20 @@
       </p:grpSpPr>
       <p:pic>
         <p:nvPicPr>
-          <p:cNvPr id="48" name="Picture 47" descr="A collage of images of a machine&#10;&#10;Description automatically generated">
-            <a:extLst>
-              <a:ext uri="{FF2B5EF4-FFF2-40B4-BE49-F238E27FC236}">
-                <a16:creationId xmlns:a16="http://schemas.microsoft.com/office/drawing/2014/main" id="{7FDAFDB5-39BA-B641-B515-FFBDF167499F}"/>
+          <p:cNvPr id="45" name="Picture 44" descr="A collage of images of a machine&#10;&#10;Description automatically generated">
+            <a:extLst>
+              <a:ext uri="{FF2B5EF4-FFF2-40B4-BE49-F238E27FC236}">
+                <a16:creationId xmlns:a16="http://schemas.microsoft.com/office/drawing/2014/main" id="{527D75F6-F704-0CD6-764F-7C997ACE0FD1}"/>
               </a:ext>
             </a:extLst>
           </p:cNvPr>
           <p:cNvPicPr>
-            <a:picLocks noChangeAspect="1"/>
+            <a:picLocks noGrp="1" noRot="1" noChangeAspect="1" noMove="1" noResize="1" noEditPoints="1" noAdjustHandles="1" noChangeArrowheads="1" noChangeShapeType="1" noCrop="1"/>
           </p:cNvPicPr>
           <p:nvPr/>
         </p:nvPicPr>
         <p:blipFill>
-          <a:blip r:embed="rId2">
+          <a:blip r:embed="rId2" r:link="rId3">
             <a:extLst>
               <a:ext uri="{28A0092B-C50C-407E-A947-70E740481C1C}">
                 <a14:useLocalDpi xmlns:a14="http://schemas.microsoft.com/office/drawing/2010/main" val="0"/>
@@ -3475,8 +3661,8 @@
         </p:nvSpPr>
         <p:spPr>
           <a:xfrm>
-            <a:off x="3024787" y="651733"/>
-            <a:ext cx="369655" cy="420113"/>
+            <a:off x="2998037" y="558771"/>
+            <a:ext cx="396405" cy="448734"/>
           </a:xfrm>
           <a:prstGeom prst="ellipse">
             <a:avLst/>
@@ -3910,7 +4096,7 @@
         </p:nvSpPr>
         <p:spPr>
           <a:xfrm>
-            <a:off x="3216552" y="1372157"/>
+            <a:off x="3307386" y="1373326"/>
             <a:ext cx="557118" cy="417839"/>
           </a:xfrm>
           <a:prstGeom prst="ellipse">
@@ -3967,7 +4153,7 @@
         </p:nvSpPr>
         <p:spPr>
           <a:xfrm>
-            <a:off x="4094622" y="1380904"/>
+            <a:off x="4236931" y="1428101"/>
             <a:ext cx="557118" cy="417839"/>
           </a:xfrm>
           <a:prstGeom prst="ellipse">
@@ -4007,10 +4193,10 @@
       </p:sp>
       <p:sp>
         <p:nvSpPr>
-          <p:cNvPr id="14" name="Oval 13">
-            <a:extLst>
-              <a:ext uri="{FF2B5EF4-FFF2-40B4-BE49-F238E27FC236}">
-                <a16:creationId xmlns:a16="http://schemas.microsoft.com/office/drawing/2014/main" id="{9B3280E1-7FF8-AD1D-E8A4-AD279BFAFB0E}"/>
+          <p:cNvPr id="15" name="Oval 14">
+            <a:extLst>
+              <a:ext uri="{FF2B5EF4-FFF2-40B4-BE49-F238E27FC236}">
+                <a16:creationId xmlns:a16="http://schemas.microsoft.com/office/drawing/2014/main" id="{E4CF9632-8A41-6713-9C6B-D4EEE6934AA4}"/>
               </a:ext>
             </a:extLst>
           </p:cNvPr>
@@ -4021,8 +4207,8 @@
         </p:nvSpPr>
         <p:spPr>
           <a:xfrm>
-            <a:off x="5637791" y="5864623"/>
-            <a:ext cx="270484" cy="221283"/>
+            <a:off x="3519711" y="2807122"/>
+            <a:ext cx="510315" cy="338325"/>
           </a:xfrm>
           <a:prstGeom prst="ellipse">
             <a:avLst/>
@@ -4064,10 +4250,10 @@
       </p:sp>
       <p:sp>
         <p:nvSpPr>
-          <p:cNvPr id="15" name="Oval 14">
-            <a:extLst>
-              <a:ext uri="{FF2B5EF4-FFF2-40B4-BE49-F238E27FC236}">
-                <a16:creationId xmlns:a16="http://schemas.microsoft.com/office/drawing/2014/main" id="{E4CF9632-8A41-6713-9C6B-D4EEE6934AA4}"/>
+          <p:cNvPr id="16" name="Oval 15">
+            <a:extLst>
+              <a:ext uri="{FF2B5EF4-FFF2-40B4-BE49-F238E27FC236}">
+                <a16:creationId xmlns:a16="http://schemas.microsoft.com/office/drawing/2014/main" id="{2DF4D338-70E1-D0A4-5757-8B884972F152}"/>
               </a:ext>
             </a:extLst>
           </p:cNvPr>
@@ -4078,8 +4264,8 @@
         </p:nvSpPr>
         <p:spPr>
           <a:xfrm>
-            <a:off x="3519711" y="2807122"/>
-            <a:ext cx="510315" cy="338325"/>
+            <a:off x="7780476" y="709126"/>
+            <a:ext cx="441051" cy="244888"/>
           </a:xfrm>
           <a:prstGeom prst="ellipse">
             <a:avLst/>
@@ -4121,10 +4307,10 @@
       </p:sp>
       <p:sp>
         <p:nvSpPr>
-          <p:cNvPr id="16" name="Oval 15">
-            <a:extLst>
-              <a:ext uri="{FF2B5EF4-FFF2-40B4-BE49-F238E27FC236}">
-                <a16:creationId xmlns:a16="http://schemas.microsoft.com/office/drawing/2014/main" id="{2DF4D338-70E1-D0A4-5757-8B884972F152}"/>
+          <p:cNvPr id="17" name="Oval 16">
+            <a:extLst>
+              <a:ext uri="{FF2B5EF4-FFF2-40B4-BE49-F238E27FC236}">
+                <a16:creationId xmlns:a16="http://schemas.microsoft.com/office/drawing/2014/main" id="{9899DF8A-8929-EA17-B88C-213A22481870}"/>
               </a:ext>
             </a:extLst>
           </p:cNvPr>
@@ -4135,8 +4321,8 @@
         </p:nvSpPr>
         <p:spPr>
           <a:xfrm>
-            <a:off x="7780476" y="709126"/>
-            <a:ext cx="441051" cy="244888"/>
+            <a:off x="5799273" y="709125"/>
+            <a:ext cx="496559" cy="318170"/>
           </a:xfrm>
           <a:prstGeom prst="ellipse">
             <a:avLst/>
@@ -4178,10 +4364,10 @@
       </p:sp>
       <p:sp>
         <p:nvSpPr>
-          <p:cNvPr id="17" name="Oval 16">
-            <a:extLst>
-              <a:ext uri="{FF2B5EF4-FFF2-40B4-BE49-F238E27FC236}">
-                <a16:creationId xmlns:a16="http://schemas.microsoft.com/office/drawing/2014/main" id="{9899DF8A-8929-EA17-B88C-213A22481870}"/>
+          <p:cNvPr id="20" name="Oval 19">
+            <a:extLst>
+              <a:ext uri="{FF2B5EF4-FFF2-40B4-BE49-F238E27FC236}">
+                <a16:creationId xmlns:a16="http://schemas.microsoft.com/office/drawing/2014/main" id="{4F1CCBBD-0580-9AF9-A3B1-69317001BE9E}"/>
               </a:ext>
             </a:extLst>
           </p:cNvPr>
@@ -4192,8 +4378,350 @@
         </p:nvSpPr>
         <p:spPr>
           <a:xfrm>
-            <a:off x="5799273" y="709125"/>
-            <a:ext cx="496559" cy="318170"/>
+            <a:off x="4030026" y="5141261"/>
+            <a:ext cx="485464" cy="346937"/>
+          </a:xfrm>
+          <a:prstGeom prst="ellipse">
+            <a:avLst/>
+          </a:prstGeom>
+          <a:noFill/>
+          <a:ln w="28575">
+            <a:solidFill>
+              <a:schemeClr val="accent6">
+                <a:lumMod val="60000"/>
+                <a:lumOff val="40000"/>
+              </a:schemeClr>
+            </a:solidFill>
+          </a:ln>
+        </p:spPr>
+        <p:style>
+          <a:lnRef idx="2">
+            <a:schemeClr val="accent1">
+              <a:shade val="15000"/>
+            </a:schemeClr>
+          </a:lnRef>
+          <a:fillRef idx="1">
+            <a:schemeClr val="accent1"/>
+          </a:fillRef>
+          <a:effectRef idx="0">
+            <a:schemeClr val="accent1"/>
+          </a:effectRef>
+          <a:fontRef idx="minor">
+            <a:schemeClr val="lt1"/>
+          </a:fontRef>
+        </p:style>
+        <p:txBody>
+          <a:bodyPr rtlCol="0" anchor="ctr"/>
+          <a:lstStyle/>
+          <a:p>
+            <a:pPr algn="ctr"/>
+            <a:endParaRPr lang="en-GB" dirty="0"/>
+          </a:p>
+        </p:txBody>
+      </p:sp>
+      <p:sp>
+        <p:nvSpPr>
+          <p:cNvPr id="21" name="Oval 20">
+            <a:extLst>
+              <a:ext uri="{FF2B5EF4-FFF2-40B4-BE49-F238E27FC236}">
+                <a16:creationId xmlns:a16="http://schemas.microsoft.com/office/drawing/2014/main" id="{5496866D-1F62-3114-17F1-FCFC24BA3846}"/>
+              </a:ext>
+            </a:extLst>
+          </p:cNvPr>
+          <p:cNvSpPr>
+            <a:spLocks/>
+          </p:cNvSpPr>
+          <p:nvPr/>
+        </p:nvSpPr>
+        <p:spPr>
+          <a:xfrm>
+            <a:off x="8208911" y="2932501"/>
+            <a:ext cx="557118" cy="343593"/>
+          </a:xfrm>
+          <a:prstGeom prst="ellipse">
+            <a:avLst/>
+          </a:prstGeom>
+          <a:noFill/>
+          <a:ln w="28575">
+            <a:solidFill>
+              <a:schemeClr val="accent6">
+                <a:lumMod val="60000"/>
+                <a:lumOff val="40000"/>
+              </a:schemeClr>
+            </a:solidFill>
+          </a:ln>
+        </p:spPr>
+        <p:style>
+          <a:lnRef idx="2">
+            <a:schemeClr val="accent1">
+              <a:shade val="15000"/>
+            </a:schemeClr>
+          </a:lnRef>
+          <a:fillRef idx="1">
+            <a:schemeClr val="accent1"/>
+          </a:fillRef>
+          <a:effectRef idx="0">
+            <a:schemeClr val="accent1"/>
+          </a:effectRef>
+          <a:fontRef idx="minor">
+            <a:schemeClr val="lt1"/>
+          </a:fontRef>
+        </p:style>
+        <p:txBody>
+          <a:bodyPr rtlCol="0" anchor="ctr"/>
+          <a:lstStyle/>
+          <a:p>
+            <a:pPr algn="ctr"/>
+            <a:endParaRPr lang="en-GB" dirty="0"/>
+          </a:p>
+        </p:txBody>
+      </p:sp>
+      <p:sp>
+        <p:nvSpPr>
+          <p:cNvPr id="22" name="Oval 21">
+            <a:extLst>
+              <a:ext uri="{FF2B5EF4-FFF2-40B4-BE49-F238E27FC236}">
+                <a16:creationId xmlns:a16="http://schemas.microsoft.com/office/drawing/2014/main" id="{127CBC17-BD2A-B610-31F3-717EF4C8329C}"/>
+              </a:ext>
+            </a:extLst>
+          </p:cNvPr>
+          <p:cNvSpPr>
+            <a:spLocks/>
+          </p:cNvSpPr>
+          <p:nvPr/>
+        </p:nvSpPr>
+        <p:spPr>
+          <a:xfrm>
+            <a:off x="6133088" y="2982125"/>
+            <a:ext cx="478161" cy="335576"/>
+          </a:xfrm>
+          <a:prstGeom prst="ellipse">
+            <a:avLst/>
+          </a:prstGeom>
+          <a:noFill/>
+          <a:ln w="28575">
+            <a:solidFill>
+              <a:schemeClr val="accent6">
+                <a:lumMod val="60000"/>
+                <a:lumOff val="40000"/>
+              </a:schemeClr>
+            </a:solidFill>
+          </a:ln>
+        </p:spPr>
+        <p:style>
+          <a:lnRef idx="2">
+            <a:schemeClr val="accent1">
+              <a:shade val="15000"/>
+            </a:schemeClr>
+          </a:lnRef>
+          <a:fillRef idx="1">
+            <a:schemeClr val="accent1"/>
+          </a:fillRef>
+          <a:effectRef idx="0">
+            <a:schemeClr val="accent1"/>
+          </a:effectRef>
+          <a:fontRef idx="minor">
+            <a:schemeClr val="lt1"/>
+          </a:fontRef>
+        </p:style>
+        <p:txBody>
+          <a:bodyPr rtlCol="0" anchor="ctr"/>
+          <a:lstStyle/>
+          <a:p>
+            <a:pPr algn="ctr"/>
+            <a:endParaRPr lang="en-GB" dirty="0"/>
+          </a:p>
+        </p:txBody>
+      </p:sp>
+      <p:sp>
+        <p:nvSpPr>
+          <p:cNvPr id="23" name="Oval 22">
+            <a:extLst>
+              <a:ext uri="{FF2B5EF4-FFF2-40B4-BE49-F238E27FC236}">
+                <a16:creationId xmlns:a16="http://schemas.microsoft.com/office/drawing/2014/main" id="{091B1173-9CE0-B242-D016-8BD2116547D7}"/>
+              </a:ext>
+            </a:extLst>
+          </p:cNvPr>
+          <p:cNvSpPr>
+            <a:spLocks/>
+          </p:cNvSpPr>
+          <p:nvPr/>
+        </p:nvSpPr>
+        <p:spPr>
+          <a:xfrm>
+            <a:off x="4094622" y="2858255"/>
+            <a:ext cx="442810" cy="302507"/>
+          </a:xfrm>
+          <a:prstGeom prst="ellipse">
+            <a:avLst/>
+          </a:prstGeom>
+          <a:noFill/>
+          <a:ln w="28575">
+            <a:solidFill>
+              <a:schemeClr val="accent6">
+                <a:lumMod val="60000"/>
+                <a:lumOff val="40000"/>
+              </a:schemeClr>
+            </a:solidFill>
+          </a:ln>
+        </p:spPr>
+        <p:style>
+          <a:lnRef idx="2">
+            <a:schemeClr val="accent1">
+              <a:shade val="15000"/>
+            </a:schemeClr>
+          </a:lnRef>
+          <a:fillRef idx="1">
+            <a:schemeClr val="accent1"/>
+          </a:fillRef>
+          <a:effectRef idx="0">
+            <a:schemeClr val="accent1"/>
+          </a:effectRef>
+          <a:fontRef idx="minor">
+            <a:schemeClr val="lt1"/>
+          </a:fontRef>
+        </p:style>
+        <p:txBody>
+          <a:bodyPr rtlCol="0" anchor="ctr"/>
+          <a:lstStyle/>
+          <a:p>
+            <a:pPr algn="ctr"/>
+            <a:endParaRPr lang="en-GB" dirty="0"/>
+          </a:p>
+        </p:txBody>
+      </p:sp>
+      <p:sp>
+        <p:nvSpPr>
+          <p:cNvPr id="24" name="Oval 23">
+            <a:extLst>
+              <a:ext uri="{FF2B5EF4-FFF2-40B4-BE49-F238E27FC236}">
+                <a16:creationId xmlns:a16="http://schemas.microsoft.com/office/drawing/2014/main" id="{26EA4182-BD9B-06DA-E4DF-EF1834C199DC}"/>
+              </a:ext>
+            </a:extLst>
+          </p:cNvPr>
+          <p:cNvSpPr>
+            <a:spLocks/>
+          </p:cNvSpPr>
+          <p:nvPr/>
+        </p:nvSpPr>
+        <p:spPr>
+          <a:xfrm>
+            <a:off x="8275006" y="725098"/>
+            <a:ext cx="434005" cy="302197"/>
+          </a:xfrm>
+          <a:prstGeom prst="ellipse">
+            <a:avLst/>
+          </a:prstGeom>
+          <a:noFill/>
+          <a:ln w="28575">
+            <a:solidFill>
+              <a:schemeClr val="accent6">
+                <a:lumMod val="60000"/>
+                <a:lumOff val="40000"/>
+              </a:schemeClr>
+            </a:solidFill>
+          </a:ln>
+        </p:spPr>
+        <p:style>
+          <a:lnRef idx="2">
+            <a:schemeClr val="accent1">
+              <a:shade val="15000"/>
+            </a:schemeClr>
+          </a:lnRef>
+          <a:fillRef idx="1">
+            <a:schemeClr val="accent1"/>
+          </a:fillRef>
+          <a:effectRef idx="0">
+            <a:schemeClr val="accent1"/>
+          </a:effectRef>
+          <a:fontRef idx="minor">
+            <a:schemeClr val="lt1"/>
+          </a:fontRef>
+        </p:style>
+        <p:txBody>
+          <a:bodyPr rtlCol="0" anchor="ctr"/>
+          <a:lstStyle/>
+          <a:p>
+            <a:pPr algn="ctr"/>
+            <a:endParaRPr lang="en-GB" dirty="0"/>
+          </a:p>
+        </p:txBody>
+      </p:sp>
+      <p:sp>
+        <p:nvSpPr>
+          <p:cNvPr id="25" name="Oval 24">
+            <a:extLst>
+              <a:ext uri="{FF2B5EF4-FFF2-40B4-BE49-F238E27FC236}">
+                <a16:creationId xmlns:a16="http://schemas.microsoft.com/office/drawing/2014/main" id="{B4445127-CED1-C5C9-26B9-DB6A89A6029F}"/>
+              </a:ext>
+            </a:extLst>
+          </p:cNvPr>
+          <p:cNvSpPr>
+            <a:spLocks/>
+          </p:cNvSpPr>
+          <p:nvPr/>
+        </p:nvSpPr>
+        <p:spPr>
+          <a:xfrm>
+            <a:off x="6324094" y="725098"/>
+            <a:ext cx="496558" cy="344474"/>
+          </a:xfrm>
+          <a:prstGeom prst="ellipse">
+            <a:avLst/>
+          </a:prstGeom>
+          <a:noFill/>
+          <a:ln w="28575">
+            <a:solidFill>
+              <a:schemeClr val="accent6">
+                <a:lumMod val="60000"/>
+                <a:lumOff val="40000"/>
+              </a:schemeClr>
+            </a:solidFill>
+          </a:ln>
+        </p:spPr>
+        <p:style>
+          <a:lnRef idx="2">
+            <a:schemeClr val="accent1">
+              <a:shade val="15000"/>
+            </a:schemeClr>
+          </a:lnRef>
+          <a:fillRef idx="1">
+            <a:schemeClr val="accent1"/>
+          </a:fillRef>
+          <a:effectRef idx="0">
+            <a:schemeClr val="accent1"/>
+          </a:effectRef>
+          <a:fontRef idx="minor">
+            <a:schemeClr val="lt1"/>
+          </a:fontRef>
+        </p:style>
+        <p:txBody>
+          <a:bodyPr rtlCol="0" anchor="ctr"/>
+          <a:lstStyle/>
+          <a:p>
+            <a:pPr algn="ctr"/>
+            <a:endParaRPr lang="en-GB" dirty="0"/>
+          </a:p>
+        </p:txBody>
+      </p:sp>
+      <p:sp>
+        <p:nvSpPr>
+          <p:cNvPr id="26" name="Oval 25">
+            <a:extLst>
+              <a:ext uri="{FF2B5EF4-FFF2-40B4-BE49-F238E27FC236}">
+                <a16:creationId xmlns:a16="http://schemas.microsoft.com/office/drawing/2014/main" id="{6E3E9CBC-18B8-5197-F59F-FFC657CE0712}"/>
+              </a:ext>
+            </a:extLst>
+          </p:cNvPr>
+          <p:cNvSpPr>
+            <a:spLocks/>
+          </p:cNvSpPr>
+          <p:nvPr/>
+        </p:nvSpPr>
+        <p:spPr>
+          <a:xfrm>
+            <a:off x="5179967" y="2948207"/>
+            <a:ext cx="278688" cy="271873"/>
           </a:xfrm>
           <a:prstGeom prst="ellipse">
             <a:avLst/>
@@ -4235,10 +4763,10 @@
       </p:sp>
       <p:sp>
         <p:nvSpPr>
-          <p:cNvPr id="18" name="Oval 17">
-            <a:extLst>
-              <a:ext uri="{FF2B5EF4-FFF2-40B4-BE49-F238E27FC236}">
-                <a16:creationId xmlns:a16="http://schemas.microsoft.com/office/drawing/2014/main" id="{0E2DF697-E33E-F711-D3CA-A475943950EA}"/>
+          <p:cNvPr id="27" name="Oval 26">
+            <a:extLst>
+              <a:ext uri="{FF2B5EF4-FFF2-40B4-BE49-F238E27FC236}">
+                <a16:creationId xmlns:a16="http://schemas.microsoft.com/office/drawing/2014/main" id="{E7360B20-6C00-50BC-212D-373A7D4597C3}"/>
               </a:ext>
             </a:extLst>
           </p:cNvPr>
@@ -4249,461 +4777,8 @@
         </p:nvSpPr>
         <p:spPr>
           <a:xfrm>
-            <a:off x="5360361" y="5178507"/>
-            <a:ext cx="228985" cy="268278"/>
-          </a:xfrm>
-          <a:prstGeom prst="ellipse">
-            <a:avLst/>
-          </a:prstGeom>
-          <a:noFill/>
-          <a:ln w="28575">
-            <a:solidFill>
-              <a:schemeClr val="tx2"/>
-            </a:solidFill>
-          </a:ln>
-        </p:spPr>
-        <p:style>
-          <a:lnRef idx="2">
-            <a:schemeClr val="accent1">
-              <a:shade val="15000"/>
-            </a:schemeClr>
-          </a:lnRef>
-          <a:fillRef idx="1">
-            <a:schemeClr val="accent1"/>
-          </a:fillRef>
-          <a:effectRef idx="0">
-            <a:schemeClr val="accent1"/>
-          </a:effectRef>
-          <a:fontRef idx="minor">
-            <a:schemeClr val="lt1"/>
-          </a:fontRef>
-        </p:style>
-        <p:txBody>
-          <a:bodyPr rtlCol="0" anchor="ctr"/>
-          <a:lstStyle/>
-          <a:p>
-            <a:pPr algn="ctr"/>
-            <a:endParaRPr lang="en-GB" dirty="0"/>
-          </a:p>
-        </p:txBody>
-      </p:sp>
-      <p:sp>
-        <p:nvSpPr>
-          <p:cNvPr id="19" name="Oval 18">
-            <a:extLst>
-              <a:ext uri="{FF2B5EF4-FFF2-40B4-BE49-F238E27FC236}">
-                <a16:creationId xmlns:a16="http://schemas.microsoft.com/office/drawing/2014/main" id="{08B50E80-1808-1F8F-D343-CAEF5745410B}"/>
-              </a:ext>
-            </a:extLst>
-          </p:cNvPr>
-          <p:cNvSpPr>
-            <a:spLocks/>
-          </p:cNvSpPr>
-          <p:nvPr/>
-        </p:nvSpPr>
-        <p:spPr>
-          <a:xfrm>
-            <a:off x="5908274" y="5249409"/>
-            <a:ext cx="298745" cy="268278"/>
-          </a:xfrm>
-          <a:prstGeom prst="ellipse">
-            <a:avLst/>
-          </a:prstGeom>
-          <a:noFill/>
-          <a:ln w="28575">
-            <a:solidFill>
-              <a:schemeClr val="accent6">
-                <a:lumMod val="60000"/>
-                <a:lumOff val="40000"/>
-              </a:schemeClr>
-            </a:solidFill>
-          </a:ln>
-        </p:spPr>
-        <p:style>
-          <a:lnRef idx="2">
-            <a:schemeClr val="accent1">
-              <a:shade val="15000"/>
-            </a:schemeClr>
-          </a:lnRef>
-          <a:fillRef idx="1">
-            <a:schemeClr val="accent1"/>
-          </a:fillRef>
-          <a:effectRef idx="0">
-            <a:schemeClr val="accent1"/>
-          </a:effectRef>
-          <a:fontRef idx="minor">
-            <a:schemeClr val="lt1"/>
-          </a:fontRef>
-        </p:style>
-        <p:txBody>
-          <a:bodyPr rtlCol="0" anchor="ctr"/>
-          <a:lstStyle/>
-          <a:p>
-            <a:pPr algn="ctr"/>
-            <a:endParaRPr lang="en-GB" dirty="0"/>
-          </a:p>
-        </p:txBody>
-      </p:sp>
-      <p:sp>
-        <p:nvSpPr>
-          <p:cNvPr id="20" name="Oval 19">
-            <a:extLst>
-              <a:ext uri="{FF2B5EF4-FFF2-40B4-BE49-F238E27FC236}">
-                <a16:creationId xmlns:a16="http://schemas.microsoft.com/office/drawing/2014/main" id="{4F1CCBBD-0580-9AF9-A3B1-69317001BE9E}"/>
-              </a:ext>
-            </a:extLst>
-          </p:cNvPr>
-          <p:cNvSpPr>
-            <a:spLocks/>
-          </p:cNvSpPr>
-          <p:nvPr/>
-        </p:nvSpPr>
-        <p:spPr>
-          <a:xfrm>
-            <a:off x="4030026" y="5141261"/>
-            <a:ext cx="485464" cy="346937"/>
-          </a:xfrm>
-          <a:prstGeom prst="ellipse">
-            <a:avLst/>
-          </a:prstGeom>
-          <a:noFill/>
-          <a:ln w="28575">
-            <a:solidFill>
-              <a:schemeClr val="accent6">
-                <a:lumMod val="60000"/>
-                <a:lumOff val="40000"/>
-              </a:schemeClr>
-            </a:solidFill>
-          </a:ln>
-        </p:spPr>
-        <p:style>
-          <a:lnRef idx="2">
-            <a:schemeClr val="accent1">
-              <a:shade val="15000"/>
-            </a:schemeClr>
-          </a:lnRef>
-          <a:fillRef idx="1">
-            <a:schemeClr val="accent1"/>
-          </a:fillRef>
-          <a:effectRef idx="0">
-            <a:schemeClr val="accent1"/>
-          </a:effectRef>
-          <a:fontRef idx="minor">
-            <a:schemeClr val="lt1"/>
-          </a:fontRef>
-        </p:style>
-        <p:txBody>
-          <a:bodyPr rtlCol="0" anchor="ctr"/>
-          <a:lstStyle/>
-          <a:p>
-            <a:pPr algn="ctr"/>
-            <a:endParaRPr lang="en-GB" dirty="0"/>
-          </a:p>
-        </p:txBody>
-      </p:sp>
-      <p:sp>
-        <p:nvSpPr>
-          <p:cNvPr id="21" name="Oval 20">
-            <a:extLst>
-              <a:ext uri="{FF2B5EF4-FFF2-40B4-BE49-F238E27FC236}">
-                <a16:creationId xmlns:a16="http://schemas.microsoft.com/office/drawing/2014/main" id="{5496866D-1F62-3114-17F1-FCFC24BA3846}"/>
-              </a:ext>
-            </a:extLst>
-          </p:cNvPr>
-          <p:cNvSpPr>
-            <a:spLocks/>
-          </p:cNvSpPr>
-          <p:nvPr/>
-        </p:nvSpPr>
-        <p:spPr>
-          <a:xfrm>
-            <a:off x="8208911" y="2932501"/>
-            <a:ext cx="557118" cy="343593"/>
-          </a:xfrm>
-          <a:prstGeom prst="ellipse">
-            <a:avLst/>
-          </a:prstGeom>
-          <a:noFill/>
-          <a:ln w="28575">
-            <a:solidFill>
-              <a:schemeClr val="accent6">
-                <a:lumMod val="60000"/>
-                <a:lumOff val="40000"/>
-              </a:schemeClr>
-            </a:solidFill>
-          </a:ln>
-        </p:spPr>
-        <p:style>
-          <a:lnRef idx="2">
-            <a:schemeClr val="accent1">
-              <a:shade val="15000"/>
-            </a:schemeClr>
-          </a:lnRef>
-          <a:fillRef idx="1">
-            <a:schemeClr val="accent1"/>
-          </a:fillRef>
-          <a:effectRef idx="0">
-            <a:schemeClr val="accent1"/>
-          </a:effectRef>
-          <a:fontRef idx="minor">
-            <a:schemeClr val="lt1"/>
-          </a:fontRef>
-        </p:style>
-        <p:txBody>
-          <a:bodyPr rtlCol="0" anchor="ctr"/>
-          <a:lstStyle/>
-          <a:p>
-            <a:pPr algn="ctr"/>
-            <a:endParaRPr lang="en-GB" dirty="0"/>
-          </a:p>
-        </p:txBody>
-      </p:sp>
-      <p:sp>
-        <p:nvSpPr>
-          <p:cNvPr id="22" name="Oval 21">
-            <a:extLst>
-              <a:ext uri="{FF2B5EF4-FFF2-40B4-BE49-F238E27FC236}">
-                <a16:creationId xmlns:a16="http://schemas.microsoft.com/office/drawing/2014/main" id="{127CBC17-BD2A-B610-31F3-717EF4C8329C}"/>
-              </a:ext>
-            </a:extLst>
-          </p:cNvPr>
-          <p:cNvSpPr>
-            <a:spLocks/>
-          </p:cNvSpPr>
-          <p:nvPr/>
-        </p:nvSpPr>
-        <p:spPr>
-          <a:xfrm>
-            <a:off x="6133088" y="2982125"/>
-            <a:ext cx="478161" cy="335576"/>
-          </a:xfrm>
-          <a:prstGeom prst="ellipse">
-            <a:avLst/>
-          </a:prstGeom>
-          <a:noFill/>
-          <a:ln w="28575">
-            <a:solidFill>
-              <a:schemeClr val="accent6">
-                <a:lumMod val="60000"/>
-                <a:lumOff val="40000"/>
-              </a:schemeClr>
-            </a:solidFill>
-          </a:ln>
-        </p:spPr>
-        <p:style>
-          <a:lnRef idx="2">
-            <a:schemeClr val="accent1">
-              <a:shade val="15000"/>
-            </a:schemeClr>
-          </a:lnRef>
-          <a:fillRef idx="1">
-            <a:schemeClr val="accent1"/>
-          </a:fillRef>
-          <a:effectRef idx="0">
-            <a:schemeClr val="accent1"/>
-          </a:effectRef>
-          <a:fontRef idx="minor">
-            <a:schemeClr val="lt1"/>
-          </a:fontRef>
-        </p:style>
-        <p:txBody>
-          <a:bodyPr rtlCol="0" anchor="ctr"/>
-          <a:lstStyle/>
-          <a:p>
-            <a:pPr algn="ctr"/>
-            <a:endParaRPr lang="en-GB" dirty="0"/>
-          </a:p>
-        </p:txBody>
-      </p:sp>
-      <p:sp>
-        <p:nvSpPr>
-          <p:cNvPr id="23" name="Oval 22">
-            <a:extLst>
-              <a:ext uri="{FF2B5EF4-FFF2-40B4-BE49-F238E27FC236}">
-                <a16:creationId xmlns:a16="http://schemas.microsoft.com/office/drawing/2014/main" id="{091B1173-9CE0-B242-D016-8BD2116547D7}"/>
-              </a:ext>
-            </a:extLst>
-          </p:cNvPr>
-          <p:cNvSpPr>
-            <a:spLocks/>
-          </p:cNvSpPr>
-          <p:nvPr/>
-        </p:nvSpPr>
-        <p:spPr>
-          <a:xfrm>
-            <a:off x="4094622" y="2858255"/>
-            <a:ext cx="442810" cy="302507"/>
-          </a:xfrm>
-          <a:prstGeom prst="ellipse">
-            <a:avLst/>
-          </a:prstGeom>
-          <a:noFill/>
-          <a:ln w="28575">
-            <a:solidFill>
-              <a:schemeClr val="accent6">
-                <a:lumMod val="60000"/>
-                <a:lumOff val="40000"/>
-              </a:schemeClr>
-            </a:solidFill>
-          </a:ln>
-        </p:spPr>
-        <p:style>
-          <a:lnRef idx="2">
-            <a:schemeClr val="accent1">
-              <a:shade val="15000"/>
-            </a:schemeClr>
-          </a:lnRef>
-          <a:fillRef idx="1">
-            <a:schemeClr val="accent1"/>
-          </a:fillRef>
-          <a:effectRef idx="0">
-            <a:schemeClr val="accent1"/>
-          </a:effectRef>
-          <a:fontRef idx="minor">
-            <a:schemeClr val="lt1"/>
-          </a:fontRef>
-        </p:style>
-        <p:txBody>
-          <a:bodyPr rtlCol="0" anchor="ctr"/>
-          <a:lstStyle/>
-          <a:p>
-            <a:pPr algn="ctr"/>
-            <a:endParaRPr lang="en-GB" dirty="0"/>
-          </a:p>
-        </p:txBody>
-      </p:sp>
-      <p:sp>
-        <p:nvSpPr>
-          <p:cNvPr id="24" name="Oval 23">
-            <a:extLst>
-              <a:ext uri="{FF2B5EF4-FFF2-40B4-BE49-F238E27FC236}">
-                <a16:creationId xmlns:a16="http://schemas.microsoft.com/office/drawing/2014/main" id="{26EA4182-BD9B-06DA-E4DF-EF1834C199DC}"/>
-              </a:ext>
-            </a:extLst>
-          </p:cNvPr>
-          <p:cNvSpPr>
-            <a:spLocks/>
-          </p:cNvSpPr>
-          <p:nvPr/>
-        </p:nvSpPr>
-        <p:spPr>
-          <a:xfrm>
-            <a:off x="8275006" y="725098"/>
-            <a:ext cx="434005" cy="302197"/>
-          </a:xfrm>
-          <a:prstGeom prst="ellipse">
-            <a:avLst/>
-          </a:prstGeom>
-          <a:noFill/>
-          <a:ln w="28575">
-            <a:solidFill>
-              <a:schemeClr val="accent6">
-                <a:lumMod val="60000"/>
-                <a:lumOff val="40000"/>
-              </a:schemeClr>
-            </a:solidFill>
-          </a:ln>
-        </p:spPr>
-        <p:style>
-          <a:lnRef idx="2">
-            <a:schemeClr val="accent1">
-              <a:shade val="15000"/>
-            </a:schemeClr>
-          </a:lnRef>
-          <a:fillRef idx="1">
-            <a:schemeClr val="accent1"/>
-          </a:fillRef>
-          <a:effectRef idx="0">
-            <a:schemeClr val="accent1"/>
-          </a:effectRef>
-          <a:fontRef idx="minor">
-            <a:schemeClr val="lt1"/>
-          </a:fontRef>
-        </p:style>
-        <p:txBody>
-          <a:bodyPr rtlCol="0" anchor="ctr"/>
-          <a:lstStyle/>
-          <a:p>
-            <a:pPr algn="ctr"/>
-            <a:endParaRPr lang="en-GB" dirty="0"/>
-          </a:p>
-        </p:txBody>
-      </p:sp>
-      <p:sp>
-        <p:nvSpPr>
-          <p:cNvPr id="25" name="Oval 24">
-            <a:extLst>
-              <a:ext uri="{FF2B5EF4-FFF2-40B4-BE49-F238E27FC236}">
-                <a16:creationId xmlns:a16="http://schemas.microsoft.com/office/drawing/2014/main" id="{B4445127-CED1-C5C9-26B9-DB6A89A6029F}"/>
-              </a:ext>
-            </a:extLst>
-          </p:cNvPr>
-          <p:cNvSpPr>
-            <a:spLocks/>
-          </p:cNvSpPr>
-          <p:nvPr/>
-        </p:nvSpPr>
-        <p:spPr>
-          <a:xfrm>
-            <a:off x="6324094" y="725098"/>
-            <a:ext cx="496558" cy="344474"/>
-          </a:xfrm>
-          <a:prstGeom prst="ellipse">
-            <a:avLst/>
-          </a:prstGeom>
-          <a:noFill/>
-          <a:ln w="28575">
-            <a:solidFill>
-              <a:schemeClr val="accent6">
-                <a:lumMod val="60000"/>
-                <a:lumOff val="40000"/>
-              </a:schemeClr>
-            </a:solidFill>
-          </a:ln>
-        </p:spPr>
-        <p:style>
-          <a:lnRef idx="2">
-            <a:schemeClr val="accent1">
-              <a:shade val="15000"/>
-            </a:schemeClr>
-          </a:lnRef>
-          <a:fillRef idx="1">
-            <a:schemeClr val="accent1"/>
-          </a:fillRef>
-          <a:effectRef idx="0">
-            <a:schemeClr val="accent1"/>
-          </a:effectRef>
-          <a:fontRef idx="minor">
-            <a:schemeClr val="lt1"/>
-          </a:fontRef>
-        </p:style>
-        <p:txBody>
-          <a:bodyPr rtlCol="0" anchor="ctr"/>
-          <a:lstStyle/>
-          <a:p>
-            <a:pPr algn="ctr"/>
-            <a:endParaRPr lang="en-GB" dirty="0"/>
-          </a:p>
-        </p:txBody>
-      </p:sp>
-      <p:sp>
-        <p:nvSpPr>
-          <p:cNvPr id="26" name="Oval 25">
-            <a:extLst>
-              <a:ext uri="{FF2B5EF4-FFF2-40B4-BE49-F238E27FC236}">
-                <a16:creationId xmlns:a16="http://schemas.microsoft.com/office/drawing/2014/main" id="{6E3E9CBC-18B8-5197-F59F-FFC657CE0712}"/>
-              </a:ext>
-            </a:extLst>
-          </p:cNvPr>
-          <p:cNvSpPr>
-            <a:spLocks/>
-          </p:cNvSpPr>
-          <p:nvPr/>
-        </p:nvSpPr>
-        <p:spPr>
-          <a:xfrm>
-            <a:off x="5179967" y="2948207"/>
-            <a:ext cx="278688" cy="271873"/>
+            <a:off x="7276222" y="2888889"/>
+            <a:ext cx="378348" cy="271873"/>
           </a:xfrm>
           <a:prstGeom prst="ellipse">
             <a:avLst/>
@@ -4745,10 +4820,10 @@
       </p:sp>
       <p:sp>
         <p:nvSpPr>
-          <p:cNvPr id="27" name="Oval 26">
-            <a:extLst>
-              <a:ext uri="{FF2B5EF4-FFF2-40B4-BE49-F238E27FC236}">
-                <a16:creationId xmlns:a16="http://schemas.microsoft.com/office/drawing/2014/main" id="{E7360B20-6C00-50BC-212D-373A7D4597C3}"/>
+          <p:cNvPr id="28" name="Oval 27">
+            <a:extLst>
+              <a:ext uri="{FF2B5EF4-FFF2-40B4-BE49-F238E27FC236}">
+                <a16:creationId xmlns:a16="http://schemas.microsoft.com/office/drawing/2014/main" id="{2ACCB6DA-3DAF-B8DB-7926-F880E7445CCC}"/>
               </a:ext>
             </a:extLst>
           </p:cNvPr>
@@ -4759,8 +4834,8 @@
         </p:nvSpPr>
         <p:spPr>
           <a:xfrm>
-            <a:off x="7276222" y="2888889"/>
-            <a:ext cx="378348" cy="271873"/>
+            <a:off x="3073168" y="5099847"/>
+            <a:ext cx="295274" cy="284615"/>
           </a:xfrm>
           <a:prstGeom prst="ellipse">
             <a:avLst/>
@@ -4802,10 +4877,10 @@
       </p:sp>
       <p:sp>
         <p:nvSpPr>
-          <p:cNvPr id="28" name="Oval 27">
-            <a:extLst>
-              <a:ext uri="{FF2B5EF4-FFF2-40B4-BE49-F238E27FC236}">
-                <a16:creationId xmlns:a16="http://schemas.microsoft.com/office/drawing/2014/main" id="{2ACCB6DA-3DAF-B8DB-7926-F880E7445CCC}"/>
+          <p:cNvPr id="29" name="Oval 28">
+            <a:extLst>
+              <a:ext uri="{FF2B5EF4-FFF2-40B4-BE49-F238E27FC236}">
+                <a16:creationId xmlns:a16="http://schemas.microsoft.com/office/drawing/2014/main" id="{71DDCFA3-54AC-575C-3C52-811DAED07281}"/>
               </a:ext>
             </a:extLst>
           </p:cNvPr>
@@ -4816,10 +4891,831 @@
         </p:nvSpPr>
         <p:spPr>
           <a:xfrm>
-            <a:off x="3073168" y="5099847"/>
-            <a:ext cx="295274" cy="284615"/>
+            <a:off x="6416952" y="1102048"/>
+            <a:ext cx="529856" cy="352993"/>
           </a:xfrm>
           <a:prstGeom prst="ellipse">
+            <a:avLst/>
+          </a:prstGeom>
+          <a:noFill/>
+          <a:ln w="28575">
+            <a:solidFill>
+              <a:srgbClr val="CD44FE"/>
+            </a:solidFill>
+          </a:ln>
+        </p:spPr>
+        <p:style>
+          <a:lnRef idx="2">
+            <a:schemeClr val="accent1">
+              <a:shade val="15000"/>
+            </a:schemeClr>
+          </a:lnRef>
+          <a:fillRef idx="1">
+            <a:schemeClr val="accent1"/>
+          </a:fillRef>
+          <a:effectRef idx="0">
+            <a:schemeClr val="accent1"/>
+          </a:effectRef>
+          <a:fontRef idx="minor">
+            <a:schemeClr val="lt1"/>
+          </a:fontRef>
+        </p:style>
+        <p:txBody>
+          <a:bodyPr rtlCol="0" anchor="ctr"/>
+          <a:lstStyle/>
+          <a:p>
+            <a:pPr algn="ctr"/>
+            <a:endParaRPr lang="en-GB" dirty="0"/>
+          </a:p>
+        </p:txBody>
+      </p:sp>
+      <p:sp>
+        <p:nvSpPr>
+          <p:cNvPr id="30" name="Oval 29">
+            <a:extLst>
+              <a:ext uri="{FF2B5EF4-FFF2-40B4-BE49-F238E27FC236}">
+                <a16:creationId xmlns:a16="http://schemas.microsoft.com/office/drawing/2014/main" id="{D7ABF877-351F-EC84-5D57-328CB61AB8B4}"/>
+              </a:ext>
+            </a:extLst>
+          </p:cNvPr>
+          <p:cNvSpPr>
+            <a:spLocks/>
+          </p:cNvSpPr>
+          <p:nvPr/>
+        </p:nvSpPr>
+        <p:spPr>
+          <a:xfrm>
+            <a:off x="8330529" y="1058300"/>
+            <a:ext cx="471342" cy="302197"/>
+          </a:xfrm>
+          <a:prstGeom prst="ellipse">
+            <a:avLst/>
+          </a:prstGeom>
+          <a:noFill/>
+          <a:ln w="28575">
+            <a:solidFill>
+              <a:srgbClr val="CD44FE"/>
+            </a:solidFill>
+          </a:ln>
+        </p:spPr>
+        <p:style>
+          <a:lnRef idx="2">
+            <a:schemeClr val="accent1">
+              <a:shade val="15000"/>
+            </a:schemeClr>
+          </a:lnRef>
+          <a:fillRef idx="1">
+            <a:schemeClr val="accent1"/>
+          </a:fillRef>
+          <a:effectRef idx="0">
+            <a:schemeClr val="accent1"/>
+          </a:effectRef>
+          <a:fontRef idx="minor">
+            <a:schemeClr val="lt1"/>
+          </a:fontRef>
+        </p:style>
+        <p:txBody>
+          <a:bodyPr rtlCol="0" anchor="ctr"/>
+          <a:lstStyle/>
+          <a:p>
+            <a:pPr algn="ctr"/>
+            <a:endParaRPr lang="en-GB" dirty="0"/>
+          </a:p>
+        </p:txBody>
+      </p:sp>
+      <p:sp>
+        <p:nvSpPr>
+          <p:cNvPr id="31" name="Oval 30">
+            <a:extLst>
+              <a:ext uri="{FF2B5EF4-FFF2-40B4-BE49-F238E27FC236}">
+                <a16:creationId xmlns:a16="http://schemas.microsoft.com/office/drawing/2014/main" id="{E4EDD481-E2C8-D4C2-F439-A2F76BE7E749}"/>
+              </a:ext>
+            </a:extLst>
+          </p:cNvPr>
+          <p:cNvSpPr>
+            <a:spLocks/>
+          </p:cNvSpPr>
+          <p:nvPr/>
+        </p:nvSpPr>
+        <p:spPr>
+          <a:xfrm>
+            <a:off x="4129191" y="3220080"/>
+            <a:ext cx="557118" cy="314389"/>
+          </a:xfrm>
+          <a:prstGeom prst="ellipse">
+            <a:avLst/>
+          </a:prstGeom>
+          <a:noFill/>
+          <a:ln w="28575">
+            <a:solidFill>
+              <a:srgbClr val="CD44FE"/>
+            </a:solidFill>
+          </a:ln>
+        </p:spPr>
+        <p:style>
+          <a:lnRef idx="2">
+            <a:schemeClr val="accent1">
+              <a:shade val="15000"/>
+            </a:schemeClr>
+          </a:lnRef>
+          <a:fillRef idx="1">
+            <a:schemeClr val="accent1"/>
+          </a:fillRef>
+          <a:effectRef idx="0">
+            <a:schemeClr val="accent1"/>
+          </a:effectRef>
+          <a:fontRef idx="minor">
+            <a:schemeClr val="lt1"/>
+          </a:fontRef>
+        </p:style>
+        <p:txBody>
+          <a:bodyPr rtlCol="0" anchor="ctr"/>
+          <a:lstStyle/>
+          <a:p>
+            <a:pPr algn="ctr"/>
+            <a:endParaRPr lang="en-GB" dirty="0"/>
+          </a:p>
+        </p:txBody>
+      </p:sp>
+      <p:sp>
+        <p:nvSpPr>
+          <p:cNvPr id="32" name="Oval 31">
+            <a:extLst>
+              <a:ext uri="{FF2B5EF4-FFF2-40B4-BE49-F238E27FC236}">
+                <a16:creationId xmlns:a16="http://schemas.microsoft.com/office/drawing/2014/main" id="{0951B07D-118B-DC02-3621-6C429B81D51A}"/>
+              </a:ext>
+            </a:extLst>
+          </p:cNvPr>
+          <p:cNvSpPr>
+            <a:spLocks/>
+          </p:cNvSpPr>
+          <p:nvPr/>
+        </p:nvSpPr>
+        <p:spPr>
+          <a:xfrm>
+            <a:off x="6276773" y="3317702"/>
+            <a:ext cx="445464" cy="298794"/>
+          </a:xfrm>
+          <a:prstGeom prst="ellipse">
+            <a:avLst/>
+          </a:prstGeom>
+          <a:noFill/>
+          <a:ln w="28575">
+            <a:solidFill>
+              <a:srgbClr val="CD44FE"/>
+            </a:solidFill>
+          </a:ln>
+        </p:spPr>
+        <p:style>
+          <a:lnRef idx="2">
+            <a:schemeClr val="accent1">
+              <a:shade val="15000"/>
+            </a:schemeClr>
+          </a:lnRef>
+          <a:fillRef idx="1">
+            <a:schemeClr val="accent1"/>
+          </a:fillRef>
+          <a:effectRef idx="0">
+            <a:schemeClr val="accent1"/>
+          </a:effectRef>
+          <a:fontRef idx="minor">
+            <a:schemeClr val="lt1"/>
+          </a:fontRef>
+        </p:style>
+        <p:txBody>
+          <a:bodyPr rtlCol="0" anchor="ctr"/>
+          <a:lstStyle/>
+          <a:p>
+            <a:pPr algn="ctr"/>
+            <a:endParaRPr lang="en-GB" dirty="0"/>
+          </a:p>
+        </p:txBody>
+      </p:sp>
+      <p:sp>
+        <p:nvSpPr>
+          <p:cNvPr id="33" name="Oval 32">
+            <a:extLst>
+              <a:ext uri="{FF2B5EF4-FFF2-40B4-BE49-F238E27FC236}">
+                <a16:creationId xmlns:a16="http://schemas.microsoft.com/office/drawing/2014/main" id="{32A1553A-5CB8-2FAA-C82A-2E152ADE83B3}"/>
+              </a:ext>
+            </a:extLst>
+          </p:cNvPr>
+          <p:cNvSpPr>
+            <a:spLocks/>
+          </p:cNvSpPr>
+          <p:nvPr/>
+        </p:nvSpPr>
+        <p:spPr>
+          <a:xfrm>
+            <a:off x="8349960" y="3249624"/>
+            <a:ext cx="461242" cy="361825"/>
+          </a:xfrm>
+          <a:prstGeom prst="ellipse">
+            <a:avLst/>
+          </a:prstGeom>
+          <a:noFill/>
+          <a:ln w="28575">
+            <a:solidFill>
+              <a:srgbClr val="CD44FE"/>
+            </a:solidFill>
+          </a:ln>
+        </p:spPr>
+        <p:style>
+          <a:lnRef idx="2">
+            <a:schemeClr val="accent1">
+              <a:shade val="15000"/>
+            </a:schemeClr>
+          </a:lnRef>
+          <a:fillRef idx="1">
+            <a:schemeClr val="accent1"/>
+          </a:fillRef>
+          <a:effectRef idx="0">
+            <a:schemeClr val="accent1"/>
+          </a:effectRef>
+          <a:fontRef idx="minor">
+            <a:schemeClr val="lt1"/>
+          </a:fontRef>
+        </p:style>
+        <p:txBody>
+          <a:bodyPr rtlCol="0" anchor="ctr"/>
+          <a:lstStyle/>
+          <a:p>
+            <a:pPr algn="ctr"/>
+            <a:endParaRPr lang="en-GB" dirty="0"/>
+          </a:p>
+        </p:txBody>
+      </p:sp>
+      <p:sp>
+        <p:nvSpPr>
+          <p:cNvPr id="34" name="Oval 33">
+            <a:extLst>
+              <a:ext uri="{FF2B5EF4-FFF2-40B4-BE49-F238E27FC236}">
+                <a16:creationId xmlns:a16="http://schemas.microsoft.com/office/drawing/2014/main" id="{AB7E6101-844D-B73A-3FE2-A95251A6229C}"/>
+              </a:ext>
+            </a:extLst>
+          </p:cNvPr>
+          <p:cNvSpPr>
+            <a:spLocks/>
+          </p:cNvSpPr>
+          <p:nvPr/>
+        </p:nvSpPr>
+        <p:spPr>
+          <a:xfrm>
+            <a:off x="4120863" y="5488198"/>
+            <a:ext cx="485464" cy="314389"/>
+          </a:xfrm>
+          <a:prstGeom prst="ellipse">
+            <a:avLst/>
+          </a:prstGeom>
+          <a:noFill/>
+          <a:ln w="28575">
+            <a:solidFill>
+              <a:srgbClr val="CD44FE"/>
+            </a:solidFill>
+          </a:ln>
+        </p:spPr>
+        <p:style>
+          <a:lnRef idx="2">
+            <a:schemeClr val="accent1">
+              <a:shade val="15000"/>
+            </a:schemeClr>
+          </a:lnRef>
+          <a:fillRef idx="1">
+            <a:schemeClr val="accent1"/>
+          </a:fillRef>
+          <a:effectRef idx="0">
+            <a:schemeClr val="accent1"/>
+          </a:effectRef>
+          <a:fontRef idx="minor">
+            <a:schemeClr val="lt1"/>
+          </a:fontRef>
+        </p:style>
+        <p:txBody>
+          <a:bodyPr rtlCol="0" anchor="ctr"/>
+          <a:lstStyle/>
+          <a:p>
+            <a:pPr algn="ctr"/>
+            <a:endParaRPr lang="en-GB" dirty="0"/>
+          </a:p>
+        </p:txBody>
+      </p:sp>
+      <p:sp>
+        <p:nvSpPr>
+          <p:cNvPr id="36" name="Oval 35">
+            <a:extLst>
+              <a:ext uri="{FF2B5EF4-FFF2-40B4-BE49-F238E27FC236}">
+                <a16:creationId xmlns:a16="http://schemas.microsoft.com/office/drawing/2014/main" id="{F39418BD-16C6-34A8-4CE9-5EB399BA8FEB}"/>
+              </a:ext>
+            </a:extLst>
+          </p:cNvPr>
+          <p:cNvSpPr>
+            <a:spLocks/>
+          </p:cNvSpPr>
+          <p:nvPr/>
+        </p:nvSpPr>
+        <p:spPr>
+          <a:xfrm>
+            <a:off x="4514978" y="678231"/>
+            <a:ext cx="396406" cy="448734"/>
+          </a:xfrm>
+          <a:prstGeom prst="ellipse">
+            <a:avLst/>
+          </a:prstGeom>
+          <a:noFill/>
+          <a:ln w="28575">
+            <a:solidFill>
+              <a:schemeClr val="accent2">
+                <a:lumMod val="50000"/>
+              </a:schemeClr>
+            </a:solidFill>
+          </a:ln>
+        </p:spPr>
+        <p:style>
+          <a:lnRef idx="2">
+            <a:schemeClr val="accent1">
+              <a:shade val="15000"/>
+            </a:schemeClr>
+          </a:lnRef>
+          <a:fillRef idx="1">
+            <a:schemeClr val="accent1"/>
+          </a:fillRef>
+          <a:effectRef idx="0">
+            <a:schemeClr val="accent1"/>
+          </a:effectRef>
+          <a:fontRef idx="minor">
+            <a:schemeClr val="lt1"/>
+          </a:fontRef>
+        </p:style>
+        <p:txBody>
+          <a:bodyPr rtlCol="0" anchor="ctr"/>
+          <a:lstStyle/>
+          <a:p>
+            <a:pPr algn="ctr"/>
+            <a:endParaRPr lang="en-GB" dirty="0"/>
+          </a:p>
+        </p:txBody>
+      </p:sp>
+      <p:sp>
+        <p:nvSpPr>
+          <p:cNvPr id="37" name="Oval 36">
+            <a:extLst>
+              <a:ext uri="{FF2B5EF4-FFF2-40B4-BE49-F238E27FC236}">
+                <a16:creationId xmlns:a16="http://schemas.microsoft.com/office/drawing/2014/main" id="{32DEA4F2-5A96-8B6A-F092-8348ACB9693D}"/>
+              </a:ext>
+            </a:extLst>
+          </p:cNvPr>
+          <p:cNvSpPr>
+            <a:spLocks/>
+          </p:cNvSpPr>
+          <p:nvPr/>
+        </p:nvSpPr>
+        <p:spPr>
+          <a:xfrm>
+            <a:off x="5908275" y="1241039"/>
+            <a:ext cx="529856" cy="417839"/>
+          </a:xfrm>
+          <a:prstGeom prst="ellipse">
+            <a:avLst/>
+          </a:prstGeom>
+          <a:noFill/>
+          <a:ln w="28575">
+            <a:solidFill>
+              <a:schemeClr val="accent2">
+                <a:lumMod val="50000"/>
+              </a:schemeClr>
+            </a:solidFill>
+          </a:ln>
+        </p:spPr>
+        <p:style>
+          <a:lnRef idx="2">
+            <a:schemeClr val="accent1">
+              <a:shade val="15000"/>
+            </a:schemeClr>
+          </a:lnRef>
+          <a:fillRef idx="1">
+            <a:schemeClr val="accent1"/>
+          </a:fillRef>
+          <a:effectRef idx="0">
+            <a:schemeClr val="accent1"/>
+          </a:effectRef>
+          <a:fontRef idx="minor">
+            <a:schemeClr val="lt1"/>
+          </a:fontRef>
+        </p:style>
+        <p:txBody>
+          <a:bodyPr rtlCol="0" anchor="ctr"/>
+          <a:lstStyle/>
+          <a:p>
+            <a:pPr algn="ctr"/>
+            <a:endParaRPr lang="en-GB" dirty="0"/>
+          </a:p>
+        </p:txBody>
+      </p:sp>
+      <p:sp>
+        <p:nvSpPr>
+          <p:cNvPr id="38" name="Oval 37">
+            <a:extLst>
+              <a:ext uri="{FF2B5EF4-FFF2-40B4-BE49-F238E27FC236}">
+                <a16:creationId xmlns:a16="http://schemas.microsoft.com/office/drawing/2014/main" id="{03142037-44AF-5CEB-5EEE-9A95390C4EA2}"/>
+              </a:ext>
+            </a:extLst>
+          </p:cNvPr>
+          <p:cNvSpPr>
+            <a:spLocks/>
+          </p:cNvSpPr>
+          <p:nvPr/>
+        </p:nvSpPr>
+        <p:spPr>
+          <a:xfrm>
+            <a:off x="7843045" y="1160281"/>
+            <a:ext cx="487484" cy="326753"/>
+          </a:xfrm>
+          <a:prstGeom prst="ellipse">
+            <a:avLst/>
+          </a:prstGeom>
+          <a:noFill/>
+          <a:ln w="28575">
+            <a:solidFill>
+              <a:schemeClr val="accent2">
+                <a:lumMod val="50000"/>
+              </a:schemeClr>
+            </a:solidFill>
+          </a:ln>
+        </p:spPr>
+        <p:style>
+          <a:lnRef idx="2">
+            <a:schemeClr val="accent1">
+              <a:shade val="15000"/>
+            </a:schemeClr>
+          </a:lnRef>
+          <a:fillRef idx="1">
+            <a:schemeClr val="accent1"/>
+          </a:fillRef>
+          <a:effectRef idx="0">
+            <a:schemeClr val="accent1"/>
+          </a:effectRef>
+          <a:fontRef idx="minor">
+            <a:schemeClr val="lt1"/>
+          </a:fontRef>
+        </p:style>
+        <p:txBody>
+          <a:bodyPr rtlCol="0" anchor="ctr"/>
+          <a:lstStyle/>
+          <a:p>
+            <a:pPr algn="ctr"/>
+            <a:endParaRPr lang="en-GB" dirty="0"/>
+          </a:p>
+        </p:txBody>
+      </p:sp>
+      <p:sp>
+        <p:nvSpPr>
+          <p:cNvPr id="39" name="Oval 38">
+            <a:extLst>
+              <a:ext uri="{FF2B5EF4-FFF2-40B4-BE49-F238E27FC236}">
+                <a16:creationId xmlns:a16="http://schemas.microsoft.com/office/drawing/2014/main" id="{24035077-D215-F368-DE1E-B905FC0E0762}"/>
+              </a:ext>
+            </a:extLst>
+          </p:cNvPr>
+          <p:cNvSpPr>
+            <a:spLocks/>
+          </p:cNvSpPr>
+          <p:nvPr/>
+        </p:nvSpPr>
+        <p:spPr>
+          <a:xfrm>
+            <a:off x="3626946" y="3334632"/>
+            <a:ext cx="557118" cy="376427"/>
+          </a:xfrm>
+          <a:prstGeom prst="ellipse">
+            <a:avLst/>
+          </a:prstGeom>
+          <a:noFill/>
+          <a:ln w="28575">
+            <a:solidFill>
+              <a:schemeClr val="accent2">
+                <a:lumMod val="50000"/>
+              </a:schemeClr>
+            </a:solidFill>
+          </a:ln>
+        </p:spPr>
+        <p:style>
+          <a:lnRef idx="2">
+            <a:schemeClr val="accent1">
+              <a:shade val="15000"/>
+            </a:schemeClr>
+          </a:lnRef>
+          <a:fillRef idx="1">
+            <a:schemeClr val="accent1"/>
+          </a:fillRef>
+          <a:effectRef idx="0">
+            <a:schemeClr val="accent1"/>
+          </a:effectRef>
+          <a:fontRef idx="minor">
+            <a:schemeClr val="lt1"/>
+          </a:fontRef>
+        </p:style>
+        <p:txBody>
+          <a:bodyPr rtlCol="0" anchor="ctr"/>
+          <a:lstStyle/>
+          <a:p>
+            <a:pPr algn="ctr"/>
+            <a:endParaRPr lang="en-GB" dirty="0"/>
+          </a:p>
+        </p:txBody>
+      </p:sp>
+      <p:sp>
+        <p:nvSpPr>
+          <p:cNvPr id="40" name="Oval 39">
+            <a:extLst>
+              <a:ext uri="{FF2B5EF4-FFF2-40B4-BE49-F238E27FC236}">
+                <a16:creationId xmlns:a16="http://schemas.microsoft.com/office/drawing/2014/main" id="{464C760A-C2DC-80F4-97C9-3E322186B65D}"/>
+              </a:ext>
+            </a:extLst>
+          </p:cNvPr>
+          <p:cNvSpPr>
+            <a:spLocks/>
+          </p:cNvSpPr>
+          <p:nvPr/>
+        </p:nvSpPr>
+        <p:spPr>
+          <a:xfrm>
+            <a:off x="5766854" y="3438447"/>
+            <a:ext cx="478161" cy="386062"/>
+          </a:xfrm>
+          <a:prstGeom prst="ellipse">
+            <a:avLst/>
+          </a:prstGeom>
+          <a:noFill/>
+          <a:ln w="28575">
+            <a:solidFill>
+              <a:schemeClr val="accent2">
+                <a:lumMod val="50000"/>
+              </a:schemeClr>
+            </a:solidFill>
+          </a:ln>
+        </p:spPr>
+        <p:style>
+          <a:lnRef idx="2">
+            <a:schemeClr val="accent1">
+              <a:shade val="15000"/>
+            </a:schemeClr>
+          </a:lnRef>
+          <a:fillRef idx="1">
+            <a:schemeClr val="accent1"/>
+          </a:fillRef>
+          <a:effectRef idx="0">
+            <a:schemeClr val="accent1"/>
+          </a:effectRef>
+          <a:fontRef idx="minor">
+            <a:schemeClr val="lt1"/>
+          </a:fontRef>
+        </p:style>
+        <p:txBody>
+          <a:bodyPr rtlCol="0" anchor="ctr"/>
+          <a:lstStyle/>
+          <a:p>
+            <a:pPr algn="ctr"/>
+            <a:endParaRPr lang="en-GB" dirty="0"/>
+          </a:p>
+        </p:txBody>
+      </p:sp>
+      <p:sp>
+        <p:nvSpPr>
+          <p:cNvPr id="41" name="Oval 40">
+            <a:extLst>
+              <a:ext uri="{FF2B5EF4-FFF2-40B4-BE49-F238E27FC236}">
+                <a16:creationId xmlns:a16="http://schemas.microsoft.com/office/drawing/2014/main" id="{CE90C148-8A30-BF7D-17F8-97C7599201DC}"/>
+              </a:ext>
+            </a:extLst>
+          </p:cNvPr>
+          <p:cNvSpPr>
+            <a:spLocks/>
+          </p:cNvSpPr>
+          <p:nvPr/>
+        </p:nvSpPr>
+        <p:spPr>
+          <a:xfrm>
+            <a:off x="7872737" y="3428999"/>
+            <a:ext cx="519859" cy="326753"/>
+          </a:xfrm>
+          <a:prstGeom prst="ellipse">
+            <a:avLst/>
+          </a:prstGeom>
+          <a:noFill/>
+          <a:ln w="28575">
+            <a:solidFill>
+              <a:schemeClr val="accent2">
+                <a:lumMod val="50000"/>
+              </a:schemeClr>
+            </a:solidFill>
+          </a:ln>
+        </p:spPr>
+        <p:style>
+          <a:lnRef idx="2">
+            <a:schemeClr val="accent1">
+              <a:shade val="15000"/>
+            </a:schemeClr>
+          </a:lnRef>
+          <a:fillRef idx="1">
+            <a:schemeClr val="accent1"/>
+          </a:fillRef>
+          <a:effectRef idx="0">
+            <a:schemeClr val="accent1"/>
+          </a:effectRef>
+          <a:fontRef idx="minor">
+            <a:schemeClr val="lt1"/>
+          </a:fontRef>
+        </p:style>
+        <p:txBody>
+          <a:bodyPr rtlCol="0" anchor="ctr"/>
+          <a:lstStyle/>
+          <a:p>
+            <a:pPr algn="ctr"/>
+            <a:endParaRPr lang="en-GB" dirty="0"/>
+          </a:p>
+        </p:txBody>
+      </p:sp>
+      <p:sp>
+        <p:nvSpPr>
+          <p:cNvPr id="42" name="Oval 41">
+            <a:extLst>
+              <a:ext uri="{FF2B5EF4-FFF2-40B4-BE49-F238E27FC236}">
+                <a16:creationId xmlns:a16="http://schemas.microsoft.com/office/drawing/2014/main" id="{838F879D-27A5-D193-045C-0FE48BF57473}"/>
+              </a:ext>
+            </a:extLst>
+          </p:cNvPr>
+          <p:cNvSpPr>
+            <a:spLocks/>
+          </p:cNvSpPr>
+          <p:nvPr/>
+        </p:nvSpPr>
+        <p:spPr>
+          <a:xfrm>
+            <a:off x="3676268" y="5612581"/>
+            <a:ext cx="485464" cy="341111"/>
+          </a:xfrm>
+          <a:prstGeom prst="ellipse">
+            <a:avLst/>
+          </a:prstGeom>
+          <a:noFill/>
+          <a:ln w="28575">
+            <a:solidFill>
+              <a:schemeClr val="accent2">
+                <a:lumMod val="50000"/>
+              </a:schemeClr>
+            </a:solidFill>
+          </a:ln>
+        </p:spPr>
+        <p:style>
+          <a:lnRef idx="2">
+            <a:schemeClr val="accent1">
+              <a:shade val="15000"/>
+            </a:schemeClr>
+          </a:lnRef>
+          <a:fillRef idx="1">
+            <a:schemeClr val="accent1"/>
+          </a:fillRef>
+          <a:effectRef idx="0">
+            <a:schemeClr val="accent1"/>
+          </a:effectRef>
+          <a:fontRef idx="minor">
+            <a:schemeClr val="lt1"/>
+          </a:fontRef>
+        </p:style>
+        <p:txBody>
+          <a:bodyPr rtlCol="0" anchor="ctr"/>
+          <a:lstStyle/>
+          <a:p>
+            <a:pPr algn="ctr"/>
+            <a:endParaRPr lang="en-GB" dirty="0"/>
+          </a:p>
+        </p:txBody>
+      </p:sp>
+      <p:sp>
+        <p:nvSpPr>
+          <p:cNvPr id="2" name="Rectangle: Rounded Corners 1">
+            <a:extLst>
+              <a:ext uri="{FF2B5EF4-FFF2-40B4-BE49-F238E27FC236}">
+                <a16:creationId xmlns:a16="http://schemas.microsoft.com/office/drawing/2014/main" id="{B58A78D6-6614-371C-61CB-759F4A781714}"/>
+              </a:ext>
+            </a:extLst>
+          </p:cNvPr>
+          <p:cNvSpPr/>
+          <p:nvPr/>
+        </p:nvSpPr>
+        <p:spPr>
+          <a:xfrm>
+            <a:off x="5186021" y="4809430"/>
+            <a:ext cx="374946" cy="1144262"/>
+          </a:xfrm>
+          <a:prstGeom prst="roundRect">
+            <a:avLst/>
+          </a:prstGeom>
+          <a:noFill/>
+          <a:ln w="28575">
+            <a:solidFill>
+              <a:schemeClr val="tx2"/>
+            </a:solidFill>
+          </a:ln>
+        </p:spPr>
+        <p:style>
+          <a:lnRef idx="2">
+            <a:schemeClr val="accent1">
+              <a:shade val="15000"/>
+            </a:schemeClr>
+          </a:lnRef>
+          <a:fillRef idx="1">
+            <a:schemeClr val="accent1"/>
+          </a:fillRef>
+          <a:effectRef idx="0">
+            <a:schemeClr val="accent1"/>
+          </a:effectRef>
+          <a:fontRef idx="minor">
+            <a:schemeClr val="lt1"/>
+          </a:fontRef>
+        </p:style>
+        <p:txBody>
+          <a:bodyPr rtlCol="0" anchor="ctr"/>
+          <a:lstStyle/>
+          <a:p>
+            <a:pPr algn="ctr"/>
+            <a:endParaRPr lang="en-GB"/>
+          </a:p>
+        </p:txBody>
+      </p:sp>
+      <p:sp>
+        <p:nvSpPr>
+          <p:cNvPr id="3" name="Rectangle: Rounded Corners 2">
+            <a:extLst>
+              <a:ext uri="{FF2B5EF4-FFF2-40B4-BE49-F238E27FC236}">
+                <a16:creationId xmlns:a16="http://schemas.microsoft.com/office/drawing/2014/main" id="{00593D88-5766-7BF9-EF61-C0A6816D42BA}"/>
+              </a:ext>
+            </a:extLst>
+          </p:cNvPr>
+          <p:cNvSpPr/>
+          <p:nvPr/>
+        </p:nvSpPr>
+        <p:spPr>
+          <a:xfrm>
+            <a:off x="5574786" y="4792208"/>
+            <a:ext cx="333488" cy="1161483"/>
+          </a:xfrm>
+          <a:prstGeom prst="roundRect">
+            <a:avLst/>
+          </a:prstGeom>
+          <a:noFill/>
+          <a:ln w="28575">
+            <a:solidFill>
+              <a:schemeClr val="accent6">
+                <a:lumMod val="60000"/>
+                <a:lumOff val="40000"/>
+              </a:schemeClr>
+            </a:solidFill>
+          </a:ln>
+        </p:spPr>
+        <p:style>
+          <a:lnRef idx="2">
+            <a:schemeClr val="accent1">
+              <a:shade val="15000"/>
+            </a:schemeClr>
+          </a:lnRef>
+          <a:fillRef idx="1">
+            <a:schemeClr val="accent1"/>
+          </a:fillRef>
+          <a:effectRef idx="0">
+            <a:schemeClr val="accent1"/>
+          </a:effectRef>
+          <a:fontRef idx="minor">
+            <a:schemeClr val="lt1"/>
+          </a:fontRef>
+        </p:style>
+        <p:txBody>
+          <a:bodyPr rtlCol="0" anchor="ctr"/>
+          <a:lstStyle/>
+          <a:p>
+            <a:pPr algn="ctr"/>
+            <a:endParaRPr lang="en-GB"/>
+          </a:p>
+        </p:txBody>
+      </p:sp>
+      <p:sp>
+        <p:nvSpPr>
+          <p:cNvPr id="44" name="Rectangle: Rounded Corners 43">
+            <a:extLst>
+              <a:ext uri="{FF2B5EF4-FFF2-40B4-BE49-F238E27FC236}">
+                <a16:creationId xmlns:a16="http://schemas.microsoft.com/office/drawing/2014/main" id="{AEE1E334-4927-D85A-EA3C-A0FE0DF65359}"/>
+              </a:ext>
+            </a:extLst>
+          </p:cNvPr>
+          <p:cNvSpPr/>
+          <p:nvPr/>
+        </p:nvSpPr>
+        <p:spPr>
+          <a:xfrm>
+            <a:off x="5908274" y="4734893"/>
+            <a:ext cx="333488" cy="1218798"/>
+          </a:xfrm>
+          <a:prstGeom prst="roundRect">
             <a:avLst/>
           </a:prstGeom>
           <a:noFill/>
@@ -4853,30 +5749,28 @@
           <a:lstStyle/>
           <a:p>
             <a:pPr algn="ctr"/>
-            <a:endParaRPr lang="en-GB" dirty="0"/>
-          </a:p>
-        </p:txBody>
-      </p:sp>
-      <p:sp>
-        <p:nvSpPr>
-          <p:cNvPr id="29" name="Oval 28">
-            <a:extLst>
-              <a:ext uri="{FF2B5EF4-FFF2-40B4-BE49-F238E27FC236}">
-                <a16:creationId xmlns:a16="http://schemas.microsoft.com/office/drawing/2014/main" id="{71DDCFA3-54AC-575C-3C52-811DAED07281}"/>
-              </a:ext>
-            </a:extLst>
-          </p:cNvPr>
-          <p:cNvSpPr>
-            <a:spLocks/>
-          </p:cNvSpPr>
+            <a:endParaRPr lang="en-GB"/>
+          </a:p>
+        </p:txBody>
+      </p:sp>
+      <p:sp>
+        <p:nvSpPr>
+          <p:cNvPr id="46" name="Rectangle: Rounded Corners 45">
+            <a:extLst>
+              <a:ext uri="{FF2B5EF4-FFF2-40B4-BE49-F238E27FC236}">
+                <a16:creationId xmlns:a16="http://schemas.microsoft.com/office/drawing/2014/main" id="{4066D44D-1610-C6EE-146E-5781766F0013}"/>
+              </a:ext>
+            </a:extLst>
+          </p:cNvPr>
+          <p:cNvSpPr/>
           <p:nvPr/>
         </p:nvSpPr>
         <p:spPr>
           <a:xfrm>
-            <a:off x="6416952" y="1102048"/>
-            <a:ext cx="529856" cy="352993"/>
-          </a:xfrm>
-          <a:prstGeom prst="ellipse">
+            <a:off x="6241762" y="4734893"/>
+            <a:ext cx="368499" cy="1238582"/>
+          </a:xfrm>
+          <a:prstGeom prst="roundRect">
             <a:avLst/>
           </a:prstGeom>
           <a:noFill/>
@@ -4907,354 +5801,28 @@
           <a:lstStyle/>
           <a:p>
             <a:pPr algn="ctr"/>
-            <a:endParaRPr lang="en-GB" dirty="0"/>
-          </a:p>
-        </p:txBody>
-      </p:sp>
-      <p:sp>
-        <p:nvSpPr>
-          <p:cNvPr id="30" name="Oval 29">
-            <a:extLst>
-              <a:ext uri="{FF2B5EF4-FFF2-40B4-BE49-F238E27FC236}">
-                <a16:creationId xmlns:a16="http://schemas.microsoft.com/office/drawing/2014/main" id="{D7ABF877-351F-EC84-5D57-328CB61AB8B4}"/>
-              </a:ext>
-            </a:extLst>
-          </p:cNvPr>
-          <p:cNvSpPr>
-            <a:spLocks/>
-          </p:cNvSpPr>
+            <a:endParaRPr lang="en-GB"/>
+          </a:p>
+        </p:txBody>
+      </p:sp>
+      <p:sp>
+        <p:nvSpPr>
+          <p:cNvPr id="47" name="Rectangle: Rounded Corners 46">
+            <a:extLst>
+              <a:ext uri="{FF2B5EF4-FFF2-40B4-BE49-F238E27FC236}">
+                <a16:creationId xmlns:a16="http://schemas.microsoft.com/office/drawing/2014/main" id="{35D541F5-85E5-E2D0-0E91-DF0AC98AC51A}"/>
+              </a:ext>
+            </a:extLst>
+          </p:cNvPr>
+          <p:cNvSpPr/>
           <p:nvPr/>
         </p:nvSpPr>
         <p:spPr>
           <a:xfrm>
-            <a:off x="8330529" y="1058300"/>
-            <a:ext cx="471342" cy="302197"/>
-          </a:xfrm>
-          <a:prstGeom prst="ellipse">
-            <a:avLst/>
-          </a:prstGeom>
-          <a:noFill/>
-          <a:ln w="28575">
-            <a:solidFill>
-              <a:srgbClr val="CD44FE"/>
-            </a:solidFill>
-          </a:ln>
-        </p:spPr>
-        <p:style>
-          <a:lnRef idx="2">
-            <a:schemeClr val="accent1">
-              <a:shade val="15000"/>
-            </a:schemeClr>
-          </a:lnRef>
-          <a:fillRef idx="1">
-            <a:schemeClr val="accent1"/>
-          </a:fillRef>
-          <a:effectRef idx="0">
-            <a:schemeClr val="accent1"/>
-          </a:effectRef>
-          <a:fontRef idx="minor">
-            <a:schemeClr val="lt1"/>
-          </a:fontRef>
-        </p:style>
-        <p:txBody>
-          <a:bodyPr rtlCol="0" anchor="ctr"/>
-          <a:lstStyle/>
-          <a:p>
-            <a:pPr algn="ctr"/>
-            <a:endParaRPr lang="en-GB" dirty="0"/>
-          </a:p>
-        </p:txBody>
-      </p:sp>
-      <p:sp>
-        <p:nvSpPr>
-          <p:cNvPr id="31" name="Oval 30">
-            <a:extLst>
-              <a:ext uri="{FF2B5EF4-FFF2-40B4-BE49-F238E27FC236}">
-                <a16:creationId xmlns:a16="http://schemas.microsoft.com/office/drawing/2014/main" id="{E4EDD481-E2C8-D4C2-F439-A2F76BE7E749}"/>
-              </a:ext>
-            </a:extLst>
-          </p:cNvPr>
-          <p:cNvSpPr>
-            <a:spLocks/>
-          </p:cNvSpPr>
-          <p:nvPr/>
-        </p:nvSpPr>
-        <p:spPr>
-          <a:xfrm>
-            <a:off x="4129191" y="3220080"/>
-            <a:ext cx="557118" cy="314389"/>
-          </a:xfrm>
-          <a:prstGeom prst="ellipse">
-            <a:avLst/>
-          </a:prstGeom>
-          <a:noFill/>
-          <a:ln w="28575">
-            <a:solidFill>
-              <a:srgbClr val="CD44FE"/>
-            </a:solidFill>
-          </a:ln>
-        </p:spPr>
-        <p:style>
-          <a:lnRef idx="2">
-            <a:schemeClr val="accent1">
-              <a:shade val="15000"/>
-            </a:schemeClr>
-          </a:lnRef>
-          <a:fillRef idx="1">
-            <a:schemeClr val="accent1"/>
-          </a:fillRef>
-          <a:effectRef idx="0">
-            <a:schemeClr val="accent1"/>
-          </a:effectRef>
-          <a:fontRef idx="minor">
-            <a:schemeClr val="lt1"/>
-          </a:fontRef>
-        </p:style>
-        <p:txBody>
-          <a:bodyPr rtlCol="0" anchor="ctr"/>
-          <a:lstStyle/>
-          <a:p>
-            <a:pPr algn="ctr"/>
-            <a:endParaRPr lang="en-GB" dirty="0"/>
-          </a:p>
-        </p:txBody>
-      </p:sp>
-      <p:sp>
-        <p:nvSpPr>
-          <p:cNvPr id="32" name="Oval 31">
-            <a:extLst>
-              <a:ext uri="{FF2B5EF4-FFF2-40B4-BE49-F238E27FC236}">
-                <a16:creationId xmlns:a16="http://schemas.microsoft.com/office/drawing/2014/main" id="{0951B07D-118B-DC02-3621-6C429B81D51A}"/>
-              </a:ext>
-            </a:extLst>
-          </p:cNvPr>
-          <p:cNvSpPr>
-            <a:spLocks/>
-          </p:cNvSpPr>
-          <p:nvPr/>
-        </p:nvSpPr>
-        <p:spPr>
-          <a:xfrm>
-            <a:off x="6276773" y="3317702"/>
-            <a:ext cx="445464" cy="298794"/>
-          </a:xfrm>
-          <a:prstGeom prst="ellipse">
-            <a:avLst/>
-          </a:prstGeom>
-          <a:noFill/>
-          <a:ln w="28575">
-            <a:solidFill>
-              <a:srgbClr val="CD44FE"/>
-            </a:solidFill>
-          </a:ln>
-        </p:spPr>
-        <p:style>
-          <a:lnRef idx="2">
-            <a:schemeClr val="accent1">
-              <a:shade val="15000"/>
-            </a:schemeClr>
-          </a:lnRef>
-          <a:fillRef idx="1">
-            <a:schemeClr val="accent1"/>
-          </a:fillRef>
-          <a:effectRef idx="0">
-            <a:schemeClr val="accent1"/>
-          </a:effectRef>
-          <a:fontRef idx="minor">
-            <a:schemeClr val="lt1"/>
-          </a:fontRef>
-        </p:style>
-        <p:txBody>
-          <a:bodyPr rtlCol="0" anchor="ctr"/>
-          <a:lstStyle/>
-          <a:p>
-            <a:pPr algn="ctr"/>
-            <a:endParaRPr lang="en-GB" dirty="0"/>
-          </a:p>
-        </p:txBody>
-      </p:sp>
-      <p:sp>
-        <p:nvSpPr>
-          <p:cNvPr id="33" name="Oval 32">
-            <a:extLst>
-              <a:ext uri="{FF2B5EF4-FFF2-40B4-BE49-F238E27FC236}">
-                <a16:creationId xmlns:a16="http://schemas.microsoft.com/office/drawing/2014/main" id="{32A1553A-5CB8-2FAA-C82A-2E152ADE83B3}"/>
-              </a:ext>
-            </a:extLst>
-          </p:cNvPr>
-          <p:cNvSpPr>
-            <a:spLocks/>
-          </p:cNvSpPr>
-          <p:nvPr/>
-        </p:nvSpPr>
-        <p:spPr>
-          <a:xfrm>
-            <a:off x="8349960" y="3249624"/>
-            <a:ext cx="461242" cy="361825"/>
-          </a:xfrm>
-          <a:prstGeom prst="ellipse">
-            <a:avLst/>
-          </a:prstGeom>
-          <a:noFill/>
-          <a:ln w="28575">
-            <a:solidFill>
-              <a:srgbClr val="CD44FE"/>
-            </a:solidFill>
-          </a:ln>
-        </p:spPr>
-        <p:style>
-          <a:lnRef idx="2">
-            <a:schemeClr val="accent1">
-              <a:shade val="15000"/>
-            </a:schemeClr>
-          </a:lnRef>
-          <a:fillRef idx="1">
-            <a:schemeClr val="accent1"/>
-          </a:fillRef>
-          <a:effectRef idx="0">
-            <a:schemeClr val="accent1"/>
-          </a:effectRef>
-          <a:fontRef idx="minor">
-            <a:schemeClr val="lt1"/>
-          </a:fontRef>
-        </p:style>
-        <p:txBody>
-          <a:bodyPr rtlCol="0" anchor="ctr"/>
-          <a:lstStyle/>
-          <a:p>
-            <a:pPr algn="ctr"/>
-            <a:endParaRPr lang="en-GB" dirty="0"/>
-          </a:p>
-        </p:txBody>
-      </p:sp>
-      <p:sp>
-        <p:nvSpPr>
-          <p:cNvPr id="34" name="Oval 33">
-            <a:extLst>
-              <a:ext uri="{FF2B5EF4-FFF2-40B4-BE49-F238E27FC236}">
-                <a16:creationId xmlns:a16="http://schemas.microsoft.com/office/drawing/2014/main" id="{AB7E6101-844D-B73A-3FE2-A95251A6229C}"/>
-              </a:ext>
-            </a:extLst>
-          </p:cNvPr>
-          <p:cNvSpPr>
-            <a:spLocks/>
-          </p:cNvSpPr>
-          <p:nvPr/>
-        </p:nvSpPr>
-        <p:spPr>
-          <a:xfrm>
-            <a:off x="4120863" y="5488198"/>
-            <a:ext cx="485464" cy="314389"/>
-          </a:xfrm>
-          <a:prstGeom prst="ellipse">
-            <a:avLst/>
-          </a:prstGeom>
-          <a:noFill/>
-          <a:ln w="28575">
-            <a:solidFill>
-              <a:srgbClr val="CD44FE"/>
-            </a:solidFill>
-          </a:ln>
-        </p:spPr>
-        <p:style>
-          <a:lnRef idx="2">
-            <a:schemeClr val="accent1">
-              <a:shade val="15000"/>
-            </a:schemeClr>
-          </a:lnRef>
-          <a:fillRef idx="1">
-            <a:schemeClr val="accent1"/>
-          </a:fillRef>
-          <a:effectRef idx="0">
-            <a:schemeClr val="accent1"/>
-          </a:effectRef>
-          <a:fontRef idx="minor">
-            <a:schemeClr val="lt1"/>
-          </a:fontRef>
-        </p:style>
-        <p:txBody>
-          <a:bodyPr rtlCol="0" anchor="ctr"/>
-          <a:lstStyle/>
-          <a:p>
-            <a:pPr algn="ctr"/>
-            <a:endParaRPr lang="en-GB" dirty="0"/>
-          </a:p>
-        </p:txBody>
-      </p:sp>
-      <p:sp>
-        <p:nvSpPr>
-          <p:cNvPr id="35" name="Oval 34">
-            <a:extLst>
-              <a:ext uri="{FF2B5EF4-FFF2-40B4-BE49-F238E27FC236}">
-                <a16:creationId xmlns:a16="http://schemas.microsoft.com/office/drawing/2014/main" id="{BC245D75-A14F-69E9-7F25-47DC98B219FA}"/>
-              </a:ext>
-            </a:extLst>
-          </p:cNvPr>
-          <p:cNvSpPr>
-            <a:spLocks/>
-          </p:cNvSpPr>
-          <p:nvPr/>
-        </p:nvSpPr>
-        <p:spPr>
-          <a:xfrm>
-            <a:off x="6207020" y="5864624"/>
-            <a:ext cx="327004" cy="268278"/>
-          </a:xfrm>
-          <a:prstGeom prst="ellipse">
-            <a:avLst/>
-          </a:prstGeom>
-          <a:noFill/>
-          <a:ln w="28575">
-            <a:solidFill>
-              <a:srgbClr val="CD44FE"/>
-            </a:solidFill>
-          </a:ln>
-        </p:spPr>
-        <p:style>
-          <a:lnRef idx="2">
-            <a:schemeClr val="accent1">
-              <a:shade val="15000"/>
-            </a:schemeClr>
-          </a:lnRef>
-          <a:fillRef idx="1">
-            <a:schemeClr val="accent1"/>
-          </a:fillRef>
-          <a:effectRef idx="0">
-            <a:schemeClr val="accent1"/>
-          </a:effectRef>
-          <a:fontRef idx="minor">
-            <a:schemeClr val="lt1"/>
-          </a:fontRef>
-        </p:style>
-        <p:txBody>
-          <a:bodyPr rtlCol="0" anchor="ctr"/>
-          <a:lstStyle/>
-          <a:p>
-            <a:pPr algn="ctr"/>
-            <a:endParaRPr lang="en-GB" dirty="0"/>
-          </a:p>
-        </p:txBody>
-      </p:sp>
-      <p:sp>
-        <p:nvSpPr>
-          <p:cNvPr id="36" name="Oval 35">
-            <a:extLst>
-              <a:ext uri="{FF2B5EF4-FFF2-40B4-BE49-F238E27FC236}">
-                <a16:creationId xmlns:a16="http://schemas.microsoft.com/office/drawing/2014/main" id="{F39418BD-16C6-34A8-4CE9-5EB399BA8FEB}"/>
-              </a:ext>
-            </a:extLst>
-          </p:cNvPr>
-          <p:cNvSpPr>
-            <a:spLocks/>
-          </p:cNvSpPr>
-          <p:nvPr/>
-        </p:nvSpPr>
-        <p:spPr>
-          <a:xfrm>
-            <a:off x="4354266" y="709125"/>
-            <a:ext cx="557118" cy="417839"/>
-          </a:xfrm>
-          <a:prstGeom prst="ellipse">
+            <a:off x="6649081" y="4754677"/>
+            <a:ext cx="386352" cy="1218798"/>
+          </a:xfrm>
+          <a:prstGeom prst="roundRect">
             <a:avLst/>
           </a:prstGeom>
           <a:noFill/>
@@ -5287,39 +5855,33 @@
           <a:lstStyle/>
           <a:p>
             <a:pPr algn="ctr"/>
-            <a:endParaRPr lang="en-GB" dirty="0"/>
-          </a:p>
-        </p:txBody>
-      </p:sp>
-      <p:sp>
-        <p:nvSpPr>
-          <p:cNvPr id="37" name="Oval 36">
-            <a:extLst>
-              <a:ext uri="{FF2B5EF4-FFF2-40B4-BE49-F238E27FC236}">
-                <a16:creationId xmlns:a16="http://schemas.microsoft.com/office/drawing/2014/main" id="{32DEA4F2-5A96-8B6A-F092-8348ACB9693D}"/>
-              </a:ext>
-            </a:extLst>
-          </p:cNvPr>
-          <p:cNvSpPr>
-            <a:spLocks/>
-          </p:cNvSpPr>
+            <a:endParaRPr lang="en-GB"/>
+          </a:p>
+        </p:txBody>
+      </p:sp>
+      <p:sp>
+        <p:nvSpPr>
+          <p:cNvPr id="48" name="Rectangle 47">
+            <a:extLst>
+              <a:ext uri="{FF2B5EF4-FFF2-40B4-BE49-F238E27FC236}">
+                <a16:creationId xmlns:a16="http://schemas.microsoft.com/office/drawing/2014/main" id="{37D5C036-C703-2256-271C-990636ED0D34}"/>
+              </a:ext>
+            </a:extLst>
+          </p:cNvPr>
+          <p:cNvSpPr/>
           <p:nvPr/>
         </p:nvSpPr>
         <p:spPr>
           <a:xfrm>
-            <a:off x="5908275" y="1241039"/>
-            <a:ext cx="529856" cy="417839"/>
-          </a:xfrm>
-          <a:prstGeom prst="ellipse">
+            <a:off x="5673893" y="4546160"/>
+            <a:ext cx="844214" cy="168949"/>
+          </a:xfrm>
+          <a:prstGeom prst="rect">
             <a:avLst/>
           </a:prstGeom>
           <a:noFill/>
-          <a:ln w="28575">
-            <a:solidFill>
-              <a:schemeClr val="accent2">
-                <a:lumMod val="50000"/>
-              </a:schemeClr>
-            </a:solidFill>
+          <a:ln>
+            <a:noFill/>
           </a:ln>
         </p:spPr>
         <p:style>
@@ -5343,39 +5905,40 @@
           <a:lstStyle/>
           <a:p>
             <a:pPr algn="ctr"/>
-            <a:endParaRPr lang="en-GB" dirty="0"/>
-          </a:p>
-        </p:txBody>
-      </p:sp>
-      <p:sp>
-        <p:nvSpPr>
-          <p:cNvPr id="38" name="Oval 37">
-            <a:extLst>
-              <a:ext uri="{FF2B5EF4-FFF2-40B4-BE49-F238E27FC236}">
-                <a16:creationId xmlns:a16="http://schemas.microsoft.com/office/drawing/2014/main" id="{03142037-44AF-5CEB-5EEE-9A95390C4EA2}"/>
-              </a:ext>
-            </a:extLst>
-          </p:cNvPr>
-          <p:cNvSpPr>
-            <a:spLocks/>
-          </p:cNvSpPr>
+            <a:r>
+              <a:rPr lang="nb-NO" sz="1000" b="1" noProof="1">
+                <a:solidFill>
+                  <a:schemeClr val="tx1"/>
+                </a:solidFill>
+              </a:rPr>
+              <a:t>Facing Arc</a:t>
+            </a:r>
+          </a:p>
+        </p:txBody>
+      </p:sp>
+      <p:sp>
+        <p:nvSpPr>
+          <p:cNvPr id="49" name="Rectangle 48">
+            <a:extLst>
+              <a:ext uri="{FF2B5EF4-FFF2-40B4-BE49-F238E27FC236}">
+                <a16:creationId xmlns:a16="http://schemas.microsoft.com/office/drawing/2014/main" id="{F4387C63-6ABA-C665-6CAC-7BF94862E8FA}"/>
+              </a:ext>
+            </a:extLst>
+          </p:cNvPr>
+          <p:cNvSpPr/>
           <p:nvPr/>
         </p:nvSpPr>
         <p:spPr>
           <a:xfrm>
-            <a:off x="7843045" y="1160281"/>
-            <a:ext cx="487484" cy="326753"/>
-          </a:xfrm>
-          <a:prstGeom prst="ellipse">
+            <a:off x="5574786" y="6206718"/>
+            <a:ext cx="1069326" cy="225851"/>
+          </a:xfrm>
+          <a:prstGeom prst="rect">
             <a:avLst/>
           </a:prstGeom>
           <a:noFill/>
-          <a:ln w="28575">
-            <a:solidFill>
-              <a:schemeClr val="accent2">
-                <a:lumMod val="50000"/>
-              </a:schemeClr>
-            </a:solidFill>
+          <a:ln>
+            <a:noFill/>
           </a:ln>
         </p:spPr>
         <p:style>
@@ -5399,287 +5962,14 @@
           <a:lstStyle/>
           <a:p>
             <a:pPr algn="ctr"/>
-            <a:endParaRPr lang="en-GB" dirty="0"/>
-          </a:p>
-        </p:txBody>
-      </p:sp>
-      <p:sp>
-        <p:nvSpPr>
-          <p:cNvPr id="39" name="Oval 38">
-            <a:extLst>
-              <a:ext uri="{FF2B5EF4-FFF2-40B4-BE49-F238E27FC236}">
-                <a16:creationId xmlns:a16="http://schemas.microsoft.com/office/drawing/2014/main" id="{24035077-D215-F368-DE1E-B905FC0E0762}"/>
-              </a:ext>
-            </a:extLst>
-          </p:cNvPr>
-          <p:cNvSpPr>
-            <a:spLocks/>
-          </p:cNvSpPr>
-          <p:nvPr/>
-        </p:nvSpPr>
-        <p:spPr>
-          <a:xfrm>
-            <a:off x="3626946" y="3334632"/>
-            <a:ext cx="557118" cy="376427"/>
-          </a:xfrm>
-          <a:prstGeom prst="ellipse">
-            <a:avLst/>
-          </a:prstGeom>
-          <a:noFill/>
-          <a:ln w="28575">
-            <a:solidFill>
-              <a:schemeClr val="accent2">
-                <a:lumMod val="50000"/>
-              </a:schemeClr>
-            </a:solidFill>
-          </a:ln>
-        </p:spPr>
-        <p:style>
-          <a:lnRef idx="2">
-            <a:schemeClr val="accent1">
-              <a:shade val="15000"/>
-            </a:schemeClr>
-          </a:lnRef>
-          <a:fillRef idx="1">
-            <a:schemeClr val="accent1"/>
-          </a:fillRef>
-          <a:effectRef idx="0">
-            <a:schemeClr val="accent1"/>
-          </a:effectRef>
-          <a:fontRef idx="minor">
-            <a:schemeClr val="lt1"/>
-          </a:fontRef>
-        </p:style>
-        <p:txBody>
-          <a:bodyPr rtlCol="0" anchor="ctr"/>
-          <a:lstStyle/>
-          <a:p>
-            <a:pPr algn="ctr"/>
-            <a:endParaRPr lang="en-GB" dirty="0"/>
-          </a:p>
-        </p:txBody>
-      </p:sp>
-      <p:sp>
-        <p:nvSpPr>
-          <p:cNvPr id="40" name="Oval 39">
-            <a:extLst>
-              <a:ext uri="{FF2B5EF4-FFF2-40B4-BE49-F238E27FC236}">
-                <a16:creationId xmlns:a16="http://schemas.microsoft.com/office/drawing/2014/main" id="{464C760A-C2DC-80F4-97C9-3E322186B65D}"/>
-              </a:ext>
-            </a:extLst>
-          </p:cNvPr>
-          <p:cNvSpPr>
-            <a:spLocks/>
-          </p:cNvSpPr>
-          <p:nvPr/>
-        </p:nvSpPr>
-        <p:spPr>
-          <a:xfrm>
-            <a:off x="5766854" y="3438447"/>
-            <a:ext cx="478161" cy="386062"/>
-          </a:xfrm>
-          <a:prstGeom prst="ellipse">
-            <a:avLst/>
-          </a:prstGeom>
-          <a:noFill/>
-          <a:ln w="28575">
-            <a:solidFill>
-              <a:schemeClr val="accent2">
-                <a:lumMod val="50000"/>
-              </a:schemeClr>
-            </a:solidFill>
-          </a:ln>
-        </p:spPr>
-        <p:style>
-          <a:lnRef idx="2">
-            <a:schemeClr val="accent1">
-              <a:shade val="15000"/>
-            </a:schemeClr>
-          </a:lnRef>
-          <a:fillRef idx="1">
-            <a:schemeClr val="accent1"/>
-          </a:fillRef>
-          <a:effectRef idx="0">
-            <a:schemeClr val="accent1"/>
-          </a:effectRef>
-          <a:fontRef idx="minor">
-            <a:schemeClr val="lt1"/>
-          </a:fontRef>
-        </p:style>
-        <p:txBody>
-          <a:bodyPr rtlCol="0" anchor="ctr"/>
-          <a:lstStyle/>
-          <a:p>
-            <a:pPr algn="ctr"/>
-            <a:endParaRPr lang="en-GB" dirty="0"/>
-          </a:p>
-        </p:txBody>
-      </p:sp>
-      <p:sp>
-        <p:nvSpPr>
-          <p:cNvPr id="41" name="Oval 40">
-            <a:extLst>
-              <a:ext uri="{FF2B5EF4-FFF2-40B4-BE49-F238E27FC236}">
-                <a16:creationId xmlns:a16="http://schemas.microsoft.com/office/drawing/2014/main" id="{CE90C148-8A30-BF7D-17F8-97C7599201DC}"/>
-              </a:ext>
-            </a:extLst>
-          </p:cNvPr>
-          <p:cNvSpPr>
-            <a:spLocks/>
-          </p:cNvSpPr>
-          <p:nvPr/>
-        </p:nvSpPr>
-        <p:spPr>
-          <a:xfrm>
-            <a:off x="7872737" y="3428999"/>
-            <a:ext cx="519859" cy="326753"/>
-          </a:xfrm>
-          <a:prstGeom prst="ellipse">
-            <a:avLst/>
-          </a:prstGeom>
-          <a:noFill/>
-          <a:ln w="28575">
-            <a:solidFill>
-              <a:schemeClr val="accent2">
-                <a:lumMod val="50000"/>
-              </a:schemeClr>
-            </a:solidFill>
-          </a:ln>
-        </p:spPr>
-        <p:style>
-          <a:lnRef idx="2">
-            <a:schemeClr val="accent1">
-              <a:shade val="15000"/>
-            </a:schemeClr>
-          </a:lnRef>
-          <a:fillRef idx="1">
-            <a:schemeClr val="accent1"/>
-          </a:fillRef>
-          <a:effectRef idx="0">
-            <a:schemeClr val="accent1"/>
-          </a:effectRef>
-          <a:fontRef idx="minor">
-            <a:schemeClr val="lt1"/>
-          </a:fontRef>
-        </p:style>
-        <p:txBody>
-          <a:bodyPr rtlCol="0" anchor="ctr"/>
-          <a:lstStyle/>
-          <a:p>
-            <a:pPr algn="ctr"/>
-            <a:endParaRPr lang="en-GB" dirty="0"/>
-          </a:p>
-        </p:txBody>
-      </p:sp>
-      <p:sp>
-        <p:nvSpPr>
-          <p:cNvPr id="42" name="Oval 41">
-            <a:extLst>
-              <a:ext uri="{FF2B5EF4-FFF2-40B4-BE49-F238E27FC236}">
-                <a16:creationId xmlns:a16="http://schemas.microsoft.com/office/drawing/2014/main" id="{838F879D-27A5-D193-045C-0FE48BF57473}"/>
-              </a:ext>
-            </a:extLst>
-          </p:cNvPr>
-          <p:cNvSpPr>
-            <a:spLocks/>
-          </p:cNvSpPr>
-          <p:nvPr/>
-        </p:nvSpPr>
-        <p:spPr>
-          <a:xfrm>
-            <a:off x="3676268" y="5612581"/>
-            <a:ext cx="485464" cy="341111"/>
-          </a:xfrm>
-          <a:prstGeom prst="ellipse">
-            <a:avLst/>
-          </a:prstGeom>
-          <a:noFill/>
-          <a:ln w="28575">
-            <a:solidFill>
-              <a:schemeClr val="accent2">
-                <a:lumMod val="50000"/>
-              </a:schemeClr>
-            </a:solidFill>
-          </a:ln>
-        </p:spPr>
-        <p:style>
-          <a:lnRef idx="2">
-            <a:schemeClr val="accent1">
-              <a:shade val="15000"/>
-            </a:schemeClr>
-          </a:lnRef>
-          <a:fillRef idx="1">
-            <a:schemeClr val="accent1"/>
-          </a:fillRef>
-          <a:effectRef idx="0">
-            <a:schemeClr val="accent1"/>
-          </a:effectRef>
-          <a:fontRef idx="minor">
-            <a:schemeClr val="lt1"/>
-          </a:fontRef>
-        </p:style>
-        <p:txBody>
-          <a:bodyPr rtlCol="0" anchor="ctr"/>
-          <a:lstStyle/>
-          <a:p>
-            <a:pPr algn="ctr"/>
-            <a:endParaRPr lang="en-GB" dirty="0"/>
-          </a:p>
-        </p:txBody>
-      </p:sp>
-      <p:sp>
-        <p:nvSpPr>
-          <p:cNvPr id="43" name="Oval 42">
-            <a:extLst>
-              <a:ext uri="{FF2B5EF4-FFF2-40B4-BE49-F238E27FC236}">
-                <a16:creationId xmlns:a16="http://schemas.microsoft.com/office/drawing/2014/main" id="{3260557B-82C6-EE22-746A-9EF9FED4B63D}"/>
-              </a:ext>
-            </a:extLst>
-          </p:cNvPr>
-          <p:cNvSpPr>
-            <a:spLocks/>
-          </p:cNvSpPr>
-          <p:nvPr/>
-        </p:nvSpPr>
-        <p:spPr>
-          <a:xfrm>
-            <a:off x="6754932" y="5279457"/>
-            <a:ext cx="245375" cy="268278"/>
-          </a:xfrm>
-          <a:prstGeom prst="ellipse">
-            <a:avLst/>
-          </a:prstGeom>
-          <a:noFill/>
-          <a:ln w="28575">
-            <a:solidFill>
-              <a:schemeClr val="accent2">
-                <a:lumMod val="50000"/>
-              </a:schemeClr>
-            </a:solidFill>
-          </a:ln>
-        </p:spPr>
-        <p:style>
-          <a:lnRef idx="2">
-            <a:schemeClr val="accent1">
-              <a:shade val="15000"/>
-            </a:schemeClr>
-          </a:lnRef>
-          <a:fillRef idx="1">
-            <a:schemeClr val="accent1"/>
-          </a:fillRef>
-          <a:effectRef idx="0">
-            <a:schemeClr val="accent1"/>
-          </a:effectRef>
-          <a:fontRef idx="minor">
-            <a:schemeClr val="lt1"/>
-          </a:fontRef>
-        </p:style>
-        <p:txBody>
-          <a:bodyPr rtlCol="0" anchor="ctr"/>
-          <a:lstStyle/>
-          <a:p>
-            <a:pPr algn="ctr"/>
-            <a:endParaRPr lang="en-GB" dirty="0"/>
+            <a:r>
+              <a:rPr lang="nb-NO" sz="1000" b="1" noProof="1">
+                <a:solidFill>
+                  <a:schemeClr val="tx1"/>
+                </a:solidFill>
+              </a:rPr>
+              <a:t>Facing Crucible</a:t>
+            </a:r>
           </a:p>
         </p:txBody>
       </p:sp>

</xml_diff>

<commit_message>
redid commits to avoided push error
</commit_message>
<xml_diff>
--- a/RHEA MEng figures.pptx
+++ b/RHEA MEng figures.pptx
@@ -105,7 +105,193 @@
       </a:defRPr>
     </a:lvl9pPr>
   </p:defaultTextStyle>
+  <p:extLst>
+    <p:ext uri="{EFAFB233-063F-42B5-8137-9DF3F51BA10A}">
+      <p15:sldGuideLst xmlns:p15="http://schemas.microsoft.com/office/powerpoint/2012/main"/>
+    </p:ext>
+  </p:extLst>
 </p:presentation>
+</file>
+
+<file path=ppt/revisionInfo.xml><?xml version="1.0" encoding="utf-8"?>
+<p1510:revInfo xmlns:a="http://schemas.openxmlformats.org/drawingml/2006/main" xmlns:r="http://schemas.openxmlformats.org/officeDocument/2006/relationships" xmlns:p1510="http://schemas.microsoft.com/office/powerpoint/2015/10/main">
+  <p1510:revLst>
+    <p1510:client id="{C3423E57-CB60-4E1D-A614-F6132850FFBA}" v="8" dt="2023-10-17T19:06:33.141"/>
+  </p1510:revLst>
+</p1510:revInfo>
+</file>
+
+<file path=ppt/changesInfos/changesInfo1.xml><?xml version="1.0" encoding="utf-8"?>
+<pc:chgInfo xmlns:a="http://schemas.openxmlformats.org/drawingml/2006/main" xmlns:r="http://schemas.openxmlformats.org/officeDocument/2006/relationships" xmlns:ac="http://schemas.microsoft.com/office/drawing/2013/main/command" xmlns:pc="http://schemas.microsoft.com/office/powerpoint/2013/main/command">
+  <pc:docChgLst>
+    <pc:chgData name="Bjerkhaug, Sigurd" userId="6a5b5c75-6033-4fdb-a144-562842efa264" providerId="ADAL" clId="{C3423E57-CB60-4E1D-A614-F6132850FFBA}"/>
+    <pc:docChg chg="undo custSel modSld">
+      <pc:chgData name="Bjerkhaug, Sigurd" userId="6a5b5c75-6033-4fdb-a144-562842efa264" providerId="ADAL" clId="{C3423E57-CB60-4E1D-A614-F6132850FFBA}" dt="2023-10-17T19:06:54.622" v="93" actId="1076"/>
+      <pc:docMkLst>
+        <pc:docMk/>
+      </pc:docMkLst>
+      <pc:sldChg chg="addSp delSp modSp mod">
+        <pc:chgData name="Bjerkhaug, Sigurd" userId="6a5b5c75-6033-4fdb-a144-562842efa264" providerId="ADAL" clId="{C3423E57-CB60-4E1D-A614-F6132850FFBA}" dt="2023-10-17T19:06:54.622" v="93" actId="1076"/>
+        <pc:sldMkLst>
+          <pc:docMk/>
+          <pc:sldMk cId="2369882187" sldId="257"/>
+        </pc:sldMkLst>
+        <pc:spChg chg="add mod">
+          <ac:chgData name="Bjerkhaug, Sigurd" userId="6a5b5c75-6033-4fdb-a144-562842efa264" providerId="ADAL" clId="{C3423E57-CB60-4E1D-A614-F6132850FFBA}" dt="2023-10-17T19:03:22.798" v="27" actId="14100"/>
+          <ac:spMkLst>
+            <pc:docMk/>
+            <pc:sldMk cId="2369882187" sldId="257"/>
+            <ac:spMk id="2" creationId="{B58A78D6-6614-371C-61CB-759F4A781714}"/>
+          </ac:spMkLst>
+        </pc:spChg>
+        <pc:spChg chg="add mod">
+          <ac:chgData name="Bjerkhaug, Sigurd" userId="6a5b5c75-6033-4fdb-a144-562842efa264" providerId="ADAL" clId="{C3423E57-CB60-4E1D-A614-F6132850FFBA}" dt="2023-10-17T19:03:35.305" v="30" actId="14100"/>
+          <ac:spMkLst>
+            <pc:docMk/>
+            <pc:sldMk cId="2369882187" sldId="257"/>
+            <ac:spMk id="3" creationId="{00593D88-5766-7BF9-EF61-C0A6816D42BA}"/>
+          </ac:spMkLst>
+        </pc:spChg>
+        <pc:spChg chg="mod">
+          <ac:chgData name="Bjerkhaug, Sigurd" userId="6a5b5c75-6033-4fdb-a144-562842efa264" providerId="ADAL" clId="{C3423E57-CB60-4E1D-A614-F6132850FFBA}" dt="2023-10-17T15:47:47.981" v="15" actId="14100"/>
+          <ac:spMkLst>
+            <pc:docMk/>
+            <pc:sldMk cId="2369882187" sldId="257"/>
+            <ac:spMk id="4" creationId="{1D395C69-2B62-18C2-F8FD-12726D671D54}"/>
+          </ac:spMkLst>
+        </pc:spChg>
+        <pc:spChg chg="mod">
+          <ac:chgData name="Bjerkhaug, Sigurd" userId="6a5b5c75-6033-4fdb-a144-562842efa264" providerId="ADAL" clId="{C3423E57-CB60-4E1D-A614-F6132850FFBA}" dt="2023-10-17T15:47:31.615" v="8" actId="1076"/>
+          <ac:spMkLst>
+            <pc:docMk/>
+            <pc:sldMk cId="2369882187" sldId="257"/>
+            <ac:spMk id="12" creationId="{EB47D125-C952-44AD-59B4-3F5B8E21129D}"/>
+          </ac:spMkLst>
+        </pc:spChg>
+        <pc:spChg chg="mod">
+          <ac:chgData name="Bjerkhaug, Sigurd" userId="6a5b5c75-6033-4fdb-a144-562842efa264" providerId="ADAL" clId="{C3423E57-CB60-4E1D-A614-F6132850FFBA}" dt="2023-10-17T15:47:33.813" v="9" actId="1076"/>
+          <ac:spMkLst>
+            <pc:docMk/>
+            <pc:sldMk cId="2369882187" sldId="257"/>
+            <ac:spMk id="13" creationId="{D57C2F9A-EA72-4C83-2B03-FCCE55962245}"/>
+          </ac:spMkLst>
+        </pc:spChg>
+        <pc:spChg chg="del">
+          <ac:chgData name="Bjerkhaug, Sigurd" userId="6a5b5c75-6033-4fdb-a144-562842efa264" providerId="ADAL" clId="{C3423E57-CB60-4E1D-A614-F6132850FFBA}" dt="2023-10-17T19:03:54.737" v="35" actId="478"/>
+          <ac:spMkLst>
+            <pc:docMk/>
+            <pc:sldMk cId="2369882187" sldId="257"/>
+            <ac:spMk id="14" creationId="{9B3280E1-7FF8-AD1D-E8A4-AD279BFAFB0E}"/>
+          </ac:spMkLst>
+        </pc:spChg>
+        <pc:spChg chg="del">
+          <ac:chgData name="Bjerkhaug, Sigurd" userId="6a5b5c75-6033-4fdb-a144-562842efa264" providerId="ADAL" clId="{C3423E57-CB60-4E1D-A614-F6132850FFBA}" dt="2023-10-17T19:03:04.638" v="23" actId="478"/>
+          <ac:spMkLst>
+            <pc:docMk/>
+            <pc:sldMk cId="2369882187" sldId="257"/>
+            <ac:spMk id="18" creationId="{0E2DF697-E33E-F711-D3CA-A475943950EA}"/>
+          </ac:spMkLst>
+        </pc:spChg>
+        <pc:spChg chg="del">
+          <ac:chgData name="Bjerkhaug, Sigurd" userId="6a5b5c75-6033-4fdb-a144-562842efa264" providerId="ADAL" clId="{C3423E57-CB60-4E1D-A614-F6132850FFBA}" dt="2023-10-17T19:03:51.494" v="34" actId="478"/>
+          <ac:spMkLst>
+            <pc:docMk/>
+            <pc:sldMk cId="2369882187" sldId="257"/>
+            <ac:spMk id="19" creationId="{08B50E80-1808-1F8F-D343-CAEF5745410B}"/>
+          </ac:spMkLst>
+        </pc:spChg>
+        <pc:spChg chg="del">
+          <ac:chgData name="Bjerkhaug, Sigurd" userId="6a5b5c75-6033-4fdb-a144-562842efa264" providerId="ADAL" clId="{C3423E57-CB60-4E1D-A614-F6132850FFBA}" dt="2023-10-17T19:04:27.073" v="42" actId="478"/>
+          <ac:spMkLst>
+            <pc:docMk/>
+            <pc:sldMk cId="2369882187" sldId="257"/>
+            <ac:spMk id="35" creationId="{BC245D75-A14F-69E9-7F25-47DC98B219FA}"/>
+          </ac:spMkLst>
+        </pc:spChg>
+        <pc:spChg chg="mod">
+          <ac:chgData name="Bjerkhaug, Sigurd" userId="6a5b5c75-6033-4fdb-a144-562842efa264" providerId="ADAL" clId="{C3423E57-CB60-4E1D-A614-F6132850FFBA}" dt="2023-10-17T15:47:38.835" v="11" actId="14100"/>
+          <ac:spMkLst>
+            <pc:docMk/>
+            <pc:sldMk cId="2369882187" sldId="257"/>
+            <ac:spMk id="36" creationId="{F39418BD-16C6-34A8-4CE9-5EB399BA8FEB}"/>
+          </ac:spMkLst>
+        </pc:spChg>
+        <pc:spChg chg="del">
+          <ac:chgData name="Bjerkhaug, Sigurd" userId="6a5b5c75-6033-4fdb-a144-562842efa264" providerId="ADAL" clId="{C3423E57-CB60-4E1D-A614-F6132850FFBA}" dt="2023-10-17T19:04:30.276" v="43" actId="478"/>
+          <ac:spMkLst>
+            <pc:docMk/>
+            <pc:sldMk cId="2369882187" sldId="257"/>
+            <ac:spMk id="43" creationId="{3260557B-82C6-EE22-746A-9EF9FED4B63D}"/>
+          </ac:spMkLst>
+        </pc:spChg>
+        <pc:spChg chg="add mod">
+          <ac:chgData name="Bjerkhaug, Sigurd" userId="6a5b5c75-6033-4fdb-a144-562842efa264" providerId="ADAL" clId="{C3423E57-CB60-4E1D-A614-F6132850FFBA}" dt="2023-10-17T19:04:06.972" v="39" actId="14100"/>
+          <ac:spMkLst>
+            <pc:docMk/>
+            <pc:sldMk cId="2369882187" sldId="257"/>
+            <ac:spMk id="44" creationId="{AEE1E334-4927-D85A-EA3C-A0FE0DF65359}"/>
+          </ac:spMkLst>
+        </pc:spChg>
+        <pc:spChg chg="add mod">
+          <ac:chgData name="Bjerkhaug, Sigurd" userId="6a5b5c75-6033-4fdb-a144-562842efa264" providerId="ADAL" clId="{C3423E57-CB60-4E1D-A614-F6132850FFBA}" dt="2023-10-17T19:05:05.873" v="53" actId="14100"/>
+          <ac:spMkLst>
+            <pc:docMk/>
+            <pc:sldMk cId="2369882187" sldId="257"/>
+            <ac:spMk id="46" creationId="{4066D44D-1610-C6EE-146E-5781766F0013}"/>
+          </ac:spMkLst>
+        </pc:spChg>
+        <pc:spChg chg="add mod">
+          <ac:chgData name="Bjerkhaug, Sigurd" userId="6a5b5c75-6033-4fdb-a144-562842efa264" providerId="ADAL" clId="{C3423E57-CB60-4E1D-A614-F6132850FFBA}" dt="2023-10-17T19:04:43.374" v="47" actId="14100"/>
+          <ac:spMkLst>
+            <pc:docMk/>
+            <pc:sldMk cId="2369882187" sldId="257"/>
+            <ac:spMk id="47" creationId="{35D541F5-85E5-E2D0-0E91-DF0AC98AC51A}"/>
+          </ac:spMkLst>
+        </pc:spChg>
+        <pc:spChg chg="add mod">
+          <ac:chgData name="Bjerkhaug, Sigurd" userId="6a5b5c75-6033-4fdb-a144-562842efa264" providerId="ADAL" clId="{C3423E57-CB60-4E1D-A614-F6132850FFBA}" dt="2023-10-17T19:06:30.580" v="77" actId="790"/>
+          <ac:spMkLst>
+            <pc:docMk/>
+            <pc:sldMk cId="2369882187" sldId="257"/>
+            <ac:spMk id="48" creationId="{37D5C036-C703-2256-271C-990636ED0D34}"/>
+          </ac:spMkLst>
+        </pc:spChg>
+        <pc:spChg chg="add mod">
+          <ac:chgData name="Bjerkhaug, Sigurd" userId="6a5b5c75-6033-4fdb-a144-562842efa264" providerId="ADAL" clId="{C3423E57-CB60-4E1D-A614-F6132850FFBA}" dt="2023-10-17T19:06:54.622" v="93" actId="1076"/>
+          <ac:spMkLst>
+            <pc:docMk/>
+            <pc:sldMk cId="2369882187" sldId="257"/>
+            <ac:spMk id="49" creationId="{F4387C63-6ABA-C665-6CAC-7BF94862E8FA}"/>
+          </ac:spMkLst>
+        </pc:spChg>
+        <pc:picChg chg="add del mod">
+          <ac:chgData name="Bjerkhaug, Sigurd" userId="6a5b5c75-6033-4fdb-a144-562842efa264" providerId="ADAL" clId="{C3423E57-CB60-4E1D-A614-F6132850FFBA}" dt="2023-10-17T15:47:03.872" v="4" actId="931"/>
+          <ac:picMkLst>
+            <pc:docMk/>
+            <pc:sldMk cId="2369882187" sldId="257"/>
+            <ac:picMk id="3" creationId="{E8625B52-131A-62E3-78A0-36B06A648548}"/>
+          </ac:picMkLst>
+        </pc:picChg>
+        <pc:picChg chg="add mod ord">
+          <ac:chgData name="Bjerkhaug, Sigurd" userId="6a5b5c75-6033-4fdb-a144-562842efa264" providerId="ADAL" clId="{C3423E57-CB60-4E1D-A614-F6132850FFBA}" dt="2023-10-17T19:03:42.259" v="32" actId="108"/>
+          <ac:picMkLst>
+            <pc:docMk/>
+            <pc:sldMk cId="2369882187" sldId="257"/>
+            <ac:picMk id="45" creationId="{527D75F6-F704-0CD6-764F-7C997ACE0FD1}"/>
+          </ac:picMkLst>
+        </pc:picChg>
+        <pc:picChg chg="del">
+          <ac:chgData name="Bjerkhaug, Sigurd" userId="6a5b5c75-6033-4fdb-a144-562842efa264" providerId="ADAL" clId="{C3423E57-CB60-4E1D-A614-F6132850FFBA}" dt="2023-10-17T15:46:17.322" v="0" actId="478"/>
+          <ac:picMkLst>
+            <pc:docMk/>
+            <pc:sldMk cId="2369882187" sldId="257"/>
+            <ac:picMk id="48" creationId="{7FDAFDB5-39BA-B641-B515-FFBDF167499F}"/>
+          </ac:picMkLst>
+        </pc:picChg>
+      </pc:sldChg>
+    </pc:docChg>
+  </pc:docChgLst>
+</pc:chgInfo>
 </file>
 
 <file path=ppt/slideLayouts/slideLayout1.xml><?xml version="1.0" encoding="utf-8"?>
@@ -257,7 +443,7 @@
           <a:p>
             <a:fld id="{BEF5D0A1-4D32-4A77-9F40-862DFD85295E}" type="datetimeFigureOut">
               <a:rPr lang="en-GB" smtClean="0"/>
-              <a:t>16/10/2023</a:t>
+              <a:t>17/10/2023</a:t>
             </a:fld>
             <a:endParaRPr lang="en-GB"/>
           </a:p>
@@ -457,7 +643,7 @@
           <a:p>
             <a:fld id="{BEF5D0A1-4D32-4A77-9F40-862DFD85295E}" type="datetimeFigureOut">
               <a:rPr lang="en-GB" smtClean="0"/>
-              <a:t>16/10/2023</a:t>
+              <a:t>17/10/2023</a:t>
             </a:fld>
             <a:endParaRPr lang="en-GB"/>
           </a:p>
@@ -667,7 +853,7 @@
           <a:p>
             <a:fld id="{BEF5D0A1-4D32-4A77-9F40-862DFD85295E}" type="datetimeFigureOut">
               <a:rPr lang="en-GB" smtClean="0"/>
-              <a:t>16/10/2023</a:t>
+              <a:t>17/10/2023</a:t>
             </a:fld>
             <a:endParaRPr lang="en-GB"/>
           </a:p>
@@ -867,7 +1053,7 @@
           <a:p>
             <a:fld id="{BEF5D0A1-4D32-4A77-9F40-862DFD85295E}" type="datetimeFigureOut">
               <a:rPr lang="en-GB" smtClean="0"/>
-              <a:t>16/10/2023</a:t>
+              <a:t>17/10/2023</a:t>
             </a:fld>
             <a:endParaRPr lang="en-GB"/>
           </a:p>
@@ -1143,7 +1329,7 @@
           <a:p>
             <a:fld id="{BEF5D0A1-4D32-4A77-9F40-862DFD85295E}" type="datetimeFigureOut">
               <a:rPr lang="en-GB" smtClean="0"/>
-              <a:t>16/10/2023</a:t>
+              <a:t>17/10/2023</a:t>
             </a:fld>
             <a:endParaRPr lang="en-GB"/>
           </a:p>
@@ -1411,7 +1597,7 @@
           <a:p>
             <a:fld id="{BEF5D0A1-4D32-4A77-9F40-862DFD85295E}" type="datetimeFigureOut">
               <a:rPr lang="en-GB" smtClean="0"/>
-              <a:t>16/10/2023</a:t>
+              <a:t>17/10/2023</a:t>
             </a:fld>
             <a:endParaRPr lang="en-GB"/>
           </a:p>
@@ -1826,7 +2012,7 @@
           <a:p>
             <a:fld id="{BEF5D0A1-4D32-4A77-9F40-862DFD85295E}" type="datetimeFigureOut">
               <a:rPr lang="en-GB" smtClean="0"/>
-              <a:t>16/10/2023</a:t>
+              <a:t>17/10/2023</a:t>
             </a:fld>
             <a:endParaRPr lang="en-GB"/>
           </a:p>
@@ -1968,7 +2154,7 @@
           <a:p>
             <a:fld id="{BEF5D0A1-4D32-4A77-9F40-862DFD85295E}" type="datetimeFigureOut">
               <a:rPr lang="en-GB" smtClean="0"/>
-              <a:t>16/10/2023</a:t>
+              <a:t>17/10/2023</a:t>
             </a:fld>
             <a:endParaRPr lang="en-GB"/>
           </a:p>
@@ -2081,7 +2267,7 @@
           <a:p>
             <a:fld id="{BEF5D0A1-4D32-4A77-9F40-862DFD85295E}" type="datetimeFigureOut">
               <a:rPr lang="en-GB" smtClean="0"/>
-              <a:t>16/10/2023</a:t>
+              <a:t>17/10/2023</a:t>
             </a:fld>
             <a:endParaRPr lang="en-GB"/>
           </a:p>
@@ -2394,7 +2580,7 @@
           <a:p>
             <a:fld id="{BEF5D0A1-4D32-4A77-9F40-862DFD85295E}" type="datetimeFigureOut">
               <a:rPr lang="en-GB" smtClean="0"/>
-              <a:t>16/10/2023</a:t>
+              <a:t>17/10/2023</a:t>
             </a:fld>
             <a:endParaRPr lang="en-GB"/>
           </a:p>
@@ -2683,7 +2869,7 @@
           <a:p>
             <a:fld id="{BEF5D0A1-4D32-4A77-9F40-862DFD85295E}" type="datetimeFigureOut">
               <a:rPr lang="en-GB" smtClean="0"/>
-              <a:t>16/10/2023</a:t>
+              <a:t>17/10/2023</a:t>
             </a:fld>
             <a:endParaRPr lang="en-GB"/>
           </a:p>
@@ -2926,7 +3112,7 @@
           <a:p>
             <a:fld id="{BEF5D0A1-4D32-4A77-9F40-862DFD85295E}" type="datetimeFigureOut">
               <a:rPr lang="en-GB" smtClean="0"/>
-              <a:t>16/10/2023</a:t>
+              <a:t>17/10/2023</a:t>
             </a:fld>
             <a:endParaRPr lang="en-GB"/>
           </a:p>
@@ -3425,20 +3611,20 @@
       </p:grpSpPr>
       <p:pic>
         <p:nvPicPr>
-          <p:cNvPr id="48" name="Picture 47" descr="A collage of images of a machine&#10;&#10;Description automatically generated">
-            <a:extLst>
-              <a:ext uri="{FF2B5EF4-FFF2-40B4-BE49-F238E27FC236}">
-                <a16:creationId xmlns:a16="http://schemas.microsoft.com/office/drawing/2014/main" id="{7FDAFDB5-39BA-B641-B515-FFBDF167499F}"/>
+          <p:cNvPr id="45" name="Picture 44" descr="A collage of images of a machine&#10;&#10;Description automatically generated">
+            <a:extLst>
+              <a:ext uri="{FF2B5EF4-FFF2-40B4-BE49-F238E27FC236}">
+                <a16:creationId xmlns:a16="http://schemas.microsoft.com/office/drawing/2014/main" id="{527D75F6-F704-0CD6-764F-7C997ACE0FD1}"/>
               </a:ext>
             </a:extLst>
           </p:cNvPr>
           <p:cNvPicPr>
-            <a:picLocks noChangeAspect="1"/>
+            <a:picLocks noGrp="1" noRot="1" noChangeAspect="1" noMove="1" noResize="1" noEditPoints="1" noAdjustHandles="1" noChangeArrowheads="1" noChangeShapeType="1" noCrop="1"/>
           </p:cNvPicPr>
           <p:nvPr/>
         </p:nvPicPr>
         <p:blipFill>
-          <a:blip r:embed="rId2">
+          <a:blip r:embed="rId2" r:link="rId3">
             <a:extLst>
               <a:ext uri="{28A0092B-C50C-407E-A947-70E740481C1C}">
                 <a14:useLocalDpi xmlns:a14="http://schemas.microsoft.com/office/drawing/2010/main" val="0"/>
@@ -3475,8 +3661,8 @@
         </p:nvSpPr>
         <p:spPr>
           <a:xfrm>
-            <a:off x="3024787" y="651733"/>
-            <a:ext cx="369655" cy="420113"/>
+            <a:off x="2998037" y="558771"/>
+            <a:ext cx="396405" cy="448734"/>
           </a:xfrm>
           <a:prstGeom prst="ellipse">
             <a:avLst/>
@@ -3910,7 +4096,7 @@
         </p:nvSpPr>
         <p:spPr>
           <a:xfrm>
-            <a:off x="3216552" y="1372157"/>
+            <a:off x="3307386" y="1373326"/>
             <a:ext cx="557118" cy="417839"/>
           </a:xfrm>
           <a:prstGeom prst="ellipse">
@@ -3967,7 +4153,7 @@
         </p:nvSpPr>
         <p:spPr>
           <a:xfrm>
-            <a:off x="4094622" y="1380904"/>
+            <a:off x="4236931" y="1428101"/>
             <a:ext cx="557118" cy="417839"/>
           </a:xfrm>
           <a:prstGeom prst="ellipse">
@@ -4007,10 +4193,10 @@
       </p:sp>
       <p:sp>
         <p:nvSpPr>
-          <p:cNvPr id="14" name="Oval 13">
-            <a:extLst>
-              <a:ext uri="{FF2B5EF4-FFF2-40B4-BE49-F238E27FC236}">
-                <a16:creationId xmlns:a16="http://schemas.microsoft.com/office/drawing/2014/main" id="{9B3280E1-7FF8-AD1D-E8A4-AD279BFAFB0E}"/>
+          <p:cNvPr id="15" name="Oval 14">
+            <a:extLst>
+              <a:ext uri="{FF2B5EF4-FFF2-40B4-BE49-F238E27FC236}">
+                <a16:creationId xmlns:a16="http://schemas.microsoft.com/office/drawing/2014/main" id="{E4CF9632-8A41-6713-9C6B-D4EEE6934AA4}"/>
               </a:ext>
             </a:extLst>
           </p:cNvPr>
@@ -4021,8 +4207,8 @@
         </p:nvSpPr>
         <p:spPr>
           <a:xfrm>
-            <a:off x="5637791" y="5864623"/>
-            <a:ext cx="270484" cy="221283"/>
+            <a:off x="3519711" y="2807122"/>
+            <a:ext cx="510315" cy="338325"/>
           </a:xfrm>
           <a:prstGeom prst="ellipse">
             <a:avLst/>
@@ -4064,10 +4250,10 @@
       </p:sp>
       <p:sp>
         <p:nvSpPr>
-          <p:cNvPr id="15" name="Oval 14">
-            <a:extLst>
-              <a:ext uri="{FF2B5EF4-FFF2-40B4-BE49-F238E27FC236}">
-                <a16:creationId xmlns:a16="http://schemas.microsoft.com/office/drawing/2014/main" id="{E4CF9632-8A41-6713-9C6B-D4EEE6934AA4}"/>
+          <p:cNvPr id="16" name="Oval 15">
+            <a:extLst>
+              <a:ext uri="{FF2B5EF4-FFF2-40B4-BE49-F238E27FC236}">
+                <a16:creationId xmlns:a16="http://schemas.microsoft.com/office/drawing/2014/main" id="{2DF4D338-70E1-D0A4-5757-8B884972F152}"/>
               </a:ext>
             </a:extLst>
           </p:cNvPr>
@@ -4078,8 +4264,8 @@
         </p:nvSpPr>
         <p:spPr>
           <a:xfrm>
-            <a:off x="3519711" y="2807122"/>
-            <a:ext cx="510315" cy="338325"/>
+            <a:off x="7780476" y="709126"/>
+            <a:ext cx="441051" cy="244888"/>
           </a:xfrm>
           <a:prstGeom prst="ellipse">
             <a:avLst/>
@@ -4121,10 +4307,10 @@
       </p:sp>
       <p:sp>
         <p:nvSpPr>
-          <p:cNvPr id="16" name="Oval 15">
-            <a:extLst>
-              <a:ext uri="{FF2B5EF4-FFF2-40B4-BE49-F238E27FC236}">
-                <a16:creationId xmlns:a16="http://schemas.microsoft.com/office/drawing/2014/main" id="{2DF4D338-70E1-D0A4-5757-8B884972F152}"/>
+          <p:cNvPr id="17" name="Oval 16">
+            <a:extLst>
+              <a:ext uri="{FF2B5EF4-FFF2-40B4-BE49-F238E27FC236}">
+                <a16:creationId xmlns:a16="http://schemas.microsoft.com/office/drawing/2014/main" id="{9899DF8A-8929-EA17-B88C-213A22481870}"/>
               </a:ext>
             </a:extLst>
           </p:cNvPr>
@@ -4135,8 +4321,8 @@
         </p:nvSpPr>
         <p:spPr>
           <a:xfrm>
-            <a:off x="7780476" y="709126"/>
-            <a:ext cx="441051" cy="244888"/>
+            <a:off x="5799273" y="709125"/>
+            <a:ext cx="496559" cy="318170"/>
           </a:xfrm>
           <a:prstGeom prst="ellipse">
             <a:avLst/>
@@ -4178,10 +4364,10 @@
       </p:sp>
       <p:sp>
         <p:nvSpPr>
-          <p:cNvPr id="17" name="Oval 16">
-            <a:extLst>
-              <a:ext uri="{FF2B5EF4-FFF2-40B4-BE49-F238E27FC236}">
-                <a16:creationId xmlns:a16="http://schemas.microsoft.com/office/drawing/2014/main" id="{9899DF8A-8929-EA17-B88C-213A22481870}"/>
+          <p:cNvPr id="20" name="Oval 19">
+            <a:extLst>
+              <a:ext uri="{FF2B5EF4-FFF2-40B4-BE49-F238E27FC236}">
+                <a16:creationId xmlns:a16="http://schemas.microsoft.com/office/drawing/2014/main" id="{4F1CCBBD-0580-9AF9-A3B1-69317001BE9E}"/>
               </a:ext>
             </a:extLst>
           </p:cNvPr>
@@ -4192,8 +4378,350 @@
         </p:nvSpPr>
         <p:spPr>
           <a:xfrm>
-            <a:off x="5799273" y="709125"/>
-            <a:ext cx="496559" cy="318170"/>
+            <a:off x="4030026" y="5141261"/>
+            <a:ext cx="485464" cy="346937"/>
+          </a:xfrm>
+          <a:prstGeom prst="ellipse">
+            <a:avLst/>
+          </a:prstGeom>
+          <a:noFill/>
+          <a:ln w="28575">
+            <a:solidFill>
+              <a:schemeClr val="accent6">
+                <a:lumMod val="60000"/>
+                <a:lumOff val="40000"/>
+              </a:schemeClr>
+            </a:solidFill>
+          </a:ln>
+        </p:spPr>
+        <p:style>
+          <a:lnRef idx="2">
+            <a:schemeClr val="accent1">
+              <a:shade val="15000"/>
+            </a:schemeClr>
+          </a:lnRef>
+          <a:fillRef idx="1">
+            <a:schemeClr val="accent1"/>
+          </a:fillRef>
+          <a:effectRef idx="0">
+            <a:schemeClr val="accent1"/>
+          </a:effectRef>
+          <a:fontRef idx="minor">
+            <a:schemeClr val="lt1"/>
+          </a:fontRef>
+        </p:style>
+        <p:txBody>
+          <a:bodyPr rtlCol="0" anchor="ctr"/>
+          <a:lstStyle/>
+          <a:p>
+            <a:pPr algn="ctr"/>
+            <a:endParaRPr lang="en-GB" dirty="0"/>
+          </a:p>
+        </p:txBody>
+      </p:sp>
+      <p:sp>
+        <p:nvSpPr>
+          <p:cNvPr id="21" name="Oval 20">
+            <a:extLst>
+              <a:ext uri="{FF2B5EF4-FFF2-40B4-BE49-F238E27FC236}">
+                <a16:creationId xmlns:a16="http://schemas.microsoft.com/office/drawing/2014/main" id="{5496866D-1F62-3114-17F1-FCFC24BA3846}"/>
+              </a:ext>
+            </a:extLst>
+          </p:cNvPr>
+          <p:cNvSpPr>
+            <a:spLocks/>
+          </p:cNvSpPr>
+          <p:nvPr/>
+        </p:nvSpPr>
+        <p:spPr>
+          <a:xfrm>
+            <a:off x="8208911" y="2932501"/>
+            <a:ext cx="557118" cy="343593"/>
+          </a:xfrm>
+          <a:prstGeom prst="ellipse">
+            <a:avLst/>
+          </a:prstGeom>
+          <a:noFill/>
+          <a:ln w="28575">
+            <a:solidFill>
+              <a:schemeClr val="accent6">
+                <a:lumMod val="60000"/>
+                <a:lumOff val="40000"/>
+              </a:schemeClr>
+            </a:solidFill>
+          </a:ln>
+        </p:spPr>
+        <p:style>
+          <a:lnRef idx="2">
+            <a:schemeClr val="accent1">
+              <a:shade val="15000"/>
+            </a:schemeClr>
+          </a:lnRef>
+          <a:fillRef idx="1">
+            <a:schemeClr val="accent1"/>
+          </a:fillRef>
+          <a:effectRef idx="0">
+            <a:schemeClr val="accent1"/>
+          </a:effectRef>
+          <a:fontRef idx="minor">
+            <a:schemeClr val="lt1"/>
+          </a:fontRef>
+        </p:style>
+        <p:txBody>
+          <a:bodyPr rtlCol="0" anchor="ctr"/>
+          <a:lstStyle/>
+          <a:p>
+            <a:pPr algn="ctr"/>
+            <a:endParaRPr lang="en-GB" dirty="0"/>
+          </a:p>
+        </p:txBody>
+      </p:sp>
+      <p:sp>
+        <p:nvSpPr>
+          <p:cNvPr id="22" name="Oval 21">
+            <a:extLst>
+              <a:ext uri="{FF2B5EF4-FFF2-40B4-BE49-F238E27FC236}">
+                <a16:creationId xmlns:a16="http://schemas.microsoft.com/office/drawing/2014/main" id="{127CBC17-BD2A-B610-31F3-717EF4C8329C}"/>
+              </a:ext>
+            </a:extLst>
+          </p:cNvPr>
+          <p:cNvSpPr>
+            <a:spLocks/>
+          </p:cNvSpPr>
+          <p:nvPr/>
+        </p:nvSpPr>
+        <p:spPr>
+          <a:xfrm>
+            <a:off x="6133088" y="2982125"/>
+            <a:ext cx="478161" cy="335576"/>
+          </a:xfrm>
+          <a:prstGeom prst="ellipse">
+            <a:avLst/>
+          </a:prstGeom>
+          <a:noFill/>
+          <a:ln w="28575">
+            <a:solidFill>
+              <a:schemeClr val="accent6">
+                <a:lumMod val="60000"/>
+                <a:lumOff val="40000"/>
+              </a:schemeClr>
+            </a:solidFill>
+          </a:ln>
+        </p:spPr>
+        <p:style>
+          <a:lnRef idx="2">
+            <a:schemeClr val="accent1">
+              <a:shade val="15000"/>
+            </a:schemeClr>
+          </a:lnRef>
+          <a:fillRef idx="1">
+            <a:schemeClr val="accent1"/>
+          </a:fillRef>
+          <a:effectRef idx="0">
+            <a:schemeClr val="accent1"/>
+          </a:effectRef>
+          <a:fontRef idx="minor">
+            <a:schemeClr val="lt1"/>
+          </a:fontRef>
+        </p:style>
+        <p:txBody>
+          <a:bodyPr rtlCol="0" anchor="ctr"/>
+          <a:lstStyle/>
+          <a:p>
+            <a:pPr algn="ctr"/>
+            <a:endParaRPr lang="en-GB" dirty="0"/>
+          </a:p>
+        </p:txBody>
+      </p:sp>
+      <p:sp>
+        <p:nvSpPr>
+          <p:cNvPr id="23" name="Oval 22">
+            <a:extLst>
+              <a:ext uri="{FF2B5EF4-FFF2-40B4-BE49-F238E27FC236}">
+                <a16:creationId xmlns:a16="http://schemas.microsoft.com/office/drawing/2014/main" id="{091B1173-9CE0-B242-D016-8BD2116547D7}"/>
+              </a:ext>
+            </a:extLst>
+          </p:cNvPr>
+          <p:cNvSpPr>
+            <a:spLocks/>
+          </p:cNvSpPr>
+          <p:nvPr/>
+        </p:nvSpPr>
+        <p:spPr>
+          <a:xfrm>
+            <a:off x="4094622" y="2858255"/>
+            <a:ext cx="442810" cy="302507"/>
+          </a:xfrm>
+          <a:prstGeom prst="ellipse">
+            <a:avLst/>
+          </a:prstGeom>
+          <a:noFill/>
+          <a:ln w="28575">
+            <a:solidFill>
+              <a:schemeClr val="accent6">
+                <a:lumMod val="60000"/>
+                <a:lumOff val="40000"/>
+              </a:schemeClr>
+            </a:solidFill>
+          </a:ln>
+        </p:spPr>
+        <p:style>
+          <a:lnRef idx="2">
+            <a:schemeClr val="accent1">
+              <a:shade val="15000"/>
+            </a:schemeClr>
+          </a:lnRef>
+          <a:fillRef idx="1">
+            <a:schemeClr val="accent1"/>
+          </a:fillRef>
+          <a:effectRef idx="0">
+            <a:schemeClr val="accent1"/>
+          </a:effectRef>
+          <a:fontRef idx="minor">
+            <a:schemeClr val="lt1"/>
+          </a:fontRef>
+        </p:style>
+        <p:txBody>
+          <a:bodyPr rtlCol="0" anchor="ctr"/>
+          <a:lstStyle/>
+          <a:p>
+            <a:pPr algn="ctr"/>
+            <a:endParaRPr lang="en-GB" dirty="0"/>
+          </a:p>
+        </p:txBody>
+      </p:sp>
+      <p:sp>
+        <p:nvSpPr>
+          <p:cNvPr id="24" name="Oval 23">
+            <a:extLst>
+              <a:ext uri="{FF2B5EF4-FFF2-40B4-BE49-F238E27FC236}">
+                <a16:creationId xmlns:a16="http://schemas.microsoft.com/office/drawing/2014/main" id="{26EA4182-BD9B-06DA-E4DF-EF1834C199DC}"/>
+              </a:ext>
+            </a:extLst>
+          </p:cNvPr>
+          <p:cNvSpPr>
+            <a:spLocks/>
+          </p:cNvSpPr>
+          <p:nvPr/>
+        </p:nvSpPr>
+        <p:spPr>
+          <a:xfrm>
+            <a:off x="8275006" y="725098"/>
+            <a:ext cx="434005" cy="302197"/>
+          </a:xfrm>
+          <a:prstGeom prst="ellipse">
+            <a:avLst/>
+          </a:prstGeom>
+          <a:noFill/>
+          <a:ln w="28575">
+            <a:solidFill>
+              <a:schemeClr val="accent6">
+                <a:lumMod val="60000"/>
+                <a:lumOff val="40000"/>
+              </a:schemeClr>
+            </a:solidFill>
+          </a:ln>
+        </p:spPr>
+        <p:style>
+          <a:lnRef idx="2">
+            <a:schemeClr val="accent1">
+              <a:shade val="15000"/>
+            </a:schemeClr>
+          </a:lnRef>
+          <a:fillRef idx="1">
+            <a:schemeClr val="accent1"/>
+          </a:fillRef>
+          <a:effectRef idx="0">
+            <a:schemeClr val="accent1"/>
+          </a:effectRef>
+          <a:fontRef idx="minor">
+            <a:schemeClr val="lt1"/>
+          </a:fontRef>
+        </p:style>
+        <p:txBody>
+          <a:bodyPr rtlCol="0" anchor="ctr"/>
+          <a:lstStyle/>
+          <a:p>
+            <a:pPr algn="ctr"/>
+            <a:endParaRPr lang="en-GB" dirty="0"/>
+          </a:p>
+        </p:txBody>
+      </p:sp>
+      <p:sp>
+        <p:nvSpPr>
+          <p:cNvPr id="25" name="Oval 24">
+            <a:extLst>
+              <a:ext uri="{FF2B5EF4-FFF2-40B4-BE49-F238E27FC236}">
+                <a16:creationId xmlns:a16="http://schemas.microsoft.com/office/drawing/2014/main" id="{B4445127-CED1-C5C9-26B9-DB6A89A6029F}"/>
+              </a:ext>
+            </a:extLst>
+          </p:cNvPr>
+          <p:cNvSpPr>
+            <a:spLocks/>
+          </p:cNvSpPr>
+          <p:nvPr/>
+        </p:nvSpPr>
+        <p:spPr>
+          <a:xfrm>
+            <a:off x="6324094" y="725098"/>
+            <a:ext cx="496558" cy="344474"/>
+          </a:xfrm>
+          <a:prstGeom prst="ellipse">
+            <a:avLst/>
+          </a:prstGeom>
+          <a:noFill/>
+          <a:ln w="28575">
+            <a:solidFill>
+              <a:schemeClr val="accent6">
+                <a:lumMod val="60000"/>
+                <a:lumOff val="40000"/>
+              </a:schemeClr>
+            </a:solidFill>
+          </a:ln>
+        </p:spPr>
+        <p:style>
+          <a:lnRef idx="2">
+            <a:schemeClr val="accent1">
+              <a:shade val="15000"/>
+            </a:schemeClr>
+          </a:lnRef>
+          <a:fillRef idx="1">
+            <a:schemeClr val="accent1"/>
+          </a:fillRef>
+          <a:effectRef idx="0">
+            <a:schemeClr val="accent1"/>
+          </a:effectRef>
+          <a:fontRef idx="minor">
+            <a:schemeClr val="lt1"/>
+          </a:fontRef>
+        </p:style>
+        <p:txBody>
+          <a:bodyPr rtlCol="0" anchor="ctr"/>
+          <a:lstStyle/>
+          <a:p>
+            <a:pPr algn="ctr"/>
+            <a:endParaRPr lang="en-GB" dirty="0"/>
+          </a:p>
+        </p:txBody>
+      </p:sp>
+      <p:sp>
+        <p:nvSpPr>
+          <p:cNvPr id="26" name="Oval 25">
+            <a:extLst>
+              <a:ext uri="{FF2B5EF4-FFF2-40B4-BE49-F238E27FC236}">
+                <a16:creationId xmlns:a16="http://schemas.microsoft.com/office/drawing/2014/main" id="{6E3E9CBC-18B8-5197-F59F-FFC657CE0712}"/>
+              </a:ext>
+            </a:extLst>
+          </p:cNvPr>
+          <p:cNvSpPr>
+            <a:spLocks/>
+          </p:cNvSpPr>
+          <p:nvPr/>
+        </p:nvSpPr>
+        <p:spPr>
+          <a:xfrm>
+            <a:off x="5179967" y="2948207"/>
+            <a:ext cx="278688" cy="271873"/>
           </a:xfrm>
           <a:prstGeom prst="ellipse">
             <a:avLst/>
@@ -4235,10 +4763,10 @@
       </p:sp>
       <p:sp>
         <p:nvSpPr>
-          <p:cNvPr id="18" name="Oval 17">
-            <a:extLst>
-              <a:ext uri="{FF2B5EF4-FFF2-40B4-BE49-F238E27FC236}">
-                <a16:creationId xmlns:a16="http://schemas.microsoft.com/office/drawing/2014/main" id="{0E2DF697-E33E-F711-D3CA-A475943950EA}"/>
+          <p:cNvPr id="27" name="Oval 26">
+            <a:extLst>
+              <a:ext uri="{FF2B5EF4-FFF2-40B4-BE49-F238E27FC236}">
+                <a16:creationId xmlns:a16="http://schemas.microsoft.com/office/drawing/2014/main" id="{E7360B20-6C00-50BC-212D-373A7D4597C3}"/>
               </a:ext>
             </a:extLst>
           </p:cNvPr>
@@ -4249,461 +4777,8 @@
         </p:nvSpPr>
         <p:spPr>
           <a:xfrm>
-            <a:off x="5360361" y="5178507"/>
-            <a:ext cx="228985" cy="268278"/>
-          </a:xfrm>
-          <a:prstGeom prst="ellipse">
-            <a:avLst/>
-          </a:prstGeom>
-          <a:noFill/>
-          <a:ln w="28575">
-            <a:solidFill>
-              <a:schemeClr val="tx2"/>
-            </a:solidFill>
-          </a:ln>
-        </p:spPr>
-        <p:style>
-          <a:lnRef idx="2">
-            <a:schemeClr val="accent1">
-              <a:shade val="15000"/>
-            </a:schemeClr>
-          </a:lnRef>
-          <a:fillRef idx="1">
-            <a:schemeClr val="accent1"/>
-          </a:fillRef>
-          <a:effectRef idx="0">
-            <a:schemeClr val="accent1"/>
-          </a:effectRef>
-          <a:fontRef idx="minor">
-            <a:schemeClr val="lt1"/>
-          </a:fontRef>
-        </p:style>
-        <p:txBody>
-          <a:bodyPr rtlCol="0" anchor="ctr"/>
-          <a:lstStyle/>
-          <a:p>
-            <a:pPr algn="ctr"/>
-            <a:endParaRPr lang="en-GB" dirty="0"/>
-          </a:p>
-        </p:txBody>
-      </p:sp>
-      <p:sp>
-        <p:nvSpPr>
-          <p:cNvPr id="19" name="Oval 18">
-            <a:extLst>
-              <a:ext uri="{FF2B5EF4-FFF2-40B4-BE49-F238E27FC236}">
-                <a16:creationId xmlns:a16="http://schemas.microsoft.com/office/drawing/2014/main" id="{08B50E80-1808-1F8F-D343-CAEF5745410B}"/>
-              </a:ext>
-            </a:extLst>
-          </p:cNvPr>
-          <p:cNvSpPr>
-            <a:spLocks/>
-          </p:cNvSpPr>
-          <p:nvPr/>
-        </p:nvSpPr>
-        <p:spPr>
-          <a:xfrm>
-            <a:off x="5908274" y="5249409"/>
-            <a:ext cx="298745" cy="268278"/>
-          </a:xfrm>
-          <a:prstGeom prst="ellipse">
-            <a:avLst/>
-          </a:prstGeom>
-          <a:noFill/>
-          <a:ln w="28575">
-            <a:solidFill>
-              <a:schemeClr val="accent6">
-                <a:lumMod val="60000"/>
-                <a:lumOff val="40000"/>
-              </a:schemeClr>
-            </a:solidFill>
-          </a:ln>
-        </p:spPr>
-        <p:style>
-          <a:lnRef idx="2">
-            <a:schemeClr val="accent1">
-              <a:shade val="15000"/>
-            </a:schemeClr>
-          </a:lnRef>
-          <a:fillRef idx="1">
-            <a:schemeClr val="accent1"/>
-          </a:fillRef>
-          <a:effectRef idx="0">
-            <a:schemeClr val="accent1"/>
-          </a:effectRef>
-          <a:fontRef idx="minor">
-            <a:schemeClr val="lt1"/>
-          </a:fontRef>
-        </p:style>
-        <p:txBody>
-          <a:bodyPr rtlCol="0" anchor="ctr"/>
-          <a:lstStyle/>
-          <a:p>
-            <a:pPr algn="ctr"/>
-            <a:endParaRPr lang="en-GB" dirty="0"/>
-          </a:p>
-        </p:txBody>
-      </p:sp>
-      <p:sp>
-        <p:nvSpPr>
-          <p:cNvPr id="20" name="Oval 19">
-            <a:extLst>
-              <a:ext uri="{FF2B5EF4-FFF2-40B4-BE49-F238E27FC236}">
-                <a16:creationId xmlns:a16="http://schemas.microsoft.com/office/drawing/2014/main" id="{4F1CCBBD-0580-9AF9-A3B1-69317001BE9E}"/>
-              </a:ext>
-            </a:extLst>
-          </p:cNvPr>
-          <p:cNvSpPr>
-            <a:spLocks/>
-          </p:cNvSpPr>
-          <p:nvPr/>
-        </p:nvSpPr>
-        <p:spPr>
-          <a:xfrm>
-            <a:off x="4030026" y="5141261"/>
-            <a:ext cx="485464" cy="346937"/>
-          </a:xfrm>
-          <a:prstGeom prst="ellipse">
-            <a:avLst/>
-          </a:prstGeom>
-          <a:noFill/>
-          <a:ln w="28575">
-            <a:solidFill>
-              <a:schemeClr val="accent6">
-                <a:lumMod val="60000"/>
-                <a:lumOff val="40000"/>
-              </a:schemeClr>
-            </a:solidFill>
-          </a:ln>
-        </p:spPr>
-        <p:style>
-          <a:lnRef idx="2">
-            <a:schemeClr val="accent1">
-              <a:shade val="15000"/>
-            </a:schemeClr>
-          </a:lnRef>
-          <a:fillRef idx="1">
-            <a:schemeClr val="accent1"/>
-          </a:fillRef>
-          <a:effectRef idx="0">
-            <a:schemeClr val="accent1"/>
-          </a:effectRef>
-          <a:fontRef idx="minor">
-            <a:schemeClr val="lt1"/>
-          </a:fontRef>
-        </p:style>
-        <p:txBody>
-          <a:bodyPr rtlCol="0" anchor="ctr"/>
-          <a:lstStyle/>
-          <a:p>
-            <a:pPr algn="ctr"/>
-            <a:endParaRPr lang="en-GB" dirty="0"/>
-          </a:p>
-        </p:txBody>
-      </p:sp>
-      <p:sp>
-        <p:nvSpPr>
-          <p:cNvPr id="21" name="Oval 20">
-            <a:extLst>
-              <a:ext uri="{FF2B5EF4-FFF2-40B4-BE49-F238E27FC236}">
-                <a16:creationId xmlns:a16="http://schemas.microsoft.com/office/drawing/2014/main" id="{5496866D-1F62-3114-17F1-FCFC24BA3846}"/>
-              </a:ext>
-            </a:extLst>
-          </p:cNvPr>
-          <p:cNvSpPr>
-            <a:spLocks/>
-          </p:cNvSpPr>
-          <p:nvPr/>
-        </p:nvSpPr>
-        <p:spPr>
-          <a:xfrm>
-            <a:off x="8208911" y="2932501"/>
-            <a:ext cx="557118" cy="343593"/>
-          </a:xfrm>
-          <a:prstGeom prst="ellipse">
-            <a:avLst/>
-          </a:prstGeom>
-          <a:noFill/>
-          <a:ln w="28575">
-            <a:solidFill>
-              <a:schemeClr val="accent6">
-                <a:lumMod val="60000"/>
-                <a:lumOff val="40000"/>
-              </a:schemeClr>
-            </a:solidFill>
-          </a:ln>
-        </p:spPr>
-        <p:style>
-          <a:lnRef idx="2">
-            <a:schemeClr val="accent1">
-              <a:shade val="15000"/>
-            </a:schemeClr>
-          </a:lnRef>
-          <a:fillRef idx="1">
-            <a:schemeClr val="accent1"/>
-          </a:fillRef>
-          <a:effectRef idx="0">
-            <a:schemeClr val="accent1"/>
-          </a:effectRef>
-          <a:fontRef idx="minor">
-            <a:schemeClr val="lt1"/>
-          </a:fontRef>
-        </p:style>
-        <p:txBody>
-          <a:bodyPr rtlCol="0" anchor="ctr"/>
-          <a:lstStyle/>
-          <a:p>
-            <a:pPr algn="ctr"/>
-            <a:endParaRPr lang="en-GB" dirty="0"/>
-          </a:p>
-        </p:txBody>
-      </p:sp>
-      <p:sp>
-        <p:nvSpPr>
-          <p:cNvPr id="22" name="Oval 21">
-            <a:extLst>
-              <a:ext uri="{FF2B5EF4-FFF2-40B4-BE49-F238E27FC236}">
-                <a16:creationId xmlns:a16="http://schemas.microsoft.com/office/drawing/2014/main" id="{127CBC17-BD2A-B610-31F3-717EF4C8329C}"/>
-              </a:ext>
-            </a:extLst>
-          </p:cNvPr>
-          <p:cNvSpPr>
-            <a:spLocks/>
-          </p:cNvSpPr>
-          <p:nvPr/>
-        </p:nvSpPr>
-        <p:spPr>
-          <a:xfrm>
-            <a:off x="6133088" y="2982125"/>
-            <a:ext cx="478161" cy="335576"/>
-          </a:xfrm>
-          <a:prstGeom prst="ellipse">
-            <a:avLst/>
-          </a:prstGeom>
-          <a:noFill/>
-          <a:ln w="28575">
-            <a:solidFill>
-              <a:schemeClr val="accent6">
-                <a:lumMod val="60000"/>
-                <a:lumOff val="40000"/>
-              </a:schemeClr>
-            </a:solidFill>
-          </a:ln>
-        </p:spPr>
-        <p:style>
-          <a:lnRef idx="2">
-            <a:schemeClr val="accent1">
-              <a:shade val="15000"/>
-            </a:schemeClr>
-          </a:lnRef>
-          <a:fillRef idx="1">
-            <a:schemeClr val="accent1"/>
-          </a:fillRef>
-          <a:effectRef idx="0">
-            <a:schemeClr val="accent1"/>
-          </a:effectRef>
-          <a:fontRef idx="minor">
-            <a:schemeClr val="lt1"/>
-          </a:fontRef>
-        </p:style>
-        <p:txBody>
-          <a:bodyPr rtlCol="0" anchor="ctr"/>
-          <a:lstStyle/>
-          <a:p>
-            <a:pPr algn="ctr"/>
-            <a:endParaRPr lang="en-GB" dirty="0"/>
-          </a:p>
-        </p:txBody>
-      </p:sp>
-      <p:sp>
-        <p:nvSpPr>
-          <p:cNvPr id="23" name="Oval 22">
-            <a:extLst>
-              <a:ext uri="{FF2B5EF4-FFF2-40B4-BE49-F238E27FC236}">
-                <a16:creationId xmlns:a16="http://schemas.microsoft.com/office/drawing/2014/main" id="{091B1173-9CE0-B242-D016-8BD2116547D7}"/>
-              </a:ext>
-            </a:extLst>
-          </p:cNvPr>
-          <p:cNvSpPr>
-            <a:spLocks/>
-          </p:cNvSpPr>
-          <p:nvPr/>
-        </p:nvSpPr>
-        <p:spPr>
-          <a:xfrm>
-            <a:off x="4094622" y="2858255"/>
-            <a:ext cx="442810" cy="302507"/>
-          </a:xfrm>
-          <a:prstGeom prst="ellipse">
-            <a:avLst/>
-          </a:prstGeom>
-          <a:noFill/>
-          <a:ln w="28575">
-            <a:solidFill>
-              <a:schemeClr val="accent6">
-                <a:lumMod val="60000"/>
-                <a:lumOff val="40000"/>
-              </a:schemeClr>
-            </a:solidFill>
-          </a:ln>
-        </p:spPr>
-        <p:style>
-          <a:lnRef idx="2">
-            <a:schemeClr val="accent1">
-              <a:shade val="15000"/>
-            </a:schemeClr>
-          </a:lnRef>
-          <a:fillRef idx="1">
-            <a:schemeClr val="accent1"/>
-          </a:fillRef>
-          <a:effectRef idx="0">
-            <a:schemeClr val="accent1"/>
-          </a:effectRef>
-          <a:fontRef idx="minor">
-            <a:schemeClr val="lt1"/>
-          </a:fontRef>
-        </p:style>
-        <p:txBody>
-          <a:bodyPr rtlCol="0" anchor="ctr"/>
-          <a:lstStyle/>
-          <a:p>
-            <a:pPr algn="ctr"/>
-            <a:endParaRPr lang="en-GB" dirty="0"/>
-          </a:p>
-        </p:txBody>
-      </p:sp>
-      <p:sp>
-        <p:nvSpPr>
-          <p:cNvPr id="24" name="Oval 23">
-            <a:extLst>
-              <a:ext uri="{FF2B5EF4-FFF2-40B4-BE49-F238E27FC236}">
-                <a16:creationId xmlns:a16="http://schemas.microsoft.com/office/drawing/2014/main" id="{26EA4182-BD9B-06DA-E4DF-EF1834C199DC}"/>
-              </a:ext>
-            </a:extLst>
-          </p:cNvPr>
-          <p:cNvSpPr>
-            <a:spLocks/>
-          </p:cNvSpPr>
-          <p:nvPr/>
-        </p:nvSpPr>
-        <p:spPr>
-          <a:xfrm>
-            <a:off x="8275006" y="725098"/>
-            <a:ext cx="434005" cy="302197"/>
-          </a:xfrm>
-          <a:prstGeom prst="ellipse">
-            <a:avLst/>
-          </a:prstGeom>
-          <a:noFill/>
-          <a:ln w="28575">
-            <a:solidFill>
-              <a:schemeClr val="accent6">
-                <a:lumMod val="60000"/>
-                <a:lumOff val="40000"/>
-              </a:schemeClr>
-            </a:solidFill>
-          </a:ln>
-        </p:spPr>
-        <p:style>
-          <a:lnRef idx="2">
-            <a:schemeClr val="accent1">
-              <a:shade val="15000"/>
-            </a:schemeClr>
-          </a:lnRef>
-          <a:fillRef idx="1">
-            <a:schemeClr val="accent1"/>
-          </a:fillRef>
-          <a:effectRef idx="0">
-            <a:schemeClr val="accent1"/>
-          </a:effectRef>
-          <a:fontRef idx="minor">
-            <a:schemeClr val="lt1"/>
-          </a:fontRef>
-        </p:style>
-        <p:txBody>
-          <a:bodyPr rtlCol="0" anchor="ctr"/>
-          <a:lstStyle/>
-          <a:p>
-            <a:pPr algn="ctr"/>
-            <a:endParaRPr lang="en-GB" dirty="0"/>
-          </a:p>
-        </p:txBody>
-      </p:sp>
-      <p:sp>
-        <p:nvSpPr>
-          <p:cNvPr id="25" name="Oval 24">
-            <a:extLst>
-              <a:ext uri="{FF2B5EF4-FFF2-40B4-BE49-F238E27FC236}">
-                <a16:creationId xmlns:a16="http://schemas.microsoft.com/office/drawing/2014/main" id="{B4445127-CED1-C5C9-26B9-DB6A89A6029F}"/>
-              </a:ext>
-            </a:extLst>
-          </p:cNvPr>
-          <p:cNvSpPr>
-            <a:spLocks/>
-          </p:cNvSpPr>
-          <p:nvPr/>
-        </p:nvSpPr>
-        <p:spPr>
-          <a:xfrm>
-            <a:off x="6324094" y="725098"/>
-            <a:ext cx="496558" cy="344474"/>
-          </a:xfrm>
-          <a:prstGeom prst="ellipse">
-            <a:avLst/>
-          </a:prstGeom>
-          <a:noFill/>
-          <a:ln w="28575">
-            <a:solidFill>
-              <a:schemeClr val="accent6">
-                <a:lumMod val="60000"/>
-                <a:lumOff val="40000"/>
-              </a:schemeClr>
-            </a:solidFill>
-          </a:ln>
-        </p:spPr>
-        <p:style>
-          <a:lnRef idx="2">
-            <a:schemeClr val="accent1">
-              <a:shade val="15000"/>
-            </a:schemeClr>
-          </a:lnRef>
-          <a:fillRef idx="1">
-            <a:schemeClr val="accent1"/>
-          </a:fillRef>
-          <a:effectRef idx="0">
-            <a:schemeClr val="accent1"/>
-          </a:effectRef>
-          <a:fontRef idx="minor">
-            <a:schemeClr val="lt1"/>
-          </a:fontRef>
-        </p:style>
-        <p:txBody>
-          <a:bodyPr rtlCol="0" anchor="ctr"/>
-          <a:lstStyle/>
-          <a:p>
-            <a:pPr algn="ctr"/>
-            <a:endParaRPr lang="en-GB" dirty="0"/>
-          </a:p>
-        </p:txBody>
-      </p:sp>
-      <p:sp>
-        <p:nvSpPr>
-          <p:cNvPr id="26" name="Oval 25">
-            <a:extLst>
-              <a:ext uri="{FF2B5EF4-FFF2-40B4-BE49-F238E27FC236}">
-                <a16:creationId xmlns:a16="http://schemas.microsoft.com/office/drawing/2014/main" id="{6E3E9CBC-18B8-5197-F59F-FFC657CE0712}"/>
-              </a:ext>
-            </a:extLst>
-          </p:cNvPr>
-          <p:cNvSpPr>
-            <a:spLocks/>
-          </p:cNvSpPr>
-          <p:nvPr/>
-        </p:nvSpPr>
-        <p:spPr>
-          <a:xfrm>
-            <a:off x="5179967" y="2948207"/>
-            <a:ext cx="278688" cy="271873"/>
+            <a:off x="7276222" y="2888889"/>
+            <a:ext cx="378348" cy="271873"/>
           </a:xfrm>
           <a:prstGeom prst="ellipse">
             <a:avLst/>
@@ -4745,10 +4820,10 @@
       </p:sp>
       <p:sp>
         <p:nvSpPr>
-          <p:cNvPr id="27" name="Oval 26">
-            <a:extLst>
-              <a:ext uri="{FF2B5EF4-FFF2-40B4-BE49-F238E27FC236}">
-                <a16:creationId xmlns:a16="http://schemas.microsoft.com/office/drawing/2014/main" id="{E7360B20-6C00-50BC-212D-373A7D4597C3}"/>
+          <p:cNvPr id="28" name="Oval 27">
+            <a:extLst>
+              <a:ext uri="{FF2B5EF4-FFF2-40B4-BE49-F238E27FC236}">
+                <a16:creationId xmlns:a16="http://schemas.microsoft.com/office/drawing/2014/main" id="{2ACCB6DA-3DAF-B8DB-7926-F880E7445CCC}"/>
               </a:ext>
             </a:extLst>
           </p:cNvPr>
@@ -4759,8 +4834,8 @@
         </p:nvSpPr>
         <p:spPr>
           <a:xfrm>
-            <a:off x="7276222" y="2888889"/>
-            <a:ext cx="378348" cy="271873"/>
+            <a:off x="3073168" y="5099847"/>
+            <a:ext cx="295274" cy="284615"/>
           </a:xfrm>
           <a:prstGeom prst="ellipse">
             <a:avLst/>
@@ -4802,10 +4877,10 @@
       </p:sp>
       <p:sp>
         <p:nvSpPr>
-          <p:cNvPr id="28" name="Oval 27">
-            <a:extLst>
-              <a:ext uri="{FF2B5EF4-FFF2-40B4-BE49-F238E27FC236}">
-                <a16:creationId xmlns:a16="http://schemas.microsoft.com/office/drawing/2014/main" id="{2ACCB6DA-3DAF-B8DB-7926-F880E7445CCC}"/>
+          <p:cNvPr id="29" name="Oval 28">
+            <a:extLst>
+              <a:ext uri="{FF2B5EF4-FFF2-40B4-BE49-F238E27FC236}">
+                <a16:creationId xmlns:a16="http://schemas.microsoft.com/office/drawing/2014/main" id="{71DDCFA3-54AC-575C-3C52-811DAED07281}"/>
               </a:ext>
             </a:extLst>
           </p:cNvPr>
@@ -4816,10 +4891,831 @@
         </p:nvSpPr>
         <p:spPr>
           <a:xfrm>
-            <a:off x="3073168" y="5099847"/>
-            <a:ext cx="295274" cy="284615"/>
+            <a:off x="6416952" y="1102048"/>
+            <a:ext cx="529856" cy="352993"/>
           </a:xfrm>
           <a:prstGeom prst="ellipse">
+            <a:avLst/>
+          </a:prstGeom>
+          <a:noFill/>
+          <a:ln w="28575">
+            <a:solidFill>
+              <a:srgbClr val="CD44FE"/>
+            </a:solidFill>
+          </a:ln>
+        </p:spPr>
+        <p:style>
+          <a:lnRef idx="2">
+            <a:schemeClr val="accent1">
+              <a:shade val="15000"/>
+            </a:schemeClr>
+          </a:lnRef>
+          <a:fillRef idx="1">
+            <a:schemeClr val="accent1"/>
+          </a:fillRef>
+          <a:effectRef idx="0">
+            <a:schemeClr val="accent1"/>
+          </a:effectRef>
+          <a:fontRef idx="minor">
+            <a:schemeClr val="lt1"/>
+          </a:fontRef>
+        </p:style>
+        <p:txBody>
+          <a:bodyPr rtlCol="0" anchor="ctr"/>
+          <a:lstStyle/>
+          <a:p>
+            <a:pPr algn="ctr"/>
+            <a:endParaRPr lang="en-GB" dirty="0"/>
+          </a:p>
+        </p:txBody>
+      </p:sp>
+      <p:sp>
+        <p:nvSpPr>
+          <p:cNvPr id="30" name="Oval 29">
+            <a:extLst>
+              <a:ext uri="{FF2B5EF4-FFF2-40B4-BE49-F238E27FC236}">
+                <a16:creationId xmlns:a16="http://schemas.microsoft.com/office/drawing/2014/main" id="{D7ABF877-351F-EC84-5D57-328CB61AB8B4}"/>
+              </a:ext>
+            </a:extLst>
+          </p:cNvPr>
+          <p:cNvSpPr>
+            <a:spLocks/>
+          </p:cNvSpPr>
+          <p:nvPr/>
+        </p:nvSpPr>
+        <p:spPr>
+          <a:xfrm>
+            <a:off x="8330529" y="1058300"/>
+            <a:ext cx="471342" cy="302197"/>
+          </a:xfrm>
+          <a:prstGeom prst="ellipse">
+            <a:avLst/>
+          </a:prstGeom>
+          <a:noFill/>
+          <a:ln w="28575">
+            <a:solidFill>
+              <a:srgbClr val="CD44FE"/>
+            </a:solidFill>
+          </a:ln>
+        </p:spPr>
+        <p:style>
+          <a:lnRef idx="2">
+            <a:schemeClr val="accent1">
+              <a:shade val="15000"/>
+            </a:schemeClr>
+          </a:lnRef>
+          <a:fillRef idx="1">
+            <a:schemeClr val="accent1"/>
+          </a:fillRef>
+          <a:effectRef idx="0">
+            <a:schemeClr val="accent1"/>
+          </a:effectRef>
+          <a:fontRef idx="minor">
+            <a:schemeClr val="lt1"/>
+          </a:fontRef>
+        </p:style>
+        <p:txBody>
+          <a:bodyPr rtlCol="0" anchor="ctr"/>
+          <a:lstStyle/>
+          <a:p>
+            <a:pPr algn="ctr"/>
+            <a:endParaRPr lang="en-GB" dirty="0"/>
+          </a:p>
+        </p:txBody>
+      </p:sp>
+      <p:sp>
+        <p:nvSpPr>
+          <p:cNvPr id="31" name="Oval 30">
+            <a:extLst>
+              <a:ext uri="{FF2B5EF4-FFF2-40B4-BE49-F238E27FC236}">
+                <a16:creationId xmlns:a16="http://schemas.microsoft.com/office/drawing/2014/main" id="{E4EDD481-E2C8-D4C2-F439-A2F76BE7E749}"/>
+              </a:ext>
+            </a:extLst>
+          </p:cNvPr>
+          <p:cNvSpPr>
+            <a:spLocks/>
+          </p:cNvSpPr>
+          <p:nvPr/>
+        </p:nvSpPr>
+        <p:spPr>
+          <a:xfrm>
+            <a:off x="4129191" y="3220080"/>
+            <a:ext cx="557118" cy="314389"/>
+          </a:xfrm>
+          <a:prstGeom prst="ellipse">
+            <a:avLst/>
+          </a:prstGeom>
+          <a:noFill/>
+          <a:ln w="28575">
+            <a:solidFill>
+              <a:srgbClr val="CD44FE"/>
+            </a:solidFill>
+          </a:ln>
+        </p:spPr>
+        <p:style>
+          <a:lnRef idx="2">
+            <a:schemeClr val="accent1">
+              <a:shade val="15000"/>
+            </a:schemeClr>
+          </a:lnRef>
+          <a:fillRef idx="1">
+            <a:schemeClr val="accent1"/>
+          </a:fillRef>
+          <a:effectRef idx="0">
+            <a:schemeClr val="accent1"/>
+          </a:effectRef>
+          <a:fontRef idx="minor">
+            <a:schemeClr val="lt1"/>
+          </a:fontRef>
+        </p:style>
+        <p:txBody>
+          <a:bodyPr rtlCol="0" anchor="ctr"/>
+          <a:lstStyle/>
+          <a:p>
+            <a:pPr algn="ctr"/>
+            <a:endParaRPr lang="en-GB" dirty="0"/>
+          </a:p>
+        </p:txBody>
+      </p:sp>
+      <p:sp>
+        <p:nvSpPr>
+          <p:cNvPr id="32" name="Oval 31">
+            <a:extLst>
+              <a:ext uri="{FF2B5EF4-FFF2-40B4-BE49-F238E27FC236}">
+                <a16:creationId xmlns:a16="http://schemas.microsoft.com/office/drawing/2014/main" id="{0951B07D-118B-DC02-3621-6C429B81D51A}"/>
+              </a:ext>
+            </a:extLst>
+          </p:cNvPr>
+          <p:cNvSpPr>
+            <a:spLocks/>
+          </p:cNvSpPr>
+          <p:nvPr/>
+        </p:nvSpPr>
+        <p:spPr>
+          <a:xfrm>
+            <a:off x="6276773" y="3317702"/>
+            <a:ext cx="445464" cy="298794"/>
+          </a:xfrm>
+          <a:prstGeom prst="ellipse">
+            <a:avLst/>
+          </a:prstGeom>
+          <a:noFill/>
+          <a:ln w="28575">
+            <a:solidFill>
+              <a:srgbClr val="CD44FE"/>
+            </a:solidFill>
+          </a:ln>
+        </p:spPr>
+        <p:style>
+          <a:lnRef idx="2">
+            <a:schemeClr val="accent1">
+              <a:shade val="15000"/>
+            </a:schemeClr>
+          </a:lnRef>
+          <a:fillRef idx="1">
+            <a:schemeClr val="accent1"/>
+          </a:fillRef>
+          <a:effectRef idx="0">
+            <a:schemeClr val="accent1"/>
+          </a:effectRef>
+          <a:fontRef idx="minor">
+            <a:schemeClr val="lt1"/>
+          </a:fontRef>
+        </p:style>
+        <p:txBody>
+          <a:bodyPr rtlCol="0" anchor="ctr"/>
+          <a:lstStyle/>
+          <a:p>
+            <a:pPr algn="ctr"/>
+            <a:endParaRPr lang="en-GB" dirty="0"/>
+          </a:p>
+        </p:txBody>
+      </p:sp>
+      <p:sp>
+        <p:nvSpPr>
+          <p:cNvPr id="33" name="Oval 32">
+            <a:extLst>
+              <a:ext uri="{FF2B5EF4-FFF2-40B4-BE49-F238E27FC236}">
+                <a16:creationId xmlns:a16="http://schemas.microsoft.com/office/drawing/2014/main" id="{32A1553A-5CB8-2FAA-C82A-2E152ADE83B3}"/>
+              </a:ext>
+            </a:extLst>
+          </p:cNvPr>
+          <p:cNvSpPr>
+            <a:spLocks/>
+          </p:cNvSpPr>
+          <p:nvPr/>
+        </p:nvSpPr>
+        <p:spPr>
+          <a:xfrm>
+            <a:off x="8349960" y="3249624"/>
+            <a:ext cx="461242" cy="361825"/>
+          </a:xfrm>
+          <a:prstGeom prst="ellipse">
+            <a:avLst/>
+          </a:prstGeom>
+          <a:noFill/>
+          <a:ln w="28575">
+            <a:solidFill>
+              <a:srgbClr val="CD44FE"/>
+            </a:solidFill>
+          </a:ln>
+        </p:spPr>
+        <p:style>
+          <a:lnRef idx="2">
+            <a:schemeClr val="accent1">
+              <a:shade val="15000"/>
+            </a:schemeClr>
+          </a:lnRef>
+          <a:fillRef idx="1">
+            <a:schemeClr val="accent1"/>
+          </a:fillRef>
+          <a:effectRef idx="0">
+            <a:schemeClr val="accent1"/>
+          </a:effectRef>
+          <a:fontRef idx="minor">
+            <a:schemeClr val="lt1"/>
+          </a:fontRef>
+        </p:style>
+        <p:txBody>
+          <a:bodyPr rtlCol="0" anchor="ctr"/>
+          <a:lstStyle/>
+          <a:p>
+            <a:pPr algn="ctr"/>
+            <a:endParaRPr lang="en-GB" dirty="0"/>
+          </a:p>
+        </p:txBody>
+      </p:sp>
+      <p:sp>
+        <p:nvSpPr>
+          <p:cNvPr id="34" name="Oval 33">
+            <a:extLst>
+              <a:ext uri="{FF2B5EF4-FFF2-40B4-BE49-F238E27FC236}">
+                <a16:creationId xmlns:a16="http://schemas.microsoft.com/office/drawing/2014/main" id="{AB7E6101-844D-B73A-3FE2-A95251A6229C}"/>
+              </a:ext>
+            </a:extLst>
+          </p:cNvPr>
+          <p:cNvSpPr>
+            <a:spLocks/>
+          </p:cNvSpPr>
+          <p:nvPr/>
+        </p:nvSpPr>
+        <p:spPr>
+          <a:xfrm>
+            <a:off x="4120863" y="5488198"/>
+            <a:ext cx="485464" cy="314389"/>
+          </a:xfrm>
+          <a:prstGeom prst="ellipse">
+            <a:avLst/>
+          </a:prstGeom>
+          <a:noFill/>
+          <a:ln w="28575">
+            <a:solidFill>
+              <a:srgbClr val="CD44FE"/>
+            </a:solidFill>
+          </a:ln>
+        </p:spPr>
+        <p:style>
+          <a:lnRef idx="2">
+            <a:schemeClr val="accent1">
+              <a:shade val="15000"/>
+            </a:schemeClr>
+          </a:lnRef>
+          <a:fillRef idx="1">
+            <a:schemeClr val="accent1"/>
+          </a:fillRef>
+          <a:effectRef idx="0">
+            <a:schemeClr val="accent1"/>
+          </a:effectRef>
+          <a:fontRef idx="minor">
+            <a:schemeClr val="lt1"/>
+          </a:fontRef>
+        </p:style>
+        <p:txBody>
+          <a:bodyPr rtlCol="0" anchor="ctr"/>
+          <a:lstStyle/>
+          <a:p>
+            <a:pPr algn="ctr"/>
+            <a:endParaRPr lang="en-GB" dirty="0"/>
+          </a:p>
+        </p:txBody>
+      </p:sp>
+      <p:sp>
+        <p:nvSpPr>
+          <p:cNvPr id="36" name="Oval 35">
+            <a:extLst>
+              <a:ext uri="{FF2B5EF4-FFF2-40B4-BE49-F238E27FC236}">
+                <a16:creationId xmlns:a16="http://schemas.microsoft.com/office/drawing/2014/main" id="{F39418BD-16C6-34A8-4CE9-5EB399BA8FEB}"/>
+              </a:ext>
+            </a:extLst>
+          </p:cNvPr>
+          <p:cNvSpPr>
+            <a:spLocks/>
+          </p:cNvSpPr>
+          <p:nvPr/>
+        </p:nvSpPr>
+        <p:spPr>
+          <a:xfrm>
+            <a:off x="4514978" y="678231"/>
+            <a:ext cx="396406" cy="448734"/>
+          </a:xfrm>
+          <a:prstGeom prst="ellipse">
+            <a:avLst/>
+          </a:prstGeom>
+          <a:noFill/>
+          <a:ln w="28575">
+            <a:solidFill>
+              <a:schemeClr val="accent2">
+                <a:lumMod val="50000"/>
+              </a:schemeClr>
+            </a:solidFill>
+          </a:ln>
+        </p:spPr>
+        <p:style>
+          <a:lnRef idx="2">
+            <a:schemeClr val="accent1">
+              <a:shade val="15000"/>
+            </a:schemeClr>
+          </a:lnRef>
+          <a:fillRef idx="1">
+            <a:schemeClr val="accent1"/>
+          </a:fillRef>
+          <a:effectRef idx="0">
+            <a:schemeClr val="accent1"/>
+          </a:effectRef>
+          <a:fontRef idx="minor">
+            <a:schemeClr val="lt1"/>
+          </a:fontRef>
+        </p:style>
+        <p:txBody>
+          <a:bodyPr rtlCol="0" anchor="ctr"/>
+          <a:lstStyle/>
+          <a:p>
+            <a:pPr algn="ctr"/>
+            <a:endParaRPr lang="en-GB" dirty="0"/>
+          </a:p>
+        </p:txBody>
+      </p:sp>
+      <p:sp>
+        <p:nvSpPr>
+          <p:cNvPr id="37" name="Oval 36">
+            <a:extLst>
+              <a:ext uri="{FF2B5EF4-FFF2-40B4-BE49-F238E27FC236}">
+                <a16:creationId xmlns:a16="http://schemas.microsoft.com/office/drawing/2014/main" id="{32DEA4F2-5A96-8B6A-F092-8348ACB9693D}"/>
+              </a:ext>
+            </a:extLst>
+          </p:cNvPr>
+          <p:cNvSpPr>
+            <a:spLocks/>
+          </p:cNvSpPr>
+          <p:nvPr/>
+        </p:nvSpPr>
+        <p:spPr>
+          <a:xfrm>
+            <a:off x="5908275" y="1241039"/>
+            <a:ext cx="529856" cy="417839"/>
+          </a:xfrm>
+          <a:prstGeom prst="ellipse">
+            <a:avLst/>
+          </a:prstGeom>
+          <a:noFill/>
+          <a:ln w="28575">
+            <a:solidFill>
+              <a:schemeClr val="accent2">
+                <a:lumMod val="50000"/>
+              </a:schemeClr>
+            </a:solidFill>
+          </a:ln>
+        </p:spPr>
+        <p:style>
+          <a:lnRef idx="2">
+            <a:schemeClr val="accent1">
+              <a:shade val="15000"/>
+            </a:schemeClr>
+          </a:lnRef>
+          <a:fillRef idx="1">
+            <a:schemeClr val="accent1"/>
+          </a:fillRef>
+          <a:effectRef idx="0">
+            <a:schemeClr val="accent1"/>
+          </a:effectRef>
+          <a:fontRef idx="minor">
+            <a:schemeClr val="lt1"/>
+          </a:fontRef>
+        </p:style>
+        <p:txBody>
+          <a:bodyPr rtlCol="0" anchor="ctr"/>
+          <a:lstStyle/>
+          <a:p>
+            <a:pPr algn="ctr"/>
+            <a:endParaRPr lang="en-GB" dirty="0"/>
+          </a:p>
+        </p:txBody>
+      </p:sp>
+      <p:sp>
+        <p:nvSpPr>
+          <p:cNvPr id="38" name="Oval 37">
+            <a:extLst>
+              <a:ext uri="{FF2B5EF4-FFF2-40B4-BE49-F238E27FC236}">
+                <a16:creationId xmlns:a16="http://schemas.microsoft.com/office/drawing/2014/main" id="{03142037-44AF-5CEB-5EEE-9A95390C4EA2}"/>
+              </a:ext>
+            </a:extLst>
+          </p:cNvPr>
+          <p:cNvSpPr>
+            <a:spLocks/>
+          </p:cNvSpPr>
+          <p:nvPr/>
+        </p:nvSpPr>
+        <p:spPr>
+          <a:xfrm>
+            <a:off x="7843045" y="1160281"/>
+            <a:ext cx="487484" cy="326753"/>
+          </a:xfrm>
+          <a:prstGeom prst="ellipse">
+            <a:avLst/>
+          </a:prstGeom>
+          <a:noFill/>
+          <a:ln w="28575">
+            <a:solidFill>
+              <a:schemeClr val="accent2">
+                <a:lumMod val="50000"/>
+              </a:schemeClr>
+            </a:solidFill>
+          </a:ln>
+        </p:spPr>
+        <p:style>
+          <a:lnRef idx="2">
+            <a:schemeClr val="accent1">
+              <a:shade val="15000"/>
+            </a:schemeClr>
+          </a:lnRef>
+          <a:fillRef idx="1">
+            <a:schemeClr val="accent1"/>
+          </a:fillRef>
+          <a:effectRef idx="0">
+            <a:schemeClr val="accent1"/>
+          </a:effectRef>
+          <a:fontRef idx="minor">
+            <a:schemeClr val="lt1"/>
+          </a:fontRef>
+        </p:style>
+        <p:txBody>
+          <a:bodyPr rtlCol="0" anchor="ctr"/>
+          <a:lstStyle/>
+          <a:p>
+            <a:pPr algn="ctr"/>
+            <a:endParaRPr lang="en-GB" dirty="0"/>
+          </a:p>
+        </p:txBody>
+      </p:sp>
+      <p:sp>
+        <p:nvSpPr>
+          <p:cNvPr id="39" name="Oval 38">
+            <a:extLst>
+              <a:ext uri="{FF2B5EF4-FFF2-40B4-BE49-F238E27FC236}">
+                <a16:creationId xmlns:a16="http://schemas.microsoft.com/office/drawing/2014/main" id="{24035077-D215-F368-DE1E-B905FC0E0762}"/>
+              </a:ext>
+            </a:extLst>
+          </p:cNvPr>
+          <p:cNvSpPr>
+            <a:spLocks/>
+          </p:cNvSpPr>
+          <p:nvPr/>
+        </p:nvSpPr>
+        <p:spPr>
+          <a:xfrm>
+            <a:off x="3626946" y="3334632"/>
+            <a:ext cx="557118" cy="376427"/>
+          </a:xfrm>
+          <a:prstGeom prst="ellipse">
+            <a:avLst/>
+          </a:prstGeom>
+          <a:noFill/>
+          <a:ln w="28575">
+            <a:solidFill>
+              <a:schemeClr val="accent2">
+                <a:lumMod val="50000"/>
+              </a:schemeClr>
+            </a:solidFill>
+          </a:ln>
+        </p:spPr>
+        <p:style>
+          <a:lnRef idx="2">
+            <a:schemeClr val="accent1">
+              <a:shade val="15000"/>
+            </a:schemeClr>
+          </a:lnRef>
+          <a:fillRef idx="1">
+            <a:schemeClr val="accent1"/>
+          </a:fillRef>
+          <a:effectRef idx="0">
+            <a:schemeClr val="accent1"/>
+          </a:effectRef>
+          <a:fontRef idx="minor">
+            <a:schemeClr val="lt1"/>
+          </a:fontRef>
+        </p:style>
+        <p:txBody>
+          <a:bodyPr rtlCol="0" anchor="ctr"/>
+          <a:lstStyle/>
+          <a:p>
+            <a:pPr algn="ctr"/>
+            <a:endParaRPr lang="en-GB" dirty="0"/>
+          </a:p>
+        </p:txBody>
+      </p:sp>
+      <p:sp>
+        <p:nvSpPr>
+          <p:cNvPr id="40" name="Oval 39">
+            <a:extLst>
+              <a:ext uri="{FF2B5EF4-FFF2-40B4-BE49-F238E27FC236}">
+                <a16:creationId xmlns:a16="http://schemas.microsoft.com/office/drawing/2014/main" id="{464C760A-C2DC-80F4-97C9-3E322186B65D}"/>
+              </a:ext>
+            </a:extLst>
+          </p:cNvPr>
+          <p:cNvSpPr>
+            <a:spLocks/>
+          </p:cNvSpPr>
+          <p:nvPr/>
+        </p:nvSpPr>
+        <p:spPr>
+          <a:xfrm>
+            <a:off x="5766854" y="3438447"/>
+            <a:ext cx="478161" cy="386062"/>
+          </a:xfrm>
+          <a:prstGeom prst="ellipse">
+            <a:avLst/>
+          </a:prstGeom>
+          <a:noFill/>
+          <a:ln w="28575">
+            <a:solidFill>
+              <a:schemeClr val="accent2">
+                <a:lumMod val="50000"/>
+              </a:schemeClr>
+            </a:solidFill>
+          </a:ln>
+        </p:spPr>
+        <p:style>
+          <a:lnRef idx="2">
+            <a:schemeClr val="accent1">
+              <a:shade val="15000"/>
+            </a:schemeClr>
+          </a:lnRef>
+          <a:fillRef idx="1">
+            <a:schemeClr val="accent1"/>
+          </a:fillRef>
+          <a:effectRef idx="0">
+            <a:schemeClr val="accent1"/>
+          </a:effectRef>
+          <a:fontRef idx="minor">
+            <a:schemeClr val="lt1"/>
+          </a:fontRef>
+        </p:style>
+        <p:txBody>
+          <a:bodyPr rtlCol="0" anchor="ctr"/>
+          <a:lstStyle/>
+          <a:p>
+            <a:pPr algn="ctr"/>
+            <a:endParaRPr lang="en-GB" dirty="0"/>
+          </a:p>
+        </p:txBody>
+      </p:sp>
+      <p:sp>
+        <p:nvSpPr>
+          <p:cNvPr id="41" name="Oval 40">
+            <a:extLst>
+              <a:ext uri="{FF2B5EF4-FFF2-40B4-BE49-F238E27FC236}">
+                <a16:creationId xmlns:a16="http://schemas.microsoft.com/office/drawing/2014/main" id="{CE90C148-8A30-BF7D-17F8-97C7599201DC}"/>
+              </a:ext>
+            </a:extLst>
+          </p:cNvPr>
+          <p:cNvSpPr>
+            <a:spLocks/>
+          </p:cNvSpPr>
+          <p:nvPr/>
+        </p:nvSpPr>
+        <p:spPr>
+          <a:xfrm>
+            <a:off x="7872737" y="3428999"/>
+            <a:ext cx="519859" cy="326753"/>
+          </a:xfrm>
+          <a:prstGeom prst="ellipse">
+            <a:avLst/>
+          </a:prstGeom>
+          <a:noFill/>
+          <a:ln w="28575">
+            <a:solidFill>
+              <a:schemeClr val="accent2">
+                <a:lumMod val="50000"/>
+              </a:schemeClr>
+            </a:solidFill>
+          </a:ln>
+        </p:spPr>
+        <p:style>
+          <a:lnRef idx="2">
+            <a:schemeClr val="accent1">
+              <a:shade val="15000"/>
+            </a:schemeClr>
+          </a:lnRef>
+          <a:fillRef idx="1">
+            <a:schemeClr val="accent1"/>
+          </a:fillRef>
+          <a:effectRef idx="0">
+            <a:schemeClr val="accent1"/>
+          </a:effectRef>
+          <a:fontRef idx="minor">
+            <a:schemeClr val="lt1"/>
+          </a:fontRef>
+        </p:style>
+        <p:txBody>
+          <a:bodyPr rtlCol="0" anchor="ctr"/>
+          <a:lstStyle/>
+          <a:p>
+            <a:pPr algn="ctr"/>
+            <a:endParaRPr lang="en-GB" dirty="0"/>
+          </a:p>
+        </p:txBody>
+      </p:sp>
+      <p:sp>
+        <p:nvSpPr>
+          <p:cNvPr id="42" name="Oval 41">
+            <a:extLst>
+              <a:ext uri="{FF2B5EF4-FFF2-40B4-BE49-F238E27FC236}">
+                <a16:creationId xmlns:a16="http://schemas.microsoft.com/office/drawing/2014/main" id="{838F879D-27A5-D193-045C-0FE48BF57473}"/>
+              </a:ext>
+            </a:extLst>
+          </p:cNvPr>
+          <p:cNvSpPr>
+            <a:spLocks/>
+          </p:cNvSpPr>
+          <p:nvPr/>
+        </p:nvSpPr>
+        <p:spPr>
+          <a:xfrm>
+            <a:off x="3676268" y="5612581"/>
+            <a:ext cx="485464" cy="341111"/>
+          </a:xfrm>
+          <a:prstGeom prst="ellipse">
+            <a:avLst/>
+          </a:prstGeom>
+          <a:noFill/>
+          <a:ln w="28575">
+            <a:solidFill>
+              <a:schemeClr val="accent2">
+                <a:lumMod val="50000"/>
+              </a:schemeClr>
+            </a:solidFill>
+          </a:ln>
+        </p:spPr>
+        <p:style>
+          <a:lnRef idx="2">
+            <a:schemeClr val="accent1">
+              <a:shade val="15000"/>
+            </a:schemeClr>
+          </a:lnRef>
+          <a:fillRef idx="1">
+            <a:schemeClr val="accent1"/>
+          </a:fillRef>
+          <a:effectRef idx="0">
+            <a:schemeClr val="accent1"/>
+          </a:effectRef>
+          <a:fontRef idx="minor">
+            <a:schemeClr val="lt1"/>
+          </a:fontRef>
+        </p:style>
+        <p:txBody>
+          <a:bodyPr rtlCol="0" anchor="ctr"/>
+          <a:lstStyle/>
+          <a:p>
+            <a:pPr algn="ctr"/>
+            <a:endParaRPr lang="en-GB" dirty="0"/>
+          </a:p>
+        </p:txBody>
+      </p:sp>
+      <p:sp>
+        <p:nvSpPr>
+          <p:cNvPr id="2" name="Rectangle: Rounded Corners 1">
+            <a:extLst>
+              <a:ext uri="{FF2B5EF4-FFF2-40B4-BE49-F238E27FC236}">
+                <a16:creationId xmlns:a16="http://schemas.microsoft.com/office/drawing/2014/main" id="{B58A78D6-6614-371C-61CB-759F4A781714}"/>
+              </a:ext>
+            </a:extLst>
+          </p:cNvPr>
+          <p:cNvSpPr/>
+          <p:nvPr/>
+        </p:nvSpPr>
+        <p:spPr>
+          <a:xfrm>
+            <a:off x="5186021" y="4809430"/>
+            <a:ext cx="374946" cy="1144262"/>
+          </a:xfrm>
+          <a:prstGeom prst="roundRect">
+            <a:avLst/>
+          </a:prstGeom>
+          <a:noFill/>
+          <a:ln w="28575">
+            <a:solidFill>
+              <a:schemeClr val="tx2"/>
+            </a:solidFill>
+          </a:ln>
+        </p:spPr>
+        <p:style>
+          <a:lnRef idx="2">
+            <a:schemeClr val="accent1">
+              <a:shade val="15000"/>
+            </a:schemeClr>
+          </a:lnRef>
+          <a:fillRef idx="1">
+            <a:schemeClr val="accent1"/>
+          </a:fillRef>
+          <a:effectRef idx="0">
+            <a:schemeClr val="accent1"/>
+          </a:effectRef>
+          <a:fontRef idx="minor">
+            <a:schemeClr val="lt1"/>
+          </a:fontRef>
+        </p:style>
+        <p:txBody>
+          <a:bodyPr rtlCol="0" anchor="ctr"/>
+          <a:lstStyle/>
+          <a:p>
+            <a:pPr algn="ctr"/>
+            <a:endParaRPr lang="en-GB"/>
+          </a:p>
+        </p:txBody>
+      </p:sp>
+      <p:sp>
+        <p:nvSpPr>
+          <p:cNvPr id="3" name="Rectangle: Rounded Corners 2">
+            <a:extLst>
+              <a:ext uri="{FF2B5EF4-FFF2-40B4-BE49-F238E27FC236}">
+                <a16:creationId xmlns:a16="http://schemas.microsoft.com/office/drawing/2014/main" id="{00593D88-5766-7BF9-EF61-C0A6816D42BA}"/>
+              </a:ext>
+            </a:extLst>
+          </p:cNvPr>
+          <p:cNvSpPr/>
+          <p:nvPr/>
+        </p:nvSpPr>
+        <p:spPr>
+          <a:xfrm>
+            <a:off x="5574786" y="4792208"/>
+            <a:ext cx="333488" cy="1161483"/>
+          </a:xfrm>
+          <a:prstGeom prst="roundRect">
+            <a:avLst/>
+          </a:prstGeom>
+          <a:noFill/>
+          <a:ln w="28575">
+            <a:solidFill>
+              <a:schemeClr val="accent6">
+                <a:lumMod val="60000"/>
+                <a:lumOff val="40000"/>
+              </a:schemeClr>
+            </a:solidFill>
+          </a:ln>
+        </p:spPr>
+        <p:style>
+          <a:lnRef idx="2">
+            <a:schemeClr val="accent1">
+              <a:shade val="15000"/>
+            </a:schemeClr>
+          </a:lnRef>
+          <a:fillRef idx="1">
+            <a:schemeClr val="accent1"/>
+          </a:fillRef>
+          <a:effectRef idx="0">
+            <a:schemeClr val="accent1"/>
+          </a:effectRef>
+          <a:fontRef idx="minor">
+            <a:schemeClr val="lt1"/>
+          </a:fontRef>
+        </p:style>
+        <p:txBody>
+          <a:bodyPr rtlCol="0" anchor="ctr"/>
+          <a:lstStyle/>
+          <a:p>
+            <a:pPr algn="ctr"/>
+            <a:endParaRPr lang="en-GB"/>
+          </a:p>
+        </p:txBody>
+      </p:sp>
+      <p:sp>
+        <p:nvSpPr>
+          <p:cNvPr id="44" name="Rectangle: Rounded Corners 43">
+            <a:extLst>
+              <a:ext uri="{FF2B5EF4-FFF2-40B4-BE49-F238E27FC236}">
+                <a16:creationId xmlns:a16="http://schemas.microsoft.com/office/drawing/2014/main" id="{AEE1E334-4927-D85A-EA3C-A0FE0DF65359}"/>
+              </a:ext>
+            </a:extLst>
+          </p:cNvPr>
+          <p:cNvSpPr/>
+          <p:nvPr/>
+        </p:nvSpPr>
+        <p:spPr>
+          <a:xfrm>
+            <a:off x="5908274" y="4734893"/>
+            <a:ext cx="333488" cy="1218798"/>
+          </a:xfrm>
+          <a:prstGeom prst="roundRect">
             <a:avLst/>
           </a:prstGeom>
           <a:noFill/>
@@ -4853,30 +5749,28 @@
           <a:lstStyle/>
           <a:p>
             <a:pPr algn="ctr"/>
-            <a:endParaRPr lang="en-GB" dirty="0"/>
-          </a:p>
-        </p:txBody>
-      </p:sp>
-      <p:sp>
-        <p:nvSpPr>
-          <p:cNvPr id="29" name="Oval 28">
-            <a:extLst>
-              <a:ext uri="{FF2B5EF4-FFF2-40B4-BE49-F238E27FC236}">
-                <a16:creationId xmlns:a16="http://schemas.microsoft.com/office/drawing/2014/main" id="{71DDCFA3-54AC-575C-3C52-811DAED07281}"/>
-              </a:ext>
-            </a:extLst>
-          </p:cNvPr>
-          <p:cNvSpPr>
-            <a:spLocks/>
-          </p:cNvSpPr>
+            <a:endParaRPr lang="en-GB"/>
+          </a:p>
+        </p:txBody>
+      </p:sp>
+      <p:sp>
+        <p:nvSpPr>
+          <p:cNvPr id="46" name="Rectangle: Rounded Corners 45">
+            <a:extLst>
+              <a:ext uri="{FF2B5EF4-FFF2-40B4-BE49-F238E27FC236}">
+                <a16:creationId xmlns:a16="http://schemas.microsoft.com/office/drawing/2014/main" id="{4066D44D-1610-C6EE-146E-5781766F0013}"/>
+              </a:ext>
+            </a:extLst>
+          </p:cNvPr>
+          <p:cNvSpPr/>
           <p:nvPr/>
         </p:nvSpPr>
         <p:spPr>
           <a:xfrm>
-            <a:off x="6416952" y="1102048"/>
-            <a:ext cx="529856" cy="352993"/>
-          </a:xfrm>
-          <a:prstGeom prst="ellipse">
+            <a:off x="6241762" y="4734893"/>
+            <a:ext cx="368499" cy="1238582"/>
+          </a:xfrm>
+          <a:prstGeom prst="roundRect">
             <a:avLst/>
           </a:prstGeom>
           <a:noFill/>
@@ -4907,354 +5801,28 @@
           <a:lstStyle/>
           <a:p>
             <a:pPr algn="ctr"/>
-            <a:endParaRPr lang="en-GB" dirty="0"/>
-          </a:p>
-        </p:txBody>
-      </p:sp>
-      <p:sp>
-        <p:nvSpPr>
-          <p:cNvPr id="30" name="Oval 29">
-            <a:extLst>
-              <a:ext uri="{FF2B5EF4-FFF2-40B4-BE49-F238E27FC236}">
-                <a16:creationId xmlns:a16="http://schemas.microsoft.com/office/drawing/2014/main" id="{D7ABF877-351F-EC84-5D57-328CB61AB8B4}"/>
-              </a:ext>
-            </a:extLst>
-          </p:cNvPr>
-          <p:cNvSpPr>
-            <a:spLocks/>
-          </p:cNvSpPr>
+            <a:endParaRPr lang="en-GB"/>
+          </a:p>
+        </p:txBody>
+      </p:sp>
+      <p:sp>
+        <p:nvSpPr>
+          <p:cNvPr id="47" name="Rectangle: Rounded Corners 46">
+            <a:extLst>
+              <a:ext uri="{FF2B5EF4-FFF2-40B4-BE49-F238E27FC236}">
+                <a16:creationId xmlns:a16="http://schemas.microsoft.com/office/drawing/2014/main" id="{35D541F5-85E5-E2D0-0E91-DF0AC98AC51A}"/>
+              </a:ext>
+            </a:extLst>
+          </p:cNvPr>
+          <p:cNvSpPr/>
           <p:nvPr/>
         </p:nvSpPr>
         <p:spPr>
           <a:xfrm>
-            <a:off x="8330529" y="1058300"/>
-            <a:ext cx="471342" cy="302197"/>
-          </a:xfrm>
-          <a:prstGeom prst="ellipse">
-            <a:avLst/>
-          </a:prstGeom>
-          <a:noFill/>
-          <a:ln w="28575">
-            <a:solidFill>
-              <a:srgbClr val="CD44FE"/>
-            </a:solidFill>
-          </a:ln>
-        </p:spPr>
-        <p:style>
-          <a:lnRef idx="2">
-            <a:schemeClr val="accent1">
-              <a:shade val="15000"/>
-            </a:schemeClr>
-          </a:lnRef>
-          <a:fillRef idx="1">
-            <a:schemeClr val="accent1"/>
-          </a:fillRef>
-          <a:effectRef idx="0">
-            <a:schemeClr val="accent1"/>
-          </a:effectRef>
-          <a:fontRef idx="minor">
-            <a:schemeClr val="lt1"/>
-          </a:fontRef>
-        </p:style>
-        <p:txBody>
-          <a:bodyPr rtlCol="0" anchor="ctr"/>
-          <a:lstStyle/>
-          <a:p>
-            <a:pPr algn="ctr"/>
-            <a:endParaRPr lang="en-GB" dirty="0"/>
-          </a:p>
-        </p:txBody>
-      </p:sp>
-      <p:sp>
-        <p:nvSpPr>
-          <p:cNvPr id="31" name="Oval 30">
-            <a:extLst>
-              <a:ext uri="{FF2B5EF4-FFF2-40B4-BE49-F238E27FC236}">
-                <a16:creationId xmlns:a16="http://schemas.microsoft.com/office/drawing/2014/main" id="{E4EDD481-E2C8-D4C2-F439-A2F76BE7E749}"/>
-              </a:ext>
-            </a:extLst>
-          </p:cNvPr>
-          <p:cNvSpPr>
-            <a:spLocks/>
-          </p:cNvSpPr>
-          <p:nvPr/>
-        </p:nvSpPr>
-        <p:spPr>
-          <a:xfrm>
-            <a:off x="4129191" y="3220080"/>
-            <a:ext cx="557118" cy="314389"/>
-          </a:xfrm>
-          <a:prstGeom prst="ellipse">
-            <a:avLst/>
-          </a:prstGeom>
-          <a:noFill/>
-          <a:ln w="28575">
-            <a:solidFill>
-              <a:srgbClr val="CD44FE"/>
-            </a:solidFill>
-          </a:ln>
-        </p:spPr>
-        <p:style>
-          <a:lnRef idx="2">
-            <a:schemeClr val="accent1">
-              <a:shade val="15000"/>
-            </a:schemeClr>
-          </a:lnRef>
-          <a:fillRef idx="1">
-            <a:schemeClr val="accent1"/>
-          </a:fillRef>
-          <a:effectRef idx="0">
-            <a:schemeClr val="accent1"/>
-          </a:effectRef>
-          <a:fontRef idx="minor">
-            <a:schemeClr val="lt1"/>
-          </a:fontRef>
-        </p:style>
-        <p:txBody>
-          <a:bodyPr rtlCol="0" anchor="ctr"/>
-          <a:lstStyle/>
-          <a:p>
-            <a:pPr algn="ctr"/>
-            <a:endParaRPr lang="en-GB" dirty="0"/>
-          </a:p>
-        </p:txBody>
-      </p:sp>
-      <p:sp>
-        <p:nvSpPr>
-          <p:cNvPr id="32" name="Oval 31">
-            <a:extLst>
-              <a:ext uri="{FF2B5EF4-FFF2-40B4-BE49-F238E27FC236}">
-                <a16:creationId xmlns:a16="http://schemas.microsoft.com/office/drawing/2014/main" id="{0951B07D-118B-DC02-3621-6C429B81D51A}"/>
-              </a:ext>
-            </a:extLst>
-          </p:cNvPr>
-          <p:cNvSpPr>
-            <a:spLocks/>
-          </p:cNvSpPr>
-          <p:nvPr/>
-        </p:nvSpPr>
-        <p:spPr>
-          <a:xfrm>
-            <a:off x="6276773" y="3317702"/>
-            <a:ext cx="445464" cy="298794"/>
-          </a:xfrm>
-          <a:prstGeom prst="ellipse">
-            <a:avLst/>
-          </a:prstGeom>
-          <a:noFill/>
-          <a:ln w="28575">
-            <a:solidFill>
-              <a:srgbClr val="CD44FE"/>
-            </a:solidFill>
-          </a:ln>
-        </p:spPr>
-        <p:style>
-          <a:lnRef idx="2">
-            <a:schemeClr val="accent1">
-              <a:shade val="15000"/>
-            </a:schemeClr>
-          </a:lnRef>
-          <a:fillRef idx="1">
-            <a:schemeClr val="accent1"/>
-          </a:fillRef>
-          <a:effectRef idx="0">
-            <a:schemeClr val="accent1"/>
-          </a:effectRef>
-          <a:fontRef idx="minor">
-            <a:schemeClr val="lt1"/>
-          </a:fontRef>
-        </p:style>
-        <p:txBody>
-          <a:bodyPr rtlCol="0" anchor="ctr"/>
-          <a:lstStyle/>
-          <a:p>
-            <a:pPr algn="ctr"/>
-            <a:endParaRPr lang="en-GB" dirty="0"/>
-          </a:p>
-        </p:txBody>
-      </p:sp>
-      <p:sp>
-        <p:nvSpPr>
-          <p:cNvPr id="33" name="Oval 32">
-            <a:extLst>
-              <a:ext uri="{FF2B5EF4-FFF2-40B4-BE49-F238E27FC236}">
-                <a16:creationId xmlns:a16="http://schemas.microsoft.com/office/drawing/2014/main" id="{32A1553A-5CB8-2FAA-C82A-2E152ADE83B3}"/>
-              </a:ext>
-            </a:extLst>
-          </p:cNvPr>
-          <p:cNvSpPr>
-            <a:spLocks/>
-          </p:cNvSpPr>
-          <p:nvPr/>
-        </p:nvSpPr>
-        <p:spPr>
-          <a:xfrm>
-            <a:off x="8349960" y="3249624"/>
-            <a:ext cx="461242" cy="361825"/>
-          </a:xfrm>
-          <a:prstGeom prst="ellipse">
-            <a:avLst/>
-          </a:prstGeom>
-          <a:noFill/>
-          <a:ln w="28575">
-            <a:solidFill>
-              <a:srgbClr val="CD44FE"/>
-            </a:solidFill>
-          </a:ln>
-        </p:spPr>
-        <p:style>
-          <a:lnRef idx="2">
-            <a:schemeClr val="accent1">
-              <a:shade val="15000"/>
-            </a:schemeClr>
-          </a:lnRef>
-          <a:fillRef idx="1">
-            <a:schemeClr val="accent1"/>
-          </a:fillRef>
-          <a:effectRef idx="0">
-            <a:schemeClr val="accent1"/>
-          </a:effectRef>
-          <a:fontRef idx="minor">
-            <a:schemeClr val="lt1"/>
-          </a:fontRef>
-        </p:style>
-        <p:txBody>
-          <a:bodyPr rtlCol="0" anchor="ctr"/>
-          <a:lstStyle/>
-          <a:p>
-            <a:pPr algn="ctr"/>
-            <a:endParaRPr lang="en-GB" dirty="0"/>
-          </a:p>
-        </p:txBody>
-      </p:sp>
-      <p:sp>
-        <p:nvSpPr>
-          <p:cNvPr id="34" name="Oval 33">
-            <a:extLst>
-              <a:ext uri="{FF2B5EF4-FFF2-40B4-BE49-F238E27FC236}">
-                <a16:creationId xmlns:a16="http://schemas.microsoft.com/office/drawing/2014/main" id="{AB7E6101-844D-B73A-3FE2-A95251A6229C}"/>
-              </a:ext>
-            </a:extLst>
-          </p:cNvPr>
-          <p:cNvSpPr>
-            <a:spLocks/>
-          </p:cNvSpPr>
-          <p:nvPr/>
-        </p:nvSpPr>
-        <p:spPr>
-          <a:xfrm>
-            <a:off x="4120863" y="5488198"/>
-            <a:ext cx="485464" cy="314389"/>
-          </a:xfrm>
-          <a:prstGeom prst="ellipse">
-            <a:avLst/>
-          </a:prstGeom>
-          <a:noFill/>
-          <a:ln w="28575">
-            <a:solidFill>
-              <a:srgbClr val="CD44FE"/>
-            </a:solidFill>
-          </a:ln>
-        </p:spPr>
-        <p:style>
-          <a:lnRef idx="2">
-            <a:schemeClr val="accent1">
-              <a:shade val="15000"/>
-            </a:schemeClr>
-          </a:lnRef>
-          <a:fillRef idx="1">
-            <a:schemeClr val="accent1"/>
-          </a:fillRef>
-          <a:effectRef idx="0">
-            <a:schemeClr val="accent1"/>
-          </a:effectRef>
-          <a:fontRef idx="minor">
-            <a:schemeClr val="lt1"/>
-          </a:fontRef>
-        </p:style>
-        <p:txBody>
-          <a:bodyPr rtlCol="0" anchor="ctr"/>
-          <a:lstStyle/>
-          <a:p>
-            <a:pPr algn="ctr"/>
-            <a:endParaRPr lang="en-GB" dirty="0"/>
-          </a:p>
-        </p:txBody>
-      </p:sp>
-      <p:sp>
-        <p:nvSpPr>
-          <p:cNvPr id="35" name="Oval 34">
-            <a:extLst>
-              <a:ext uri="{FF2B5EF4-FFF2-40B4-BE49-F238E27FC236}">
-                <a16:creationId xmlns:a16="http://schemas.microsoft.com/office/drawing/2014/main" id="{BC245D75-A14F-69E9-7F25-47DC98B219FA}"/>
-              </a:ext>
-            </a:extLst>
-          </p:cNvPr>
-          <p:cNvSpPr>
-            <a:spLocks/>
-          </p:cNvSpPr>
-          <p:nvPr/>
-        </p:nvSpPr>
-        <p:spPr>
-          <a:xfrm>
-            <a:off x="6207020" y="5864624"/>
-            <a:ext cx="327004" cy="268278"/>
-          </a:xfrm>
-          <a:prstGeom prst="ellipse">
-            <a:avLst/>
-          </a:prstGeom>
-          <a:noFill/>
-          <a:ln w="28575">
-            <a:solidFill>
-              <a:srgbClr val="CD44FE"/>
-            </a:solidFill>
-          </a:ln>
-        </p:spPr>
-        <p:style>
-          <a:lnRef idx="2">
-            <a:schemeClr val="accent1">
-              <a:shade val="15000"/>
-            </a:schemeClr>
-          </a:lnRef>
-          <a:fillRef idx="1">
-            <a:schemeClr val="accent1"/>
-          </a:fillRef>
-          <a:effectRef idx="0">
-            <a:schemeClr val="accent1"/>
-          </a:effectRef>
-          <a:fontRef idx="minor">
-            <a:schemeClr val="lt1"/>
-          </a:fontRef>
-        </p:style>
-        <p:txBody>
-          <a:bodyPr rtlCol="0" anchor="ctr"/>
-          <a:lstStyle/>
-          <a:p>
-            <a:pPr algn="ctr"/>
-            <a:endParaRPr lang="en-GB" dirty="0"/>
-          </a:p>
-        </p:txBody>
-      </p:sp>
-      <p:sp>
-        <p:nvSpPr>
-          <p:cNvPr id="36" name="Oval 35">
-            <a:extLst>
-              <a:ext uri="{FF2B5EF4-FFF2-40B4-BE49-F238E27FC236}">
-                <a16:creationId xmlns:a16="http://schemas.microsoft.com/office/drawing/2014/main" id="{F39418BD-16C6-34A8-4CE9-5EB399BA8FEB}"/>
-              </a:ext>
-            </a:extLst>
-          </p:cNvPr>
-          <p:cNvSpPr>
-            <a:spLocks/>
-          </p:cNvSpPr>
-          <p:nvPr/>
-        </p:nvSpPr>
-        <p:spPr>
-          <a:xfrm>
-            <a:off x="4354266" y="709125"/>
-            <a:ext cx="557118" cy="417839"/>
-          </a:xfrm>
-          <a:prstGeom prst="ellipse">
+            <a:off x="6649081" y="4754677"/>
+            <a:ext cx="386352" cy="1218798"/>
+          </a:xfrm>
+          <a:prstGeom prst="roundRect">
             <a:avLst/>
           </a:prstGeom>
           <a:noFill/>
@@ -5287,39 +5855,33 @@
           <a:lstStyle/>
           <a:p>
             <a:pPr algn="ctr"/>
-            <a:endParaRPr lang="en-GB" dirty="0"/>
-          </a:p>
-        </p:txBody>
-      </p:sp>
-      <p:sp>
-        <p:nvSpPr>
-          <p:cNvPr id="37" name="Oval 36">
-            <a:extLst>
-              <a:ext uri="{FF2B5EF4-FFF2-40B4-BE49-F238E27FC236}">
-                <a16:creationId xmlns:a16="http://schemas.microsoft.com/office/drawing/2014/main" id="{32DEA4F2-5A96-8B6A-F092-8348ACB9693D}"/>
-              </a:ext>
-            </a:extLst>
-          </p:cNvPr>
-          <p:cNvSpPr>
-            <a:spLocks/>
-          </p:cNvSpPr>
+            <a:endParaRPr lang="en-GB"/>
+          </a:p>
+        </p:txBody>
+      </p:sp>
+      <p:sp>
+        <p:nvSpPr>
+          <p:cNvPr id="48" name="Rectangle 47">
+            <a:extLst>
+              <a:ext uri="{FF2B5EF4-FFF2-40B4-BE49-F238E27FC236}">
+                <a16:creationId xmlns:a16="http://schemas.microsoft.com/office/drawing/2014/main" id="{37D5C036-C703-2256-271C-990636ED0D34}"/>
+              </a:ext>
+            </a:extLst>
+          </p:cNvPr>
+          <p:cNvSpPr/>
           <p:nvPr/>
         </p:nvSpPr>
         <p:spPr>
           <a:xfrm>
-            <a:off x="5908275" y="1241039"/>
-            <a:ext cx="529856" cy="417839"/>
-          </a:xfrm>
-          <a:prstGeom prst="ellipse">
+            <a:off x="5673893" y="4546160"/>
+            <a:ext cx="844214" cy="168949"/>
+          </a:xfrm>
+          <a:prstGeom prst="rect">
             <a:avLst/>
           </a:prstGeom>
           <a:noFill/>
-          <a:ln w="28575">
-            <a:solidFill>
-              <a:schemeClr val="accent2">
-                <a:lumMod val="50000"/>
-              </a:schemeClr>
-            </a:solidFill>
+          <a:ln>
+            <a:noFill/>
           </a:ln>
         </p:spPr>
         <p:style>
@@ -5343,39 +5905,40 @@
           <a:lstStyle/>
           <a:p>
             <a:pPr algn="ctr"/>
-            <a:endParaRPr lang="en-GB" dirty="0"/>
-          </a:p>
-        </p:txBody>
-      </p:sp>
-      <p:sp>
-        <p:nvSpPr>
-          <p:cNvPr id="38" name="Oval 37">
-            <a:extLst>
-              <a:ext uri="{FF2B5EF4-FFF2-40B4-BE49-F238E27FC236}">
-                <a16:creationId xmlns:a16="http://schemas.microsoft.com/office/drawing/2014/main" id="{03142037-44AF-5CEB-5EEE-9A95390C4EA2}"/>
-              </a:ext>
-            </a:extLst>
-          </p:cNvPr>
-          <p:cNvSpPr>
-            <a:spLocks/>
-          </p:cNvSpPr>
+            <a:r>
+              <a:rPr lang="nb-NO" sz="1000" b="1" noProof="1">
+                <a:solidFill>
+                  <a:schemeClr val="tx1"/>
+                </a:solidFill>
+              </a:rPr>
+              <a:t>Facing Arc</a:t>
+            </a:r>
+          </a:p>
+        </p:txBody>
+      </p:sp>
+      <p:sp>
+        <p:nvSpPr>
+          <p:cNvPr id="49" name="Rectangle 48">
+            <a:extLst>
+              <a:ext uri="{FF2B5EF4-FFF2-40B4-BE49-F238E27FC236}">
+                <a16:creationId xmlns:a16="http://schemas.microsoft.com/office/drawing/2014/main" id="{F4387C63-6ABA-C665-6CAC-7BF94862E8FA}"/>
+              </a:ext>
+            </a:extLst>
+          </p:cNvPr>
+          <p:cNvSpPr/>
           <p:nvPr/>
         </p:nvSpPr>
         <p:spPr>
           <a:xfrm>
-            <a:off x="7843045" y="1160281"/>
-            <a:ext cx="487484" cy="326753"/>
-          </a:xfrm>
-          <a:prstGeom prst="ellipse">
+            <a:off x="5574786" y="6206718"/>
+            <a:ext cx="1069326" cy="225851"/>
+          </a:xfrm>
+          <a:prstGeom prst="rect">
             <a:avLst/>
           </a:prstGeom>
           <a:noFill/>
-          <a:ln w="28575">
-            <a:solidFill>
-              <a:schemeClr val="accent2">
-                <a:lumMod val="50000"/>
-              </a:schemeClr>
-            </a:solidFill>
+          <a:ln>
+            <a:noFill/>
           </a:ln>
         </p:spPr>
         <p:style>
@@ -5399,287 +5962,14 @@
           <a:lstStyle/>
           <a:p>
             <a:pPr algn="ctr"/>
-            <a:endParaRPr lang="en-GB" dirty="0"/>
-          </a:p>
-        </p:txBody>
-      </p:sp>
-      <p:sp>
-        <p:nvSpPr>
-          <p:cNvPr id="39" name="Oval 38">
-            <a:extLst>
-              <a:ext uri="{FF2B5EF4-FFF2-40B4-BE49-F238E27FC236}">
-                <a16:creationId xmlns:a16="http://schemas.microsoft.com/office/drawing/2014/main" id="{24035077-D215-F368-DE1E-B905FC0E0762}"/>
-              </a:ext>
-            </a:extLst>
-          </p:cNvPr>
-          <p:cNvSpPr>
-            <a:spLocks/>
-          </p:cNvSpPr>
-          <p:nvPr/>
-        </p:nvSpPr>
-        <p:spPr>
-          <a:xfrm>
-            <a:off x="3626946" y="3334632"/>
-            <a:ext cx="557118" cy="376427"/>
-          </a:xfrm>
-          <a:prstGeom prst="ellipse">
-            <a:avLst/>
-          </a:prstGeom>
-          <a:noFill/>
-          <a:ln w="28575">
-            <a:solidFill>
-              <a:schemeClr val="accent2">
-                <a:lumMod val="50000"/>
-              </a:schemeClr>
-            </a:solidFill>
-          </a:ln>
-        </p:spPr>
-        <p:style>
-          <a:lnRef idx="2">
-            <a:schemeClr val="accent1">
-              <a:shade val="15000"/>
-            </a:schemeClr>
-          </a:lnRef>
-          <a:fillRef idx="1">
-            <a:schemeClr val="accent1"/>
-          </a:fillRef>
-          <a:effectRef idx="0">
-            <a:schemeClr val="accent1"/>
-          </a:effectRef>
-          <a:fontRef idx="minor">
-            <a:schemeClr val="lt1"/>
-          </a:fontRef>
-        </p:style>
-        <p:txBody>
-          <a:bodyPr rtlCol="0" anchor="ctr"/>
-          <a:lstStyle/>
-          <a:p>
-            <a:pPr algn="ctr"/>
-            <a:endParaRPr lang="en-GB" dirty="0"/>
-          </a:p>
-        </p:txBody>
-      </p:sp>
-      <p:sp>
-        <p:nvSpPr>
-          <p:cNvPr id="40" name="Oval 39">
-            <a:extLst>
-              <a:ext uri="{FF2B5EF4-FFF2-40B4-BE49-F238E27FC236}">
-                <a16:creationId xmlns:a16="http://schemas.microsoft.com/office/drawing/2014/main" id="{464C760A-C2DC-80F4-97C9-3E322186B65D}"/>
-              </a:ext>
-            </a:extLst>
-          </p:cNvPr>
-          <p:cNvSpPr>
-            <a:spLocks/>
-          </p:cNvSpPr>
-          <p:nvPr/>
-        </p:nvSpPr>
-        <p:spPr>
-          <a:xfrm>
-            <a:off x="5766854" y="3438447"/>
-            <a:ext cx="478161" cy="386062"/>
-          </a:xfrm>
-          <a:prstGeom prst="ellipse">
-            <a:avLst/>
-          </a:prstGeom>
-          <a:noFill/>
-          <a:ln w="28575">
-            <a:solidFill>
-              <a:schemeClr val="accent2">
-                <a:lumMod val="50000"/>
-              </a:schemeClr>
-            </a:solidFill>
-          </a:ln>
-        </p:spPr>
-        <p:style>
-          <a:lnRef idx="2">
-            <a:schemeClr val="accent1">
-              <a:shade val="15000"/>
-            </a:schemeClr>
-          </a:lnRef>
-          <a:fillRef idx="1">
-            <a:schemeClr val="accent1"/>
-          </a:fillRef>
-          <a:effectRef idx="0">
-            <a:schemeClr val="accent1"/>
-          </a:effectRef>
-          <a:fontRef idx="minor">
-            <a:schemeClr val="lt1"/>
-          </a:fontRef>
-        </p:style>
-        <p:txBody>
-          <a:bodyPr rtlCol="0" anchor="ctr"/>
-          <a:lstStyle/>
-          <a:p>
-            <a:pPr algn="ctr"/>
-            <a:endParaRPr lang="en-GB" dirty="0"/>
-          </a:p>
-        </p:txBody>
-      </p:sp>
-      <p:sp>
-        <p:nvSpPr>
-          <p:cNvPr id="41" name="Oval 40">
-            <a:extLst>
-              <a:ext uri="{FF2B5EF4-FFF2-40B4-BE49-F238E27FC236}">
-                <a16:creationId xmlns:a16="http://schemas.microsoft.com/office/drawing/2014/main" id="{CE90C148-8A30-BF7D-17F8-97C7599201DC}"/>
-              </a:ext>
-            </a:extLst>
-          </p:cNvPr>
-          <p:cNvSpPr>
-            <a:spLocks/>
-          </p:cNvSpPr>
-          <p:nvPr/>
-        </p:nvSpPr>
-        <p:spPr>
-          <a:xfrm>
-            <a:off x="7872737" y="3428999"/>
-            <a:ext cx="519859" cy="326753"/>
-          </a:xfrm>
-          <a:prstGeom prst="ellipse">
-            <a:avLst/>
-          </a:prstGeom>
-          <a:noFill/>
-          <a:ln w="28575">
-            <a:solidFill>
-              <a:schemeClr val="accent2">
-                <a:lumMod val="50000"/>
-              </a:schemeClr>
-            </a:solidFill>
-          </a:ln>
-        </p:spPr>
-        <p:style>
-          <a:lnRef idx="2">
-            <a:schemeClr val="accent1">
-              <a:shade val="15000"/>
-            </a:schemeClr>
-          </a:lnRef>
-          <a:fillRef idx="1">
-            <a:schemeClr val="accent1"/>
-          </a:fillRef>
-          <a:effectRef idx="0">
-            <a:schemeClr val="accent1"/>
-          </a:effectRef>
-          <a:fontRef idx="minor">
-            <a:schemeClr val="lt1"/>
-          </a:fontRef>
-        </p:style>
-        <p:txBody>
-          <a:bodyPr rtlCol="0" anchor="ctr"/>
-          <a:lstStyle/>
-          <a:p>
-            <a:pPr algn="ctr"/>
-            <a:endParaRPr lang="en-GB" dirty="0"/>
-          </a:p>
-        </p:txBody>
-      </p:sp>
-      <p:sp>
-        <p:nvSpPr>
-          <p:cNvPr id="42" name="Oval 41">
-            <a:extLst>
-              <a:ext uri="{FF2B5EF4-FFF2-40B4-BE49-F238E27FC236}">
-                <a16:creationId xmlns:a16="http://schemas.microsoft.com/office/drawing/2014/main" id="{838F879D-27A5-D193-045C-0FE48BF57473}"/>
-              </a:ext>
-            </a:extLst>
-          </p:cNvPr>
-          <p:cNvSpPr>
-            <a:spLocks/>
-          </p:cNvSpPr>
-          <p:nvPr/>
-        </p:nvSpPr>
-        <p:spPr>
-          <a:xfrm>
-            <a:off x="3676268" y="5612581"/>
-            <a:ext cx="485464" cy="341111"/>
-          </a:xfrm>
-          <a:prstGeom prst="ellipse">
-            <a:avLst/>
-          </a:prstGeom>
-          <a:noFill/>
-          <a:ln w="28575">
-            <a:solidFill>
-              <a:schemeClr val="accent2">
-                <a:lumMod val="50000"/>
-              </a:schemeClr>
-            </a:solidFill>
-          </a:ln>
-        </p:spPr>
-        <p:style>
-          <a:lnRef idx="2">
-            <a:schemeClr val="accent1">
-              <a:shade val="15000"/>
-            </a:schemeClr>
-          </a:lnRef>
-          <a:fillRef idx="1">
-            <a:schemeClr val="accent1"/>
-          </a:fillRef>
-          <a:effectRef idx="0">
-            <a:schemeClr val="accent1"/>
-          </a:effectRef>
-          <a:fontRef idx="minor">
-            <a:schemeClr val="lt1"/>
-          </a:fontRef>
-        </p:style>
-        <p:txBody>
-          <a:bodyPr rtlCol="0" anchor="ctr"/>
-          <a:lstStyle/>
-          <a:p>
-            <a:pPr algn="ctr"/>
-            <a:endParaRPr lang="en-GB" dirty="0"/>
-          </a:p>
-        </p:txBody>
-      </p:sp>
-      <p:sp>
-        <p:nvSpPr>
-          <p:cNvPr id="43" name="Oval 42">
-            <a:extLst>
-              <a:ext uri="{FF2B5EF4-FFF2-40B4-BE49-F238E27FC236}">
-                <a16:creationId xmlns:a16="http://schemas.microsoft.com/office/drawing/2014/main" id="{3260557B-82C6-EE22-746A-9EF9FED4B63D}"/>
-              </a:ext>
-            </a:extLst>
-          </p:cNvPr>
-          <p:cNvSpPr>
-            <a:spLocks/>
-          </p:cNvSpPr>
-          <p:nvPr/>
-        </p:nvSpPr>
-        <p:spPr>
-          <a:xfrm>
-            <a:off x="6754932" y="5279457"/>
-            <a:ext cx="245375" cy="268278"/>
-          </a:xfrm>
-          <a:prstGeom prst="ellipse">
-            <a:avLst/>
-          </a:prstGeom>
-          <a:noFill/>
-          <a:ln w="28575">
-            <a:solidFill>
-              <a:schemeClr val="accent2">
-                <a:lumMod val="50000"/>
-              </a:schemeClr>
-            </a:solidFill>
-          </a:ln>
-        </p:spPr>
-        <p:style>
-          <a:lnRef idx="2">
-            <a:schemeClr val="accent1">
-              <a:shade val="15000"/>
-            </a:schemeClr>
-          </a:lnRef>
-          <a:fillRef idx="1">
-            <a:schemeClr val="accent1"/>
-          </a:fillRef>
-          <a:effectRef idx="0">
-            <a:schemeClr val="accent1"/>
-          </a:effectRef>
-          <a:fontRef idx="minor">
-            <a:schemeClr val="lt1"/>
-          </a:fontRef>
-        </p:style>
-        <p:txBody>
-          <a:bodyPr rtlCol="0" anchor="ctr"/>
-          <a:lstStyle/>
-          <a:p>
-            <a:pPr algn="ctr"/>
-            <a:endParaRPr lang="en-GB" dirty="0"/>
+            <a:r>
+              <a:rPr lang="nb-NO" sz="1000" b="1" noProof="1">
+                <a:solidFill>
+                  <a:schemeClr val="tx1"/>
+                </a:solidFill>
+              </a:rPr>
+              <a:t>Facing Crucible</a:t>
+            </a:r>
           </a:p>
         </p:txBody>
       </p:sp>

</xml_diff>